<commit_message>
New Ho and R guides
</commit_message>
<xml_diff>
--- a/resources/MTH107-HOGuide.pptx
+++ b/resources/MTH107-HOGuide.pptx
@@ -1493,7 +1493,7 @@
           </a:ln>
           <a:extLst>
             <a:ext uri="{C572A759-6A51-4108-AA02-DFA0A04FC94B}">
-              <ma14:wrappingTextBoxFlag xmlns:ma14="http://schemas.microsoft.com/office/mac/drawingml/2011/main" xmlns="" val="1"/>
+              <ma14:wrappingTextBoxFlag xmlns="" xmlns:ma14="http://schemas.microsoft.com/office/mac/drawingml/2011/main" val="1"/>
             </a:ext>
           </a:extLst>
         </p:spPr>
@@ -1536,7 +1536,7 @@
           </a:ln>
           <a:extLst>
             <a:ext uri="{C572A759-6A51-4108-AA02-DFA0A04FC94B}">
-              <ma14:wrappingTextBoxFlag xmlns:ma14="http://schemas.microsoft.com/office/mac/drawingml/2011/main" xmlns="" val="1"/>
+              <ma14:wrappingTextBoxFlag xmlns="" xmlns:ma14="http://schemas.microsoft.com/office/mac/drawingml/2011/main" val="1"/>
             </a:ext>
           </a:extLst>
         </p:spPr>
@@ -1967,11 +1967,11 @@
             <a:r>
               <a:rPr lang="en-US" sz="2400" b="1" cap="small" dirty="0" smtClean="0">
                 <a:solidFill>
-                  <a:srgbClr val="53585F"/>
+                  <a:schemeClr val="tx1"/>
                 </a:solidFill>
-                <a:latin typeface="Source Sans Pro Semibold"/>
+                <a:latin typeface="Calibri" panose="020F0502020204030204" pitchFamily="34" charset="0"/>
                 <a:ea typeface="Source Sans Pro"/>
-                <a:cs typeface="Source Sans Pro"/>
+                <a:cs typeface="Calibri" panose="020F0502020204030204" pitchFamily="34" charset="0"/>
                 <a:sym typeface="Source Sans Pro"/>
               </a:rPr>
               <a:t>Hypothesis Testing </a:t>
@@ -1979,9 +1979,9 @@
             <a:r>
               <a:rPr lang="en-US" sz="2400" b="1" cap="small" dirty="0" smtClean="0">
                 <a:solidFill>
-                  <a:srgbClr val="53585F"/>
+                  <a:schemeClr val="tx1"/>
                 </a:solidFill>
-                <a:latin typeface="Source Sans Pro Semibold"/>
+                <a:latin typeface="Calibri" panose="020F0502020204030204" pitchFamily="34" charset="0"/>
                 <a:ea typeface="Source Sans Pro"/>
                 <a:cs typeface="Times New Roman" panose="02020603050405020304" pitchFamily="18" charset="0"/>
                 <a:sym typeface="Source Sans Pro"/>
@@ -1991,22 +1991,22 @@
             <a:r>
               <a:rPr lang="en-US" sz="2400" b="1" cap="small" dirty="0">
                 <a:solidFill>
-                  <a:srgbClr val="53585F"/>
+                  <a:schemeClr val="tx1"/>
                 </a:solidFill>
-                <a:latin typeface="Source Sans Pro Semibold"/>
+                <a:latin typeface="Calibri" panose="020F0502020204030204" pitchFamily="34" charset="0"/>
                 <a:ea typeface="Source Sans Pro"/>
-                <a:cs typeface="Source Sans Pro"/>
+                <a:cs typeface="Calibri" panose="020F0502020204030204" pitchFamily="34" charset="0"/>
                 <a:sym typeface="Source Sans Pro"/>
               </a:rPr>
               <a:t>MTH107</a:t>
             </a:r>
             <a:endParaRPr sz="2400" b="1" cap="small" dirty="0">
               <a:solidFill>
-                <a:srgbClr val="53585F"/>
+                <a:schemeClr val="tx1"/>
               </a:solidFill>
-              <a:latin typeface="Source Sans Pro Semibold"/>
+              <a:latin typeface="Calibri" panose="020F0502020204030204" pitchFamily="34" charset="0"/>
               <a:ea typeface="Source Sans Pro Light"/>
-              <a:cs typeface="Source Sans Pro Light"/>
+              <a:cs typeface="Calibri Light" panose="020F0302020204030204" pitchFamily="34" charset="0"/>
               <a:sym typeface="Source Sans Pro Light"/>
             </a:endParaRPr>
           </a:p>
@@ -2026,8 +2026,8 @@
             <a:chExt cx="4393984" cy="1709195"/>
           </a:xfrm>
         </p:grpSpPr>
-        <mc:AlternateContent xmlns:mc="http://schemas.openxmlformats.org/markup-compatibility/2006" xmlns:a14="http://schemas.microsoft.com/office/drawing/2010/main">
-          <mc:Choice Requires="a14">
+        <mc:AlternateContent xmlns:mc="http://schemas.openxmlformats.org/markup-compatibility/2006">
+          <mc:Choice xmlns:a14="http://schemas.microsoft.com/office/drawing/2010/main" Requires="a14">
             <p:sp>
               <p:nvSpPr>
                 <p:cNvPr id="34" name="Shape 34"/>
@@ -2069,36 +2069,36 @@
                   </a:pPr>
                   <a:r>
                     <a:rPr lang="en-US" sz="900" b="1" dirty="0" smtClean="0">
-                      <a:latin typeface="Source Sans Pro Light"/>
-                      <a:ea typeface="Source Sans Pro Light"/>
-                      <a:cs typeface="Source Sans Pro Light"/>
+                      <a:latin typeface="Calibri Light" panose="020F0302020204030204" pitchFamily="34" charset="0"/>
+                      <a:ea typeface="Source Sans Pro Light"/>
+                      <a:cs typeface="Calibri Light" panose="020F0302020204030204" pitchFamily="34" charset="0"/>
                       <a:sym typeface="Source Sans Pro Light"/>
                     </a:rPr>
                     <a:t>H</a:t>
                   </a:r>
                   <a:r>
                     <a:rPr lang="en-US" sz="900" b="1" baseline="-25000" dirty="0" smtClean="0">
-                      <a:latin typeface="Source Sans Pro Light"/>
-                      <a:ea typeface="Source Sans Pro Light"/>
-                      <a:cs typeface="Source Sans Pro Light"/>
+                      <a:latin typeface="Calibri Light" panose="020F0302020204030204" pitchFamily="34" charset="0"/>
+                      <a:ea typeface="Source Sans Pro Light"/>
+                      <a:cs typeface="Calibri Light" panose="020F0302020204030204" pitchFamily="34" charset="0"/>
                       <a:sym typeface="Source Sans Pro Light"/>
                     </a:rPr>
                     <a:t>0</a:t>
                   </a:r>
                   <a:r>
                     <a:rPr lang="en-US" sz="900" b="1" dirty="0" smtClean="0">
-                      <a:latin typeface="Source Sans Pro Light"/>
-                      <a:ea typeface="Source Sans Pro Light"/>
-                      <a:cs typeface="Source Sans Pro Light"/>
+                      <a:latin typeface="Calibri Light" panose="020F0302020204030204" pitchFamily="34" charset="0"/>
+                      <a:ea typeface="Source Sans Pro Light"/>
+                      <a:cs typeface="Calibri Light" panose="020F0302020204030204" pitchFamily="34" charset="0"/>
                       <a:sym typeface="Source Sans Pro Light"/>
                     </a:rPr>
                     <a:t>:</a:t>
                   </a:r>
                   <a:r>
                     <a:rPr lang="en-US" sz="900" dirty="0" smtClean="0">
-                      <a:latin typeface="Source Sans Pro Light"/>
-                      <a:ea typeface="Source Sans Pro Light"/>
-                      <a:cs typeface="Source Sans Pro Light"/>
+                      <a:latin typeface="Calibri Light" panose="020F0302020204030204" pitchFamily="34" charset="0"/>
+                      <a:ea typeface="Source Sans Pro Light"/>
+                      <a:cs typeface="Calibri Light" panose="020F0302020204030204" pitchFamily="34" charset="0"/>
                       <a:sym typeface="Source Sans Pro Light"/>
                     </a:rPr>
                     <a:t> “Distribution of individuals into response levels is the same for all groups”</a:t>
@@ -2117,99 +2117,99 @@
                   </a:pPr>
                   <a:r>
                     <a:rPr lang="en-US" sz="900" b="1" dirty="0" smtClean="0">
-                      <a:latin typeface="Source Sans Pro Light"/>
-                      <a:ea typeface="Source Sans Pro Light"/>
-                      <a:cs typeface="Source Sans Pro Light"/>
+                      <a:latin typeface="Calibri Light" panose="020F0302020204030204" pitchFamily="34" charset="0"/>
+                      <a:ea typeface="Source Sans Pro Light"/>
+                      <a:cs typeface="Calibri Light" panose="020F0302020204030204" pitchFamily="34" charset="0"/>
                       <a:sym typeface="Source Sans Pro Light"/>
                     </a:rPr>
                     <a:t>H</a:t>
                   </a:r>
                   <a:r>
                     <a:rPr lang="en-US" sz="900" b="1" baseline="-25000" dirty="0" smtClean="0">
-                      <a:latin typeface="Source Sans Pro Light"/>
-                      <a:ea typeface="Source Sans Pro Light"/>
-                      <a:cs typeface="Source Sans Pro Light"/>
+                      <a:latin typeface="Calibri Light" panose="020F0302020204030204" pitchFamily="34" charset="0"/>
+                      <a:ea typeface="Source Sans Pro Light"/>
+                      <a:cs typeface="Calibri Light" panose="020F0302020204030204" pitchFamily="34" charset="0"/>
                       <a:sym typeface="Source Sans Pro Light"/>
                     </a:rPr>
                     <a:t>A</a:t>
                   </a:r>
                   <a:r>
                     <a:rPr lang="en-US" sz="900" b="1" dirty="0" smtClean="0">
-                      <a:latin typeface="Source Sans Pro Light"/>
-                      <a:ea typeface="Source Sans Pro Light"/>
-                      <a:cs typeface="Source Sans Pro Light"/>
+                      <a:latin typeface="Calibri Light" panose="020F0302020204030204" pitchFamily="34" charset="0"/>
+                      <a:ea typeface="Source Sans Pro Light"/>
+                      <a:cs typeface="Calibri Light" panose="020F0302020204030204" pitchFamily="34" charset="0"/>
                       <a:sym typeface="Source Sans Pro Light"/>
                     </a:rPr>
                     <a:t>:</a:t>
                   </a:r>
                   <a:r>
                     <a:rPr lang="en-US" sz="900" dirty="0" smtClean="0">
-                      <a:latin typeface="Source Sans Pro Light"/>
-                      <a:ea typeface="Source Sans Pro Light"/>
-                      <a:cs typeface="Source Sans Pro Light"/>
+                      <a:latin typeface="Calibri Light" panose="020F0302020204030204" pitchFamily="34" charset="0"/>
+                      <a:ea typeface="Source Sans Pro Light"/>
+                      <a:cs typeface="Calibri Light" panose="020F0302020204030204" pitchFamily="34" charset="0"/>
                       <a:sym typeface="Source Sans Pro Light"/>
                     </a:rPr>
                     <a:t> </a:t>
                   </a:r>
                   <a:r>
                     <a:rPr lang="en-US" sz="900" dirty="0">
-                      <a:latin typeface="Source Sans Pro Light"/>
-                      <a:ea typeface="Source Sans Pro Light"/>
-                      <a:cs typeface="Source Sans Pro Light"/>
+                      <a:latin typeface="Calibri Light" panose="020F0302020204030204" pitchFamily="34" charset="0"/>
+                      <a:ea typeface="Source Sans Pro Light"/>
+                      <a:cs typeface="Calibri Light" panose="020F0302020204030204" pitchFamily="34" charset="0"/>
                       <a:sym typeface="Source Sans Pro Light"/>
                     </a:rPr>
                     <a:t>“Distribution of </a:t>
                   </a:r>
                   <a:r>
                     <a:rPr lang="en-US" sz="900" dirty="0" smtClean="0">
-                      <a:latin typeface="Source Sans Pro Light"/>
-                      <a:ea typeface="Source Sans Pro Light"/>
-                      <a:cs typeface="Source Sans Pro Light"/>
+                      <a:latin typeface="Calibri Light" panose="020F0302020204030204" pitchFamily="34" charset="0"/>
+                      <a:ea typeface="Source Sans Pro Light"/>
+                      <a:cs typeface="Calibri Light" panose="020F0302020204030204" pitchFamily="34" charset="0"/>
                       <a:sym typeface="Source Sans Pro Light"/>
                     </a:rPr>
                     <a:t>individuals into </a:t>
                   </a:r>
                   <a:r>
                     <a:rPr lang="en-US" sz="900" dirty="0">
-                      <a:latin typeface="Source Sans Pro Light"/>
-                      <a:ea typeface="Source Sans Pro Light"/>
-                      <a:cs typeface="Source Sans Pro Light"/>
+                      <a:latin typeface="Calibri Light" panose="020F0302020204030204" pitchFamily="34" charset="0"/>
+                      <a:ea typeface="Source Sans Pro Light"/>
+                      <a:cs typeface="Calibri Light" panose="020F0302020204030204" pitchFamily="34" charset="0"/>
                       <a:sym typeface="Source Sans Pro Light"/>
                     </a:rPr>
                     <a:t>response levels is </a:t>
                   </a:r>
                   <a:r>
                     <a:rPr lang="en-US" sz="900" dirty="0" smtClean="0">
-                      <a:latin typeface="Source Sans Pro Light"/>
-                      <a:ea typeface="Source Sans Pro Light"/>
-                      <a:cs typeface="Source Sans Pro Light"/>
+                      <a:latin typeface="Calibri Light" panose="020F0302020204030204" pitchFamily="34" charset="0"/>
+                      <a:ea typeface="Source Sans Pro Light"/>
+                      <a:cs typeface="Calibri Light" panose="020F0302020204030204" pitchFamily="34" charset="0"/>
                       <a:sym typeface="Source Sans Pro Light"/>
                     </a:rPr>
                     <a:t>NOT the </a:t>
                   </a:r>
                   <a:r>
                     <a:rPr lang="en-US" sz="900" dirty="0">
-                      <a:latin typeface="Source Sans Pro Light"/>
-                      <a:ea typeface="Source Sans Pro Light"/>
-                      <a:cs typeface="Source Sans Pro Light"/>
+                      <a:latin typeface="Calibri Light" panose="020F0302020204030204" pitchFamily="34" charset="0"/>
+                      <a:ea typeface="Source Sans Pro Light"/>
+                      <a:cs typeface="Calibri Light" panose="020F0302020204030204" pitchFamily="34" charset="0"/>
                       <a:sym typeface="Source Sans Pro Light"/>
                     </a:rPr>
                     <a:t>same for all </a:t>
                   </a:r>
                   <a:r>
                     <a:rPr lang="en-US" sz="900" dirty="0" smtClean="0">
-                      <a:latin typeface="Source Sans Pro Light"/>
-                      <a:ea typeface="Source Sans Pro Light"/>
-                      <a:cs typeface="Source Sans Pro Light"/>
+                      <a:latin typeface="Calibri Light" panose="020F0302020204030204" pitchFamily="34" charset="0"/>
+                      <a:ea typeface="Source Sans Pro Light"/>
+                      <a:cs typeface="Calibri Light" panose="020F0302020204030204" pitchFamily="34" charset="0"/>
                       <a:sym typeface="Source Sans Pro Light"/>
                     </a:rPr>
                     <a:t>groups</a:t>
                   </a:r>
                   <a:r>
                     <a:rPr lang="en-US" sz="900" dirty="0">
-                      <a:latin typeface="Source Sans Pro Light"/>
-                      <a:ea typeface="Source Sans Pro Light"/>
-                      <a:cs typeface="Source Sans Pro Light"/>
+                      <a:latin typeface="Calibri Light" panose="020F0302020204030204" pitchFamily="34" charset="0"/>
+                      <a:ea typeface="Source Sans Pro Light"/>
+                      <a:cs typeface="Calibri Light" panose="020F0302020204030204" pitchFamily="34" charset="0"/>
                       <a:sym typeface="Source Sans Pro Light"/>
                     </a:rPr>
                     <a:t>”</a:t>
@@ -2227,9 +2227,9 @@
                     <a:defRPr sz="1800"/>
                   </a:pPr>
                   <a:endParaRPr lang="en-US" sz="500" dirty="0" smtClean="0">
-                    <a:latin typeface="Source Sans Pro Light"/>
+                    <a:latin typeface="Calibri Light" panose="020F0302020204030204" pitchFamily="34" charset="0"/>
                     <a:ea typeface="Source Sans Pro Light"/>
-                    <a:cs typeface="Source Sans Pro Light"/>
+                    <a:cs typeface="Calibri Light" panose="020F0302020204030204" pitchFamily="34" charset="0"/>
                     <a:sym typeface="Source Sans Pro Light"/>
                   </a:endParaRPr>
                 </a:p>
@@ -2246,18 +2246,18 @@
                   </a:pPr>
                   <a:r>
                     <a:rPr lang="en-US" sz="900" b="1" dirty="0" smtClean="0">
-                      <a:latin typeface="Source Sans Pro Light"/>
-                      <a:ea typeface="Source Sans Pro Light"/>
-                      <a:cs typeface="Source Sans Pro Light"/>
+                      <a:latin typeface="Calibri Light" panose="020F0302020204030204" pitchFamily="34" charset="0"/>
+                      <a:ea typeface="Source Sans Pro Light"/>
+                      <a:cs typeface="Calibri Light" panose="020F0302020204030204" pitchFamily="34" charset="0"/>
                       <a:sym typeface="Source Sans Pro Light"/>
                     </a:rPr>
                     <a:t>Statistic:</a:t>
                   </a:r>
                   <a:r>
                     <a:rPr lang="en-US" sz="900" dirty="0" smtClean="0">
-                      <a:latin typeface="Source Sans Pro Light"/>
-                      <a:ea typeface="Source Sans Pro Light"/>
-                      <a:cs typeface="Source Sans Pro Light"/>
+                      <a:latin typeface="Calibri Light" panose="020F0302020204030204" pitchFamily="34" charset="0"/>
+                      <a:ea typeface="Source Sans Pro Light"/>
+                      <a:cs typeface="Calibri Light" panose="020F0302020204030204" pitchFamily="34" charset="0"/>
                       <a:sym typeface="Source Sans Pro Light"/>
                     </a:rPr>
                     <a:t> Observed frequency table</a:t>
@@ -2275,9 +2275,9 @@
                     <a:defRPr sz="1800"/>
                   </a:pPr>
                   <a:endParaRPr lang="en-US" sz="500" dirty="0" smtClean="0">
-                    <a:latin typeface="Source Sans Pro Light"/>
+                    <a:latin typeface="Calibri Light" panose="020F0302020204030204" pitchFamily="34" charset="0"/>
                     <a:ea typeface="Source Sans Pro Light"/>
-                    <a:cs typeface="Source Sans Pro Light"/>
+                    <a:cs typeface="Calibri Light" panose="020F0302020204030204" pitchFamily="34" charset="0"/>
                     <a:sym typeface="Source Sans Pro Light"/>
                   </a:endParaRPr>
                 </a:p>
@@ -2294,9 +2294,9 @@
                   </a:pPr>
                   <a:r>
                     <a:rPr lang="en-US" sz="900" b="1" dirty="0" smtClean="0">
-                      <a:latin typeface="Source Sans Pro Light"/>
-                      <a:ea typeface="Source Sans Pro Light"/>
-                      <a:cs typeface="Source Sans Pro Light"/>
+                      <a:latin typeface="Calibri Light" panose="020F0302020204030204" pitchFamily="34" charset="0"/>
+                      <a:ea typeface="Source Sans Pro Light"/>
+                      <a:cs typeface="Calibri Light" panose="020F0302020204030204" pitchFamily="34" charset="0"/>
                       <a:sym typeface="Source Sans Pro Light"/>
                     </a:rPr>
                     <a:t>Test Statistic: </a:t>
@@ -2435,36 +2435,36 @@
                   </a14:m>
                   <a:r>
                     <a:rPr lang="en-US" sz="900" dirty="0" smtClean="0">
-                      <a:latin typeface="Source Sans Pro Light"/>
-                      <a:ea typeface="Source Sans Pro Light"/>
-                      <a:cs typeface="Source Sans Pro Light"/>
+                      <a:latin typeface="Calibri Light" panose="020F0302020204030204" pitchFamily="34" charset="0"/>
+                      <a:ea typeface="Source Sans Pro Light"/>
+                      <a:cs typeface="Calibri Light" panose="020F0302020204030204" pitchFamily="34" charset="0"/>
                       <a:sym typeface="Source Sans Pro Light"/>
                     </a:rPr>
                     <a:t>       </a:t>
                   </a:r>
                   <a:r>
                     <a:rPr lang="en-US" sz="900" b="1" dirty="0" err="1" smtClean="0">
-                      <a:latin typeface="Source Sans Pro Light"/>
-                      <a:ea typeface="Source Sans Pro Light"/>
-                      <a:cs typeface="Source Sans Pro Light"/>
+                      <a:latin typeface="Calibri Light" panose="020F0302020204030204" pitchFamily="34" charset="0"/>
+                      <a:ea typeface="Source Sans Pro Light"/>
+                      <a:cs typeface="Calibri Light" panose="020F0302020204030204" pitchFamily="34" charset="0"/>
                       <a:sym typeface="Source Sans Pro Light"/>
                     </a:rPr>
                     <a:t>df</a:t>
                   </a:r>
                   <a:r>
                     <a:rPr lang="en-US" sz="900" b="1" dirty="0" smtClean="0">
-                      <a:latin typeface="Source Sans Pro Light"/>
-                      <a:ea typeface="Source Sans Pro Light"/>
-                      <a:cs typeface="Source Sans Pro Light"/>
+                      <a:latin typeface="Calibri Light" panose="020F0302020204030204" pitchFamily="34" charset="0"/>
+                      <a:ea typeface="Source Sans Pro Light"/>
+                      <a:cs typeface="Calibri Light" panose="020F0302020204030204" pitchFamily="34" charset="0"/>
                       <a:sym typeface="Source Sans Pro Light"/>
                     </a:rPr>
                     <a:t>: </a:t>
                   </a:r>
                   <a:r>
                     <a:rPr lang="en-US" sz="900" dirty="0" smtClean="0">
-                      <a:latin typeface="Source Sans Pro Light"/>
-                      <a:ea typeface="Source Sans Pro Light"/>
-                      <a:cs typeface="Source Sans Pro Light"/>
+                      <a:latin typeface="Calibri Light" panose="020F0302020204030204" pitchFamily="34" charset="0"/>
+                      <a:ea typeface="Source Sans Pro Light"/>
+                      <a:cs typeface="Calibri Light" panose="020F0302020204030204" pitchFamily="34" charset="0"/>
                       <a:sym typeface="Source Sans Pro Light"/>
                     </a:rPr>
                     <a:t>(rows-1)(columns-1)</a:t>
@@ -2482,9 +2482,9 @@
                     <a:defRPr sz="1800"/>
                   </a:pPr>
                   <a:endParaRPr lang="en-US" sz="500" dirty="0">
-                    <a:latin typeface="Source Sans Pro Light"/>
+                    <a:latin typeface="Calibri Light" panose="020F0302020204030204" pitchFamily="34" charset="0"/>
                     <a:ea typeface="Source Sans Pro Light"/>
-                    <a:cs typeface="Source Sans Pro Light"/>
+                    <a:cs typeface="Calibri Light" panose="020F0302020204030204" pitchFamily="34" charset="0"/>
                     <a:sym typeface="Source Sans Pro Light"/>
                   </a:endParaRPr>
                 </a:p>
@@ -2501,36 +2501,36 @@
                   </a:pPr>
                   <a:r>
                     <a:rPr lang="en-US" sz="900" b="1" dirty="0" smtClean="0">
-                      <a:latin typeface="Source Sans Pro Light"/>
-                      <a:ea typeface="Source Sans Pro Light"/>
-                      <a:cs typeface="Source Sans Pro Light"/>
+                      <a:latin typeface="Calibri Light" panose="020F0302020204030204" pitchFamily="34" charset="0"/>
+                      <a:ea typeface="Source Sans Pro Light"/>
+                      <a:cs typeface="Calibri Light" panose="020F0302020204030204" pitchFamily="34" charset="0"/>
                       <a:sym typeface="Source Sans Pro Light"/>
                     </a:rPr>
                     <a:t>Assumptions: </a:t>
                   </a:r>
                   <a:r>
                     <a:rPr lang="en-US" sz="900" u="sng" dirty="0" smtClean="0">
-                      <a:latin typeface="Source Sans Pro Light"/>
-                      <a:ea typeface="Source Sans Pro Light"/>
-                      <a:cs typeface="Source Sans Pro Light"/>
+                      <a:latin typeface="Calibri Light" panose="020F0302020204030204" pitchFamily="34" charset="0"/>
+                      <a:ea typeface="Source Sans Pro Light"/>
+                      <a:cs typeface="Calibri Light" panose="020F0302020204030204" pitchFamily="34" charset="0"/>
                       <a:sym typeface="Source Sans Pro Light"/>
                     </a:rPr>
                     <a:t>&gt;</a:t>
                   </a:r>
                   <a:r>
                     <a:rPr lang="en-US" sz="900" dirty="0" smtClean="0">
-                      <a:latin typeface="Source Sans Pro Light"/>
-                      <a:ea typeface="Source Sans Pro Light"/>
-                      <a:cs typeface="Source Sans Pro Light"/>
+                      <a:latin typeface="Calibri Light" panose="020F0302020204030204" pitchFamily="34" charset="0"/>
+                      <a:ea typeface="Source Sans Pro Light"/>
+                      <a:cs typeface="Calibri Light" panose="020F0302020204030204" pitchFamily="34" charset="0"/>
                       <a:sym typeface="Source Sans Pro Light"/>
                     </a:rPr>
                     <a:t>5 in each cell of the EXPECTED </a:t>
                   </a:r>
                   <a:r>
                     <a:rPr lang="en-US" sz="900" dirty="0">
-                      <a:latin typeface="Source Sans Pro Light"/>
-                      <a:ea typeface="Source Sans Pro Light"/>
-                      <a:cs typeface="Source Sans Pro Light"/>
+                      <a:latin typeface="Calibri Light" panose="020F0302020204030204" pitchFamily="34" charset="0"/>
+                      <a:ea typeface="Source Sans Pro Light"/>
+                      <a:cs typeface="Calibri Light" panose="020F0302020204030204" pitchFamily="34" charset="0"/>
                       <a:sym typeface="Source Sans Pro Light"/>
                     </a:rPr>
                     <a:t>table</a:t>
@@ -2548,9 +2548,9 @@
                     <a:defRPr sz="1800"/>
                   </a:pPr>
                   <a:endParaRPr lang="en-US" sz="500" dirty="0">
-                    <a:latin typeface="Source Sans Pro Light"/>
+                    <a:latin typeface="Calibri Light" panose="020F0302020204030204" pitchFamily="34" charset="0"/>
                     <a:ea typeface="Source Sans Pro Light"/>
-                    <a:cs typeface="Source Sans Pro Light"/>
+                    <a:cs typeface="Calibri Light" panose="020F0302020204030204" pitchFamily="34" charset="0"/>
                     <a:sym typeface="Source Sans Pro Light"/>
                   </a:endParaRPr>
                 </a:p>
@@ -2567,9 +2567,9 @@
                   </a:pPr>
                   <a:r>
                     <a:rPr lang="en-US" sz="900" b="1" dirty="0">
-                      <a:latin typeface="Source Sans Pro Light"/>
-                      <a:ea typeface="Source Sans Pro Light"/>
-                      <a:cs typeface="Source Sans Pro Light"/>
+                      <a:latin typeface="Calibri Light" panose="020F0302020204030204" pitchFamily="34" charset="0"/>
+                      <a:ea typeface="Source Sans Pro Light"/>
+                      <a:cs typeface="Calibri Light" panose="020F0302020204030204" pitchFamily="34" charset="0"/>
                       <a:sym typeface="Source Sans Pro Light"/>
                     </a:rPr>
                     <a:t>R: </a:t>
@@ -2579,9 +2579,9 @@
                       <a:solidFill>
                         <a:srgbClr val="FF0000"/>
                       </a:solidFill>
-                      <a:latin typeface="Source Sans Pro Light"/>
-                      <a:ea typeface="Source Sans Pro Light"/>
-                      <a:cs typeface="Source Sans Pro Light"/>
+                      <a:latin typeface="Calibri Light" panose="020F0302020204030204" pitchFamily="34" charset="0"/>
+                      <a:ea typeface="Source Sans Pro Light"/>
+                      <a:cs typeface="Calibri Light" panose="020F0302020204030204" pitchFamily="34" charset="0"/>
                       <a:sym typeface="Source Sans Pro Light"/>
                     </a:rPr>
                     <a:t>xtabs</a:t>
@@ -2591,18 +2591,18 @@
                       <a:solidFill>
                         <a:srgbClr val="FF0000"/>
                       </a:solidFill>
-                      <a:latin typeface="Source Sans Pro Light"/>
-                      <a:ea typeface="Source Sans Pro Light"/>
-                      <a:cs typeface="Source Sans Pro Light"/>
+                      <a:latin typeface="Calibri Light" panose="020F0302020204030204" pitchFamily="34" charset="0"/>
+                      <a:ea typeface="Source Sans Pro Light"/>
+                      <a:cs typeface="Calibri Light" panose="020F0302020204030204" pitchFamily="34" charset="0"/>
                       <a:sym typeface="Source Sans Pro Light"/>
                     </a:rPr>
                     <a:t>()</a:t>
                   </a:r>
                   <a:r>
                     <a:rPr lang="en-US" sz="900" dirty="0" smtClean="0">
-                      <a:latin typeface="Source Sans Pro Light"/>
-                      <a:ea typeface="Source Sans Pro Light"/>
-                      <a:cs typeface="Source Sans Pro Light"/>
+                      <a:latin typeface="Calibri Light" panose="020F0302020204030204" pitchFamily="34" charset="0"/>
+                      <a:ea typeface="Source Sans Pro Light"/>
+                      <a:cs typeface="Calibri Light" panose="020F0302020204030204" pitchFamily="34" charset="0"/>
                       <a:sym typeface="Source Sans Pro Light"/>
                     </a:rPr>
                     <a:t>, </a:t>
@@ -2612,18 +2612,18 @@
                       <a:solidFill>
                         <a:srgbClr val="FF0000"/>
                       </a:solidFill>
-                      <a:latin typeface="Source Sans Pro Light"/>
-                      <a:ea typeface="Source Sans Pro Light"/>
-                      <a:cs typeface="Source Sans Pro Light"/>
+                      <a:latin typeface="Calibri Light" panose="020F0302020204030204" pitchFamily="34" charset="0"/>
+                      <a:ea typeface="Source Sans Pro Light"/>
+                      <a:cs typeface="Calibri Light" panose="020F0302020204030204" pitchFamily="34" charset="0"/>
                       <a:sym typeface="Source Sans Pro Light"/>
                     </a:rPr>
                     <a:t>matrix()</a:t>
                   </a:r>
                   <a:r>
                     <a:rPr lang="en-US" sz="900" dirty="0" smtClean="0">
-                      <a:latin typeface="Source Sans Pro Light"/>
-                      <a:ea typeface="Source Sans Pro Light"/>
-                      <a:cs typeface="Source Sans Pro Light"/>
+                      <a:latin typeface="Calibri Light" panose="020F0302020204030204" pitchFamily="34" charset="0"/>
+                      <a:ea typeface="Source Sans Pro Light"/>
+                      <a:cs typeface="Calibri Light" panose="020F0302020204030204" pitchFamily="34" charset="0"/>
                       <a:sym typeface="Source Sans Pro Light"/>
                     </a:rPr>
                     <a:t>, </a:t>
@@ -2633,9 +2633,9 @@
                       <a:solidFill>
                         <a:srgbClr val="FF0000"/>
                       </a:solidFill>
-                      <a:latin typeface="Source Sans Pro Light"/>
-                      <a:ea typeface="Source Sans Pro Light"/>
-                      <a:cs typeface="Source Sans Pro Light"/>
+                      <a:latin typeface="Calibri Light" panose="020F0302020204030204" pitchFamily="34" charset="0"/>
+                      <a:ea typeface="Source Sans Pro Light"/>
+                      <a:cs typeface="Calibri Light" panose="020F0302020204030204" pitchFamily="34" charset="0"/>
                       <a:sym typeface="Source Sans Pro Light"/>
                     </a:rPr>
                     <a:t>chisq.test</a:t>
@@ -2645,18 +2645,18 @@
                       <a:solidFill>
                         <a:srgbClr val="FF0000"/>
                       </a:solidFill>
-                      <a:latin typeface="Source Sans Pro Light"/>
-                      <a:ea typeface="Source Sans Pro Light"/>
-                      <a:cs typeface="Source Sans Pro Light"/>
+                      <a:latin typeface="Calibri Light" panose="020F0302020204030204" pitchFamily="34" charset="0"/>
+                      <a:ea typeface="Source Sans Pro Light"/>
+                      <a:cs typeface="Calibri Light" panose="020F0302020204030204" pitchFamily="34" charset="0"/>
                       <a:sym typeface="Source Sans Pro Light"/>
                     </a:rPr>
                     <a:t>()</a:t>
                   </a:r>
                   <a:r>
                     <a:rPr lang="en-US" sz="900" dirty="0" smtClean="0">
-                      <a:latin typeface="Source Sans Pro Light"/>
-                      <a:ea typeface="Source Sans Pro Light"/>
-                      <a:cs typeface="Source Sans Pro Light"/>
+                      <a:latin typeface="Calibri Light" panose="020F0302020204030204" pitchFamily="34" charset="0"/>
+                      <a:ea typeface="Source Sans Pro Light"/>
+                      <a:cs typeface="Calibri Light" panose="020F0302020204030204" pitchFamily="34" charset="0"/>
                       <a:sym typeface="Source Sans Pro Light"/>
                     </a:rPr>
                     <a:t>, </a:t>
@@ -2666,9 +2666,9 @@
                       <a:solidFill>
                         <a:srgbClr val="FF0000"/>
                       </a:solidFill>
-                      <a:latin typeface="Source Sans Pro Light"/>
-                      <a:ea typeface="Source Sans Pro Light"/>
-                      <a:cs typeface="Source Sans Pro Light"/>
+                      <a:latin typeface="Calibri Light" panose="020F0302020204030204" pitchFamily="34" charset="0"/>
+                      <a:ea typeface="Source Sans Pro Light"/>
+                      <a:cs typeface="Calibri Light" panose="020F0302020204030204" pitchFamily="34" charset="0"/>
                       <a:sym typeface="Source Sans Pro Light"/>
                     </a:rPr>
                     <a:t>percTable</a:t>
@@ -2678,9 +2678,9 @@
                       <a:solidFill>
                         <a:srgbClr val="FF0000"/>
                       </a:solidFill>
-                      <a:latin typeface="Source Sans Pro Light"/>
-                      <a:ea typeface="Source Sans Pro Light"/>
-                      <a:cs typeface="Source Sans Pro Light"/>
+                      <a:latin typeface="Calibri Light" panose="020F0302020204030204" pitchFamily="34" charset="0"/>
+                      <a:ea typeface="Source Sans Pro Light"/>
+                      <a:cs typeface="Calibri Light" panose="020F0302020204030204" pitchFamily="34" charset="0"/>
                       <a:sym typeface="Source Sans Pro Light"/>
                     </a:rPr>
                     <a:t>()</a:t>
@@ -2689,16 +2689,16 @@
                     <a:solidFill>
                       <a:srgbClr val="FF0000"/>
                     </a:solidFill>
-                    <a:latin typeface="Source Sans Pro Light"/>
+                    <a:latin typeface="Calibri Light" panose="020F0302020204030204" pitchFamily="34" charset="0"/>
                     <a:ea typeface="Source Sans Pro Light"/>
-                    <a:cs typeface="Source Sans Pro Light"/>
+                    <a:cs typeface="Calibri Light" panose="020F0302020204030204" pitchFamily="34" charset="0"/>
                     <a:sym typeface="Source Sans Pro Light"/>
                   </a:endParaRPr>
                 </a:p>
               </p:txBody>
             </p:sp>
           </mc:Choice>
-          <mc:Fallback xmlns="">
+          <mc:Fallback>
             <p:sp>
               <p:nvSpPr>
                 <p:cNvPr id="34" name="Shape 34"/>
@@ -2766,7 +2766,7 @@
             </a:ln>
             <a:extLst>
               <a:ext uri="{C572A759-6A51-4108-AA02-DFA0A04FC94B}">
-                <ma14:wrappingTextBoxFlag xmlns:ma14="http://schemas.microsoft.com/office/mac/drawingml/2011/main" xmlns="" val="1"/>
+                <ma14:wrappingTextBoxFlag xmlns="" xmlns:ma14="http://schemas.microsoft.com/office/mac/drawingml/2011/main" val="1"/>
               </a:ext>
             </a:extLst>
           </p:spPr>
@@ -2784,9 +2784,9 @@
                       <a:lumMod val="10000"/>
                     </a:schemeClr>
                   </a:solidFill>
-                  <a:latin typeface="Source Sans Pro"/>
+                  <a:latin typeface="Calibri" panose="020F0502020204030204" pitchFamily="34" charset="0"/>
                   <a:ea typeface="Source Sans Pro"/>
-                  <a:cs typeface="Source Sans Pro"/>
+                  <a:cs typeface="Calibri" panose="020F0502020204030204" pitchFamily="34" charset="0"/>
                   <a:sym typeface="Source Sans Pro"/>
                 </a:rPr>
                 <a:t>Chi-Square Test</a:t>
@@ -2797,9 +2797,9 @@
                     <a:lumMod val="10000"/>
                   </a:schemeClr>
                 </a:solidFill>
-                <a:latin typeface="Source Sans Pro"/>
+                <a:latin typeface="Calibri" panose="020F0502020204030204" pitchFamily="34" charset="0"/>
                 <a:ea typeface="Source Sans Pro"/>
-                <a:cs typeface="Source Sans Pro"/>
+                <a:cs typeface="Calibri" panose="020F0502020204030204" pitchFamily="34" charset="0"/>
                 <a:sym typeface="Source Sans Pro"/>
               </a:endParaRPr>
             </a:p>
@@ -2864,18 +2864,18 @@
                   <a:solidFill>
                     <a:srgbClr val="FF0000"/>
                   </a:solidFill>
-                  <a:latin typeface="Source Sans Pro Light"/>
+                  <a:latin typeface="Calibri Light" panose="020F0302020204030204" pitchFamily="34" charset="0"/>
                   <a:ea typeface="Source Sans Pro Light"/>
-                  <a:cs typeface="Source Sans Pro Light"/>
+                  <a:cs typeface="Calibri Light" panose="020F0302020204030204" pitchFamily="34" charset="0"/>
                   <a:sym typeface="Source Sans Pro Light"/>
                 </a:rPr>
                 <a:t>1. </a:t>
               </a:r>
               <a:r>
                 <a:rPr lang="en-US" sz="900" dirty="0" smtClean="0">
-                  <a:latin typeface="Source Sans Pro Light"/>
+                  <a:latin typeface="Calibri Light" panose="020F0302020204030204" pitchFamily="34" charset="0"/>
                   <a:ea typeface="Source Sans Pro Light"/>
-                  <a:cs typeface="Source Sans Pro Light"/>
+                  <a:cs typeface="Calibri Light" panose="020F0302020204030204" pitchFamily="34" charset="0"/>
                   <a:sym typeface="Source Sans Pro Light"/>
                 </a:rPr>
                 <a:t>If response variable is QUANTITATIVE, GOTO </a:t>
@@ -2885,18 +2885,18 @@
                   <a:solidFill>
                     <a:srgbClr val="FF0000"/>
                   </a:solidFill>
-                  <a:latin typeface="Source Sans Pro Light"/>
+                  <a:latin typeface="Calibri Light" panose="020F0302020204030204" pitchFamily="34" charset="0"/>
                   <a:ea typeface="Source Sans Pro Light"/>
-                  <a:cs typeface="Source Sans Pro Light"/>
+                  <a:cs typeface="Calibri Light" panose="020F0302020204030204" pitchFamily="34" charset="0"/>
                   <a:sym typeface="Source Sans Pro Light"/>
                 </a:rPr>
                 <a:t>2</a:t>
               </a:r>
               <a:r>
                 <a:rPr lang="en-US" sz="900" dirty="0" smtClean="0">
-                  <a:latin typeface="Source Sans Pro Light"/>
+                  <a:latin typeface="Calibri Light" panose="020F0302020204030204" pitchFamily="34" charset="0"/>
                   <a:ea typeface="Source Sans Pro Light"/>
-                  <a:cs typeface="Source Sans Pro Light"/>
+                  <a:cs typeface="Calibri Light" panose="020F0302020204030204" pitchFamily="34" charset="0"/>
                   <a:sym typeface="Source Sans Pro Light"/>
                 </a:rPr>
                 <a:t>; if CATEGORICAL, GOTO </a:t>
@@ -2906,18 +2906,18 @@
                   <a:solidFill>
                     <a:srgbClr val="FF0000"/>
                   </a:solidFill>
-                  <a:latin typeface="Source Sans Pro Light"/>
+                  <a:latin typeface="Calibri Light" panose="020F0302020204030204" pitchFamily="34" charset="0"/>
                   <a:ea typeface="Source Sans Pro Light"/>
-                  <a:cs typeface="Source Sans Pro Light"/>
+                  <a:cs typeface="Calibri Light" panose="020F0302020204030204" pitchFamily="34" charset="0"/>
                   <a:sym typeface="Source Sans Pro Light"/>
                 </a:rPr>
                 <a:t>5</a:t>
               </a:r>
               <a:r>
                 <a:rPr lang="en-US" sz="900" dirty="0" smtClean="0">
-                  <a:latin typeface="Source Sans Pro Light"/>
+                  <a:latin typeface="Calibri Light" panose="020F0302020204030204" pitchFamily="34" charset="0"/>
                   <a:ea typeface="Source Sans Pro Light"/>
-                  <a:cs typeface="Source Sans Pro Light"/>
+                  <a:cs typeface="Calibri Light" panose="020F0302020204030204" pitchFamily="34" charset="0"/>
                   <a:sym typeface="Source Sans Pro Light"/>
                 </a:rPr>
                 <a:t>.</a:t>
@@ -2935,9 +2935,9 @@
                 <a:defRPr sz="1800"/>
               </a:pPr>
               <a:endParaRPr lang="en-US" sz="400" dirty="0" smtClean="0">
-                <a:latin typeface="Source Sans Pro Light"/>
+                <a:latin typeface="Calibri Light" panose="020F0302020204030204" pitchFamily="34" charset="0"/>
                 <a:ea typeface="Source Sans Pro Light"/>
-                <a:cs typeface="Source Sans Pro Light"/>
+                <a:cs typeface="Calibri Light" panose="020F0302020204030204" pitchFamily="34" charset="0"/>
                 <a:sym typeface="Source Sans Pro Light"/>
               </a:endParaRPr>
             </a:p>
@@ -2954,9 +2954,9 @@
               </a:pPr>
               <a:r>
                 <a:rPr lang="en-US" sz="900" b="1" u="sng" dirty="0" smtClean="0">
-                  <a:latin typeface="Source Sans Pro Light"/>
+                  <a:latin typeface="Calibri Light" panose="020F0302020204030204" pitchFamily="34" charset="0"/>
                   <a:ea typeface="Source Sans Pro Light"/>
-                  <a:cs typeface="Source Sans Pro Light"/>
+                  <a:cs typeface="Calibri Light" panose="020F0302020204030204" pitchFamily="34" charset="0"/>
                   <a:sym typeface="Source Sans Pro Light"/>
                 </a:rPr>
                 <a:t>Quantitative Response</a:t>
@@ -2978,18 +2978,18 @@
                   <a:solidFill>
                     <a:srgbClr val="FF0000"/>
                   </a:solidFill>
-                  <a:latin typeface="Source Sans Pro Light"/>
+                  <a:latin typeface="Calibri Light" panose="020F0302020204030204" pitchFamily="34" charset="0"/>
                   <a:ea typeface="Source Sans Pro Light"/>
-                  <a:cs typeface="Source Sans Pro Light"/>
+                  <a:cs typeface="Calibri Light" panose="020F0302020204030204" pitchFamily="34" charset="0"/>
                   <a:sym typeface="Source Sans Pro Light"/>
                 </a:rPr>
                 <a:t>2. </a:t>
               </a:r>
               <a:r>
                 <a:rPr lang="en-US" sz="900" dirty="0" smtClean="0">
-                  <a:latin typeface="Source Sans Pro Light"/>
+                  <a:latin typeface="Calibri Light" panose="020F0302020204030204" pitchFamily="34" charset="0"/>
                   <a:ea typeface="Source Sans Pro Light"/>
-                  <a:cs typeface="Source Sans Pro Light"/>
+                  <a:cs typeface="Calibri Light" panose="020F0302020204030204" pitchFamily="34" charset="0"/>
                   <a:sym typeface="Source Sans Pro Light"/>
                 </a:rPr>
                 <a:t>If 1 group/population, GOTO </a:t>
@@ -2999,18 +2999,18 @@
                   <a:solidFill>
                     <a:srgbClr val="FF0000"/>
                   </a:solidFill>
-                  <a:latin typeface="Source Sans Pro Light"/>
+                  <a:latin typeface="Calibri Light" panose="020F0302020204030204" pitchFamily="34" charset="0"/>
                   <a:ea typeface="Source Sans Pro Light"/>
-                  <a:cs typeface="Source Sans Pro Light"/>
+                  <a:cs typeface="Calibri Light" panose="020F0302020204030204" pitchFamily="34" charset="0"/>
                   <a:sym typeface="Source Sans Pro Light"/>
                 </a:rPr>
                 <a:t>3</a:t>
               </a:r>
               <a:r>
                 <a:rPr lang="en-US" sz="900" dirty="0" smtClean="0">
-                  <a:latin typeface="Source Sans Pro Light"/>
+                  <a:latin typeface="Calibri Light" panose="020F0302020204030204" pitchFamily="34" charset="0"/>
                   <a:ea typeface="Source Sans Pro Light"/>
-                  <a:cs typeface="Source Sans Pro Light"/>
+                  <a:cs typeface="Calibri Light" panose="020F0302020204030204" pitchFamily="34" charset="0"/>
                   <a:sym typeface="Source Sans Pro Light"/>
                 </a:rPr>
                 <a:t>; if 2 or more groups/populations, GOTO </a:t>
@@ -3020,18 +3020,18 @@
                   <a:solidFill>
                     <a:srgbClr val="FF0000"/>
                   </a:solidFill>
-                  <a:latin typeface="Source Sans Pro Light"/>
+                  <a:latin typeface="Calibri Light" panose="020F0302020204030204" pitchFamily="34" charset="0"/>
                   <a:ea typeface="Source Sans Pro Light"/>
-                  <a:cs typeface="Source Sans Pro Light"/>
+                  <a:cs typeface="Calibri Light" panose="020F0302020204030204" pitchFamily="34" charset="0"/>
                   <a:sym typeface="Source Sans Pro Light"/>
                 </a:rPr>
                 <a:t>4</a:t>
               </a:r>
               <a:r>
                 <a:rPr lang="en-US" sz="900" dirty="0" smtClean="0">
-                  <a:latin typeface="Source Sans Pro Light"/>
+                  <a:latin typeface="Calibri Light" panose="020F0302020204030204" pitchFamily="34" charset="0"/>
                   <a:ea typeface="Source Sans Pro Light"/>
-                  <a:cs typeface="Source Sans Pro Light"/>
+                  <a:cs typeface="Calibri Light" panose="020F0302020204030204" pitchFamily="34" charset="0"/>
                   <a:sym typeface="Source Sans Pro Light"/>
                 </a:rPr>
                 <a:t>.</a:t>
@@ -3053,18 +3053,18 @@
                   <a:solidFill>
                     <a:srgbClr val="FF0000"/>
                   </a:solidFill>
-                  <a:latin typeface="Source Sans Pro Light"/>
+                  <a:latin typeface="Calibri Light" panose="020F0302020204030204" pitchFamily="34" charset="0"/>
                   <a:ea typeface="Source Sans Pro Light"/>
-                  <a:cs typeface="Source Sans Pro Light"/>
+                  <a:cs typeface="Calibri Light" panose="020F0302020204030204" pitchFamily="34" charset="0"/>
                   <a:sym typeface="Source Sans Pro Light"/>
                 </a:rPr>
                 <a:t>3. </a:t>
               </a:r>
               <a:r>
                 <a:rPr lang="en-US" sz="900" dirty="0" smtClean="0">
-                  <a:latin typeface="Source Sans Pro Light"/>
+                  <a:latin typeface="Calibri Light" panose="020F0302020204030204" pitchFamily="34" charset="0"/>
                   <a:ea typeface="Source Sans Pro Light"/>
-                  <a:cs typeface="Source Sans Pro Light"/>
+                  <a:cs typeface="Calibri Light" panose="020F0302020204030204" pitchFamily="34" charset="0"/>
                   <a:sym typeface="Source Sans Pro Light"/>
                 </a:rPr>
                 <a:t>If </a:t>
@@ -3073,16 +3073,16 @@
                 <a:rPr lang="en-US" sz="900" dirty="0" smtClean="0">
                   <a:latin typeface="Symbol" panose="05050102010706020507" pitchFamily="18" charset="2"/>
                   <a:ea typeface="Source Sans Pro Light"/>
-                  <a:cs typeface="Source Sans Pro Light"/>
+                  <a:cs typeface="Calibri Light" panose="020F0302020204030204" pitchFamily="34" charset="0"/>
                   <a:sym typeface="Source Sans Pro Light"/>
                 </a:rPr>
                 <a:t>s</a:t>
               </a:r>
               <a:r>
                 <a:rPr lang="en-US" sz="900" dirty="0" smtClean="0">
-                  <a:latin typeface="Source Sans Pro Light"/>
+                  <a:latin typeface="Calibri Light" panose="020F0302020204030204" pitchFamily="34" charset="0"/>
                   <a:ea typeface="Source Sans Pro Light"/>
-                  <a:cs typeface="Source Sans Pro Light"/>
+                  <a:cs typeface="Calibri Light" panose="020F0302020204030204" pitchFamily="34" charset="0"/>
                   <a:sym typeface="Source Sans Pro Light"/>
                 </a:rPr>
                 <a:t> is KNOWN, then </a:t>
@@ -3092,18 +3092,18 @@
                   <a:solidFill>
                     <a:schemeClr val="accent1"/>
                   </a:solidFill>
-                  <a:latin typeface="Source Sans Pro Light"/>
+                  <a:latin typeface="Calibri Light" panose="020F0302020204030204" pitchFamily="34" charset="0"/>
                   <a:ea typeface="Source Sans Pro Light"/>
-                  <a:cs typeface="Source Sans Pro Light"/>
+                  <a:cs typeface="Calibri Light" panose="020F0302020204030204" pitchFamily="34" charset="0"/>
                   <a:sym typeface="Source Sans Pro Light"/>
                 </a:rPr>
                 <a:t>1-Sample Z</a:t>
               </a:r>
               <a:r>
                 <a:rPr lang="en-US" sz="900" dirty="0" smtClean="0">
-                  <a:latin typeface="Source Sans Pro Light"/>
+                  <a:latin typeface="Calibri Light" panose="020F0302020204030204" pitchFamily="34" charset="0"/>
                   <a:ea typeface="Source Sans Pro Light"/>
-                  <a:cs typeface="Source Sans Pro Light"/>
+                  <a:cs typeface="Calibri Light" panose="020F0302020204030204" pitchFamily="34" charset="0"/>
                   <a:sym typeface="Source Sans Pro Light"/>
                 </a:rPr>
                 <a:t>; If </a:t>
@@ -3112,25 +3112,25 @@
                 <a:rPr lang="en-US" sz="900" dirty="0">
                   <a:latin typeface="Symbol" panose="05050102010706020507" pitchFamily="18" charset="2"/>
                   <a:ea typeface="Source Sans Pro Light"/>
-                  <a:cs typeface="Source Sans Pro Light"/>
+                  <a:cs typeface="Calibri Light" panose="020F0302020204030204" pitchFamily="34" charset="0"/>
                   <a:sym typeface="Source Sans Pro Light"/>
                 </a:rPr>
                 <a:t>s</a:t>
               </a:r>
               <a:r>
                 <a:rPr lang="en-US" sz="900" dirty="0">
-                  <a:latin typeface="Source Sans Pro Light"/>
+                  <a:latin typeface="Calibri Light" panose="020F0302020204030204" pitchFamily="34" charset="0"/>
                   <a:ea typeface="Source Sans Pro Light"/>
-                  <a:cs typeface="Source Sans Pro Light"/>
+                  <a:cs typeface="Calibri Light" panose="020F0302020204030204" pitchFamily="34" charset="0"/>
                   <a:sym typeface="Source Sans Pro Light"/>
                 </a:rPr>
                 <a:t> is </a:t>
               </a:r>
               <a:r>
                 <a:rPr lang="en-US" sz="900" dirty="0" smtClean="0">
-                  <a:latin typeface="Source Sans Pro Light"/>
+                  <a:latin typeface="Calibri Light" panose="020F0302020204030204" pitchFamily="34" charset="0"/>
                   <a:ea typeface="Source Sans Pro Light"/>
-                  <a:cs typeface="Source Sans Pro Light"/>
+                  <a:cs typeface="Calibri Light" panose="020F0302020204030204" pitchFamily="34" charset="0"/>
                   <a:sym typeface="Source Sans Pro Light"/>
                 </a:rPr>
                 <a:t>UNKNOWN, then </a:t>
@@ -3140,18 +3140,18 @@
                   <a:solidFill>
                     <a:schemeClr val="accent1"/>
                   </a:solidFill>
-                  <a:latin typeface="Source Sans Pro Light"/>
+                  <a:latin typeface="Calibri Light" panose="020F0302020204030204" pitchFamily="34" charset="0"/>
                   <a:ea typeface="Source Sans Pro Light"/>
-                  <a:cs typeface="Source Sans Pro Light"/>
+                  <a:cs typeface="Calibri Light" panose="020F0302020204030204" pitchFamily="34" charset="0"/>
                   <a:sym typeface="Source Sans Pro Light"/>
                 </a:rPr>
                 <a:t>1-Sample t</a:t>
               </a:r>
               <a:r>
                 <a:rPr lang="en-US" sz="900" dirty="0" smtClean="0">
-                  <a:latin typeface="Source Sans Pro Light"/>
+                  <a:latin typeface="Calibri Light" panose="020F0302020204030204" pitchFamily="34" charset="0"/>
                   <a:ea typeface="Source Sans Pro Light"/>
-                  <a:cs typeface="Source Sans Pro Light"/>
+                  <a:cs typeface="Calibri Light" panose="020F0302020204030204" pitchFamily="34" charset="0"/>
                   <a:sym typeface="Source Sans Pro Light"/>
                 </a:rPr>
                 <a:t>.</a:t>
@@ -3173,18 +3173,18 @@
                   <a:solidFill>
                     <a:srgbClr val="FF0000"/>
                   </a:solidFill>
-                  <a:latin typeface="Source Sans Pro Light"/>
+                  <a:latin typeface="Calibri Light" panose="020F0302020204030204" pitchFamily="34" charset="0"/>
                   <a:ea typeface="Source Sans Pro Light"/>
-                  <a:cs typeface="Source Sans Pro Light"/>
+                  <a:cs typeface="Calibri Light" panose="020F0302020204030204" pitchFamily="34" charset="0"/>
                   <a:sym typeface="Source Sans Pro Light"/>
                 </a:rPr>
                 <a:t>4. </a:t>
               </a:r>
               <a:r>
                 <a:rPr lang="en-US" sz="900" dirty="0" smtClean="0">
-                  <a:latin typeface="Source Sans Pro Light"/>
+                  <a:latin typeface="Calibri Light" panose="020F0302020204030204" pitchFamily="34" charset="0"/>
                   <a:ea typeface="Source Sans Pro Light"/>
-                  <a:cs typeface="Source Sans Pro Light"/>
+                  <a:cs typeface="Calibri Light" panose="020F0302020204030204" pitchFamily="34" charset="0"/>
                   <a:sym typeface="Source Sans Pro Light"/>
                 </a:rPr>
                 <a:t>If individuals are INDEPENDENT between groups, then </a:t>
@@ -3194,18 +3194,18 @@
                   <a:solidFill>
                     <a:schemeClr val="accent1"/>
                   </a:solidFill>
-                  <a:latin typeface="Source Sans Pro Light"/>
+                  <a:latin typeface="Calibri Light" panose="020F0302020204030204" pitchFamily="34" charset="0"/>
                   <a:ea typeface="Source Sans Pro Light"/>
-                  <a:cs typeface="Source Sans Pro Light"/>
+                  <a:cs typeface="Calibri Light" panose="020F0302020204030204" pitchFamily="34" charset="0"/>
                   <a:sym typeface="Source Sans Pro Light"/>
                 </a:rPr>
                 <a:t>2-Sample t</a:t>
               </a:r>
               <a:r>
                 <a:rPr lang="en-US" sz="900" dirty="0" smtClean="0">
-                  <a:latin typeface="Source Sans Pro Light"/>
+                  <a:latin typeface="Calibri Light" panose="020F0302020204030204" pitchFamily="34" charset="0"/>
                   <a:ea typeface="Source Sans Pro Light"/>
-                  <a:cs typeface="Source Sans Pro Light"/>
+                  <a:cs typeface="Calibri Light" panose="020F0302020204030204" pitchFamily="34" charset="0"/>
                   <a:sym typeface="Source Sans Pro Light"/>
                 </a:rPr>
                 <a:t>; otherwise, </a:t>
@@ -3215,18 +3215,18 @@
                   <a:solidFill>
                     <a:schemeClr val="accent1"/>
                   </a:solidFill>
-                  <a:latin typeface="Source Sans Pro Light"/>
+                  <a:latin typeface="Calibri Light" panose="020F0302020204030204" pitchFamily="34" charset="0"/>
                   <a:ea typeface="Source Sans Pro Light"/>
-                  <a:cs typeface="Source Sans Pro Light"/>
+                  <a:cs typeface="Calibri Light" panose="020F0302020204030204" pitchFamily="34" charset="0"/>
                   <a:sym typeface="Source Sans Pro Light"/>
                 </a:rPr>
                 <a:t>Paired t</a:t>
               </a:r>
               <a:r>
                 <a:rPr lang="en-US" sz="900" dirty="0" smtClean="0">
-                  <a:latin typeface="Source Sans Pro Light"/>
+                  <a:latin typeface="Calibri Light" panose="020F0302020204030204" pitchFamily="34" charset="0"/>
                   <a:ea typeface="Source Sans Pro Light"/>
-                  <a:cs typeface="Source Sans Pro Light"/>
+                  <a:cs typeface="Calibri Light" panose="020F0302020204030204" pitchFamily="34" charset="0"/>
                   <a:sym typeface="Source Sans Pro Light"/>
                 </a:rPr>
                 <a:t>.</a:t>
@@ -3244,9 +3244,9 @@
                 <a:defRPr sz="1800"/>
               </a:pPr>
               <a:endParaRPr lang="en-US" sz="400" dirty="0">
-                <a:latin typeface="Source Sans Pro Light"/>
+                <a:latin typeface="Calibri Light" panose="020F0302020204030204" pitchFamily="34" charset="0"/>
                 <a:ea typeface="Source Sans Pro Light"/>
-                <a:cs typeface="Source Sans Pro Light"/>
+                <a:cs typeface="Calibri Light" panose="020F0302020204030204" pitchFamily="34" charset="0"/>
                 <a:sym typeface="Source Sans Pro Light"/>
               </a:endParaRPr>
             </a:p>
@@ -3263,9 +3263,9 @@
               </a:pPr>
               <a:r>
                 <a:rPr lang="en-US" sz="900" b="1" u="sng" dirty="0" smtClean="0">
-                  <a:latin typeface="Source Sans Pro Light"/>
+                  <a:latin typeface="Calibri Light" panose="020F0302020204030204" pitchFamily="34" charset="0"/>
                   <a:ea typeface="Source Sans Pro Light"/>
-                  <a:cs typeface="Source Sans Pro Light"/>
+                  <a:cs typeface="Calibri Light" panose="020F0302020204030204" pitchFamily="34" charset="0"/>
                   <a:sym typeface="Source Sans Pro Light"/>
                 </a:rPr>
                 <a:t>Categorical Response</a:t>
@@ -3287,18 +3287,18 @@
                   <a:solidFill>
                     <a:srgbClr val="FF0000"/>
                   </a:solidFill>
-                  <a:latin typeface="Source Sans Pro Light"/>
+                  <a:latin typeface="Calibri Light" panose="020F0302020204030204" pitchFamily="34" charset="0"/>
                   <a:ea typeface="Source Sans Pro Light"/>
-                  <a:cs typeface="Source Sans Pro Light"/>
+                  <a:cs typeface="Calibri Light" panose="020F0302020204030204" pitchFamily="34" charset="0"/>
                   <a:sym typeface="Source Sans Pro Light"/>
                 </a:rPr>
                 <a:t>5. </a:t>
               </a:r>
               <a:r>
                 <a:rPr lang="en-US" sz="900" dirty="0" smtClean="0">
-                  <a:latin typeface="Source Sans Pro Light"/>
+                  <a:latin typeface="Calibri Light" panose="020F0302020204030204" pitchFamily="34" charset="0"/>
                   <a:ea typeface="Source Sans Pro Light"/>
-                  <a:cs typeface="Source Sans Pro Light"/>
+                  <a:cs typeface="Calibri Light" panose="020F0302020204030204" pitchFamily="34" charset="0"/>
                   <a:sym typeface="Source Sans Pro Light"/>
                 </a:rPr>
                 <a:t>If 1 group, then </a:t>
@@ -3308,36 +3308,36 @@
                   <a:solidFill>
                     <a:schemeClr val="accent1"/>
                   </a:solidFill>
-                  <a:latin typeface="Source Sans Pro Light"/>
+                  <a:latin typeface="Calibri Light" panose="020F0302020204030204" pitchFamily="34" charset="0"/>
                   <a:ea typeface="Source Sans Pro Light"/>
-                  <a:cs typeface="Source Sans Pro Light"/>
+                  <a:cs typeface="Calibri Light" panose="020F0302020204030204" pitchFamily="34" charset="0"/>
                   <a:sym typeface="Source Sans Pro Light"/>
                 </a:rPr>
                 <a:t>Goodness-of-Fit</a:t>
               </a:r>
               <a:r>
                 <a:rPr lang="en-US" sz="900" dirty="0" smtClean="0">
-                  <a:latin typeface="Source Sans Pro Light"/>
+                  <a:latin typeface="Calibri Light" panose="020F0302020204030204" pitchFamily="34" charset="0"/>
                   <a:ea typeface="Source Sans Pro Light"/>
-                  <a:cs typeface="Source Sans Pro Light"/>
+                  <a:cs typeface="Calibri Light" panose="020F0302020204030204" pitchFamily="34" charset="0"/>
                   <a:sym typeface="Source Sans Pro Light"/>
                 </a:rPr>
                 <a:t>; </a:t>
               </a:r>
               <a:r>
                 <a:rPr lang="en-US" sz="900" dirty="0">
-                  <a:latin typeface="Source Sans Pro Light"/>
+                  <a:latin typeface="Calibri Light" panose="020F0302020204030204" pitchFamily="34" charset="0"/>
                   <a:ea typeface="Source Sans Pro Light"/>
-                  <a:cs typeface="Source Sans Pro Light"/>
+                  <a:cs typeface="Calibri Light" panose="020F0302020204030204" pitchFamily="34" charset="0"/>
                   <a:sym typeface="Source Sans Pro Light"/>
                 </a:rPr>
                 <a:t>if 2 or more </a:t>
               </a:r>
               <a:r>
                 <a:rPr lang="en-US" sz="900" dirty="0" smtClean="0">
-                  <a:latin typeface="Source Sans Pro Light"/>
+                  <a:latin typeface="Calibri Light" panose="020F0302020204030204" pitchFamily="34" charset="0"/>
                   <a:ea typeface="Source Sans Pro Light"/>
-                  <a:cs typeface="Source Sans Pro Light"/>
+                  <a:cs typeface="Calibri Light" panose="020F0302020204030204" pitchFamily="34" charset="0"/>
                   <a:sym typeface="Source Sans Pro Light"/>
                 </a:rPr>
                 <a:t>groups, then </a:t>
@@ -3347,26 +3347,26 @@
                   <a:solidFill>
                     <a:schemeClr val="accent1"/>
                   </a:solidFill>
-                  <a:latin typeface="Source Sans Pro Light"/>
+                  <a:latin typeface="Calibri Light" panose="020F0302020204030204" pitchFamily="34" charset="0"/>
                   <a:ea typeface="Source Sans Pro Light"/>
-                  <a:cs typeface="Source Sans Pro Light"/>
+                  <a:cs typeface="Calibri Light" panose="020F0302020204030204" pitchFamily="34" charset="0"/>
                   <a:sym typeface="Source Sans Pro Light"/>
                 </a:rPr>
                 <a:t>Chi-Square</a:t>
               </a:r>
               <a:r>
                 <a:rPr lang="en-US" sz="900" dirty="0" smtClean="0">
-                  <a:latin typeface="Source Sans Pro Light"/>
+                  <a:latin typeface="Calibri Light" panose="020F0302020204030204" pitchFamily="34" charset="0"/>
                   <a:ea typeface="Source Sans Pro Light"/>
-                  <a:cs typeface="Source Sans Pro Light"/>
+                  <a:cs typeface="Calibri Light" panose="020F0302020204030204" pitchFamily="34" charset="0"/>
                   <a:sym typeface="Source Sans Pro Light"/>
                 </a:rPr>
                 <a:t>.</a:t>
               </a:r>
               <a:endParaRPr lang="en-US" sz="900" dirty="0">
-                <a:latin typeface="Source Sans Pro Light"/>
+                <a:latin typeface="Calibri Light" panose="020F0302020204030204" pitchFamily="34" charset="0"/>
                 <a:ea typeface="Source Sans Pro Light"/>
-                <a:cs typeface="Source Sans Pro Light"/>
+                <a:cs typeface="Calibri Light" panose="020F0302020204030204" pitchFamily="34" charset="0"/>
                 <a:sym typeface="Source Sans Pro Light"/>
               </a:endParaRPr>
             </a:p>
@@ -3399,7 +3399,7 @@
             </a:ln>
             <a:extLst>
               <a:ext uri="{C572A759-6A51-4108-AA02-DFA0A04FC94B}">
-                <ma14:wrappingTextBoxFlag xmlns:ma14="http://schemas.microsoft.com/office/mac/drawingml/2011/main" xmlns="" val="1"/>
+                <ma14:wrappingTextBoxFlag xmlns="" xmlns:ma14="http://schemas.microsoft.com/office/mac/drawingml/2011/main" val="1"/>
               </a:ext>
             </a:extLst>
           </p:spPr>
@@ -3417,9 +3417,9 @@
                       <a:lumMod val="95000"/>
                     </a:schemeClr>
                   </a:solidFill>
-                  <a:latin typeface="Source Sans Pro"/>
+                  <a:latin typeface="Calibri" panose="020F0502020204030204" pitchFamily="34" charset="0"/>
                   <a:ea typeface="Source Sans Pro"/>
-                  <a:cs typeface="Source Sans Pro"/>
+                  <a:cs typeface="Calibri" panose="020F0502020204030204" pitchFamily="34" charset="0"/>
                   <a:sym typeface="Source Sans Pro"/>
                 </a:rPr>
                 <a:t>Choosing a Hypothesis Test</a:t>
@@ -3430,9 +3430,9 @@
                     <a:lumMod val="95000"/>
                   </a:schemeClr>
                 </a:solidFill>
-                <a:latin typeface="Source Sans Pro"/>
+                <a:latin typeface="Calibri" panose="020F0502020204030204" pitchFamily="34" charset="0"/>
                 <a:ea typeface="Source Sans Pro"/>
-                <a:cs typeface="Source Sans Pro"/>
+                <a:cs typeface="Calibri" panose="020F0502020204030204" pitchFamily="34" charset="0"/>
                 <a:sym typeface="Source Sans Pro"/>
               </a:endParaRPr>
             </a:p>
@@ -3496,27 +3496,27 @@
                   </a:pPr>
                   <a:r>
                     <a:rPr lang="en-US" sz="900" b="1" dirty="0" smtClean="0">
-                      <a:latin typeface="Source Sans Pro Light"/>
-                      <a:ea typeface="Source Sans Pro Light"/>
-                      <a:cs typeface="Source Sans Pro Light"/>
+                      <a:latin typeface="Calibri Light" panose="020F0302020204030204" pitchFamily="34" charset="0"/>
+                      <a:ea typeface="Source Sans Pro Light"/>
+                      <a:cs typeface="Calibri Light" panose="020F0302020204030204" pitchFamily="34" charset="0"/>
                       <a:sym typeface="Source Sans Pro Light"/>
                     </a:rPr>
                     <a:t>H</a:t>
                   </a:r>
                   <a:r>
                     <a:rPr lang="en-US" sz="900" b="1" baseline="-25000" dirty="0" smtClean="0">
-                      <a:latin typeface="Source Sans Pro Light"/>
-                      <a:ea typeface="Source Sans Pro Light"/>
-                      <a:cs typeface="Source Sans Pro Light"/>
+                      <a:latin typeface="Calibri Light" panose="020F0302020204030204" pitchFamily="34" charset="0"/>
+                      <a:ea typeface="Source Sans Pro Light"/>
+                      <a:cs typeface="Calibri Light" panose="020F0302020204030204" pitchFamily="34" charset="0"/>
                       <a:sym typeface="Source Sans Pro Light"/>
                     </a:rPr>
                     <a:t>0</a:t>
                   </a:r>
                   <a:r>
                     <a:rPr lang="en-US" sz="900" b="1" dirty="0" smtClean="0">
-                      <a:latin typeface="Source Sans Pro Light"/>
-                      <a:ea typeface="Source Sans Pro Light"/>
-                      <a:cs typeface="Source Sans Pro Light"/>
+                      <a:latin typeface="Calibri Light" panose="020F0302020204030204" pitchFamily="34" charset="0"/>
+                      <a:ea typeface="Source Sans Pro Light"/>
+                      <a:cs typeface="Calibri Light" panose="020F0302020204030204" pitchFamily="34" charset="0"/>
                       <a:sym typeface="Source Sans Pro Light"/>
                     </a:rPr>
                     <a:t>: </a:t>
@@ -3525,16 +3525,16 @@
                     <a:rPr lang="en-US" sz="900" dirty="0" smtClean="0">
                       <a:latin typeface="Symbol" panose="05050102010706020507" pitchFamily="18" charset="2"/>
                       <a:ea typeface="Source Sans Pro Light"/>
-                      <a:cs typeface="Source Sans Pro Light"/>
+                      <a:cs typeface="Calibri Light" panose="020F0302020204030204" pitchFamily="34" charset="0"/>
                       <a:sym typeface="Source Sans Pro Light"/>
                     </a:rPr>
                     <a:t>m</a:t>
                   </a:r>
                   <a:r>
                     <a:rPr lang="en-US" sz="900" dirty="0" smtClean="0">
-                      <a:latin typeface="Source Sans Pro Light"/>
-                      <a:ea typeface="Source Sans Pro Light"/>
-                      <a:cs typeface="Source Sans Pro Light"/>
+                      <a:latin typeface="Calibri Light" panose="020F0302020204030204" pitchFamily="34" charset="0"/>
+                      <a:ea typeface="Source Sans Pro Light"/>
+                      <a:cs typeface="Calibri Light" panose="020F0302020204030204" pitchFamily="34" charset="0"/>
                       <a:sym typeface="Source Sans Pro Light"/>
                     </a:rPr>
                     <a:t> = </a:t>
@@ -3543,25 +3543,25 @@
                     <a:rPr lang="en-US" sz="900" dirty="0" smtClean="0">
                       <a:latin typeface="Symbol" panose="05050102010706020507" pitchFamily="18" charset="2"/>
                       <a:ea typeface="Source Sans Pro Light"/>
-                      <a:cs typeface="Source Sans Pro Light"/>
+                      <a:cs typeface="Calibri Light" panose="020F0302020204030204" pitchFamily="34" charset="0"/>
                       <a:sym typeface="Source Sans Pro Light"/>
                     </a:rPr>
                     <a:t>m</a:t>
                   </a:r>
                   <a:r>
                     <a:rPr lang="en-US" sz="900" baseline="-25000" dirty="0" smtClean="0">
-                      <a:latin typeface="Source Sans Pro Light"/>
-                      <a:ea typeface="Source Sans Pro Light"/>
-                      <a:cs typeface="Source Sans Pro Light"/>
+                      <a:latin typeface="Calibri Light" panose="020F0302020204030204" pitchFamily="34" charset="0"/>
+                      <a:ea typeface="Source Sans Pro Light"/>
+                      <a:cs typeface="Calibri Light" panose="020F0302020204030204" pitchFamily="34" charset="0"/>
                       <a:sym typeface="Source Sans Pro Light"/>
                     </a:rPr>
                     <a:t>0</a:t>
                   </a:r>
                   <a:r>
                     <a:rPr lang="en-US" sz="900" dirty="0" smtClean="0">
-                      <a:latin typeface="Source Sans Pro Light"/>
-                      <a:ea typeface="Source Sans Pro Light"/>
-                      <a:cs typeface="Source Sans Pro Light"/>
+                      <a:latin typeface="Calibri Light" panose="020F0302020204030204" pitchFamily="34" charset="0"/>
+                      <a:ea typeface="Source Sans Pro Light"/>
+                      <a:cs typeface="Calibri Light" panose="020F0302020204030204" pitchFamily="34" charset="0"/>
                       <a:sym typeface="Source Sans Pro Light"/>
                     </a:rPr>
                     <a:t>  (where </a:t>
@@ -3570,25 +3570,25 @@
                     <a:rPr lang="en-US" sz="900" dirty="0" smtClean="0">
                       <a:latin typeface="Symbol" panose="05050102010706020507" pitchFamily="18" charset="2"/>
                       <a:ea typeface="Source Sans Pro Light"/>
-                      <a:cs typeface="Source Sans Pro Light"/>
+                      <a:cs typeface="Calibri Light" panose="020F0302020204030204" pitchFamily="34" charset="0"/>
                       <a:sym typeface="Source Sans Pro Light"/>
                     </a:rPr>
                     <a:t>m</a:t>
                   </a:r>
                   <a:r>
                     <a:rPr lang="en-US" sz="900" baseline="-25000" dirty="0" smtClean="0">
-                      <a:latin typeface="Source Sans Pro Light"/>
-                      <a:ea typeface="Source Sans Pro Light"/>
-                      <a:cs typeface="Source Sans Pro Light"/>
+                      <a:latin typeface="Calibri Light" panose="020F0302020204030204" pitchFamily="34" charset="0"/>
+                      <a:ea typeface="Source Sans Pro Light"/>
+                      <a:cs typeface="Calibri Light" panose="020F0302020204030204" pitchFamily="34" charset="0"/>
                       <a:sym typeface="Source Sans Pro Light"/>
                     </a:rPr>
                     <a:t>0 </a:t>
                   </a:r>
                   <a:r>
                     <a:rPr lang="en-US" sz="900" dirty="0" smtClean="0">
-                      <a:latin typeface="Source Sans Pro Light"/>
-                      <a:ea typeface="Source Sans Pro Light"/>
-                      <a:cs typeface="Source Sans Pro Light"/>
+                      <a:latin typeface="Calibri Light" panose="020F0302020204030204" pitchFamily="34" charset="0"/>
+                      <a:ea typeface="Source Sans Pro Light"/>
+                      <a:cs typeface="Calibri Light" panose="020F0302020204030204" pitchFamily="34" charset="0"/>
                       <a:sym typeface="Source Sans Pro Light"/>
                     </a:rPr>
                     <a:t>= specific value)</a:t>
@@ -3606,9 +3606,9 @@
                     <a:defRPr sz="1800"/>
                   </a:pPr>
                   <a:endParaRPr lang="en-US" sz="500" dirty="0" smtClean="0">
-                    <a:latin typeface="Source Sans Pro Light"/>
+                    <a:latin typeface="Calibri Light" panose="020F0302020204030204" pitchFamily="34" charset="0"/>
                     <a:ea typeface="Source Sans Pro Light"/>
-                    <a:cs typeface="Source Sans Pro Light"/>
+                    <a:cs typeface="Calibri Light" panose="020F0302020204030204" pitchFamily="34" charset="0"/>
                     <a:sym typeface="Source Sans Pro Light"/>
                   </a:endParaRPr>
                 </a:p>
@@ -3625,9 +3625,9 @@
                   </a:pPr>
                   <a:r>
                     <a:rPr lang="en-US" sz="900" b="1" dirty="0" smtClean="0">
-                      <a:latin typeface="Source Sans Pro Light"/>
-                      <a:ea typeface="Source Sans Pro Light"/>
-                      <a:cs typeface="Source Sans Pro Light"/>
+                      <a:latin typeface="Calibri Light" panose="020F0302020204030204" pitchFamily="34" charset="0"/>
+                      <a:ea typeface="Source Sans Pro Light"/>
+                      <a:cs typeface="Calibri Light" panose="020F0302020204030204" pitchFamily="34" charset="0"/>
                       <a:sym typeface="Source Sans Pro Light"/>
                     </a:rPr>
                     <a:t>Statistic: </a:t>
@@ -3661,18 +3661,18 @@
                   </a14:m>
                   <a:r>
                     <a:rPr lang="en-US" sz="900" dirty="0" smtClean="0">
-                      <a:latin typeface="Source Sans Pro Light"/>
-                      <a:ea typeface="Source Sans Pro Light"/>
-                      <a:cs typeface="Source Sans Pro Light"/>
+                      <a:latin typeface="Calibri Light" panose="020F0302020204030204" pitchFamily="34" charset="0"/>
+                      <a:ea typeface="Source Sans Pro Light"/>
+                      <a:cs typeface="Calibri Light" panose="020F0302020204030204" pitchFamily="34" charset="0"/>
                       <a:sym typeface="Source Sans Pro Light"/>
                     </a:rPr>
                     <a:t>    </a:t>
                   </a:r>
                   <a:r>
                     <a:rPr lang="en-US" sz="900" b="1" dirty="0" smtClean="0">
-                      <a:latin typeface="Source Sans Pro Light"/>
-                      <a:ea typeface="Source Sans Pro Light"/>
-                      <a:cs typeface="Source Sans Pro Light"/>
+                      <a:latin typeface="Calibri Light" panose="020F0302020204030204" pitchFamily="34" charset="0"/>
+                      <a:ea typeface="Source Sans Pro Light"/>
+                      <a:cs typeface="Calibri Light" panose="020F0302020204030204" pitchFamily="34" charset="0"/>
                       <a:sym typeface="Source Sans Pro Light"/>
                     </a:rPr>
                     <a:t>Test Statistic: </a:t>
@@ -3843,27 +3843,27 @@
                   </a14:m>
                   <a:r>
                     <a:rPr lang="en-US" sz="900" dirty="0" smtClean="0">
-                      <a:latin typeface="Source Sans Pro Light"/>
-                      <a:ea typeface="Source Sans Pro Light"/>
-                      <a:cs typeface="Source Sans Pro Light"/>
+                      <a:latin typeface="Calibri Light" panose="020F0302020204030204" pitchFamily="34" charset="0"/>
+                      <a:ea typeface="Source Sans Pro Light"/>
+                      <a:cs typeface="Calibri Light" panose="020F0302020204030204" pitchFamily="34" charset="0"/>
                       <a:sym typeface="Source Sans Pro Light"/>
                     </a:rPr>
                     <a:t>     </a:t>
                   </a:r>
                   <a:r>
                     <a:rPr lang="en-US" sz="900" b="1" dirty="0" smtClean="0">
-                      <a:latin typeface="Source Sans Pro Light"/>
-                      <a:ea typeface="Source Sans Pro Light"/>
-                      <a:cs typeface="Source Sans Pro Light"/>
+                      <a:latin typeface="Calibri Light" panose="020F0302020204030204" pitchFamily="34" charset="0"/>
+                      <a:ea typeface="Source Sans Pro Light"/>
+                      <a:cs typeface="Calibri Light" panose="020F0302020204030204" pitchFamily="34" charset="0"/>
                       <a:sym typeface="Source Sans Pro Light"/>
                     </a:rPr>
                     <a:t>Conf. Region: </a:t>
                   </a:r>
                   <a:r>
                     <a:rPr lang="en-US" sz="500" b="1" dirty="0" smtClean="0">
-                      <a:latin typeface="Source Sans Pro Light"/>
-                      <a:ea typeface="Source Sans Pro Light"/>
-                      <a:cs typeface="Source Sans Pro Light"/>
+                      <a:latin typeface="Calibri Light" panose="020F0302020204030204" pitchFamily="34" charset="0"/>
+                      <a:ea typeface="Source Sans Pro Light"/>
+                      <a:cs typeface="Calibri Light" panose="020F0302020204030204" pitchFamily="34" charset="0"/>
                       <a:sym typeface="Source Sans Pro Light"/>
                     </a:rPr>
                     <a:t> </a:t>
@@ -3990,36 +3990,36 @@
                   </a14:m>
                   <a:r>
                     <a:rPr lang="en-US" sz="900" dirty="0" smtClean="0">
-                      <a:latin typeface="Source Sans Pro Light"/>
-                      <a:ea typeface="Source Sans Pro Light"/>
-                      <a:cs typeface="Source Sans Pro Light"/>
+                      <a:latin typeface="Calibri Light" panose="020F0302020204030204" pitchFamily="34" charset="0"/>
+                      <a:ea typeface="Source Sans Pro Light"/>
+                      <a:cs typeface="Calibri Light" panose="020F0302020204030204" pitchFamily="34" charset="0"/>
                       <a:sym typeface="Source Sans Pro Light"/>
                     </a:rPr>
                     <a:t>      </a:t>
                   </a:r>
                   <a:r>
                     <a:rPr lang="en-US" sz="900" b="1" dirty="0" smtClean="0">
-                      <a:latin typeface="Source Sans Pro Light"/>
-                      <a:ea typeface="Source Sans Pro Light"/>
-                      <a:cs typeface="Source Sans Pro Light"/>
+                      <a:latin typeface="Calibri Light" panose="020F0302020204030204" pitchFamily="34" charset="0"/>
+                      <a:ea typeface="Source Sans Pro Light"/>
+                      <a:cs typeface="Calibri Light" panose="020F0302020204030204" pitchFamily="34" charset="0"/>
                       <a:sym typeface="Source Sans Pro Light"/>
                     </a:rPr>
                     <a:t>df</a:t>
                   </a:r>
                   <a:r>
                     <a:rPr lang="en-US" sz="900" b="1" dirty="0">
-                      <a:latin typeface="Source Sans Pro Light"/>
-                      <a:ea typeface="Source Sans Pro Light"/>
-                      <a:cs typeface="Source Sans Pro Light"/>
+                      <a:latin typeface="Calibri Light" panose="020F0302020204030204" pitchFamily="34" charset="0"/>
+                      <a:ea typeface="Source Sans Pro Light"/>
+                      <a:cs typeface="Calibri Light" panose="020F0302020204030204" pitchFamily="34" charset="0"/>
                       <a:sym typeface="Source Sans Pro Light"/>
                     </a:rPr>
                     <a:t>:</a:t>
                   </a:r>
                   <a:r>
                     <a:rPr lang="en-US" sz="900" dirty="0" smtClean="0">
-                      <a:latin typeface="Source Sans Pro Light"/>
-                      <a:ea typeface="Source Sans Pro Light"/>
-                      <a:cs typeface="Source Sans Pro Light"/>
+                      <a:latin typeface="Calibri Light" panose="020F0302020204030204" pitchFamily="34" charset="0"/>
+                      <a:ea typeface="Source Sans Pro Light"/>
+                      <a:cs typeface="Calibri Light" panose="020F0302020204030204" pitchFamily="34" charset="0"/>
                       <a:sym typeface="Source Sans Pro Light"/>
                     </a:rPr>
                     <a:t> n-1</a:t>
@@ -4037,9 +4037,9 @@
                     <a:defRPr sz="1800"/>
                   </a:pPr>
                   <a:endParaRPr lang="en-US" sz="500" dirty="0">
-                    <a:latin typeface="Source Sans Pro Light"/>
+                    <a:latin typeface="Calibri Light" panose="020F0302020204030204" pitchFamily="34" charset="0"/>
                     <a:ea typeface="Source Sans Pro Light"/>
-                    <a:cs typeface="Source Sans Pro Light"/>
+                    <a:cs typeface="Calibri Light" panose="020F0302020204030204" pitchFamily="34" charset="0"/>
                     <a:sym typeface="Source Sans Pro Light"/>
                   </a:endParaRPr>
                 </a:p>
@@ -4056,18 +4056,18 @@
                   </a:pPr>
                   <a:r>
                     <a:rPr lang="en-US" sz="900" b="1" dirty="0" smtClean="0">
-                      <a:latin typeface="Source Sans Pro Light"/>
-                      <a:ea typeface="Source Sans Pro Light"/>
-                      <a:cs typeface="Source Sans Pro Light"/>
+                      <a:latin typeface="Calibri Light" panose="020F0302020204030204" pitchFamily="34" charset="0"/>
+                      <a:ea typeface="Source Sans Pro Light"/>
+                      <a:cs typeface="Calibri Light" panose="020F0302020204030204" pitchFamily="34" charset="0"/>
                       <a:sym typeface="Source Sans Pro Light"/>
                     </a:rPr>
                     <a:t>Assumptions: </a:t>
                   </a:r>
                   <a:r>
                     <a:rPr lang="en-US" sz="900" dirty="0" smtClean="0">
-                      <a:latin typeface="Source Sans Pro Light"/>
-                      <a:ea typeface="Source Sans Pro Light"/>
-                      <a:cs typeface="Source Sans Pro Light"/>
+                      <a:latin typeface="Calibri Light" panose="020F0302020204030204" pitchFamily="34" charset="0"/>
+                      <a:ea typeface="Source Sans Pro Light"/>
+                      <a:cs typeface="Calibri Light" panose="020F0302020204030204" pitchFamily="34" charset="0"/>
                       <a:sym typeface="Source Sans Pro Light"/>
                     </a:rPr>
                     <a:t>1) </a:t>
@@ -4076,34 +4076,34 @@
                     <a:rPr lang="en-US" sz="900" dirty="0" smtClean="0">
                       <a:latin typeface="Symbol" panose="05050102010706020507" pitchFamily="18" charset="2"/>
                       <a:ea typeface="Source Sans Pro Light"/>
-                      <a:cs typeface="Source Sans Pro Light"/>
+                      <a:cs typeface="Calibri Light" panose="020F0302020204030204" pitchFamily="34" charset="0"/>
                       <a:sym typeface="Source Sans Pro Light"/>
                     </a:rPr>
                     <a:t>s</a:t>
                   </a:r>
                   <a:r>
                     <a:rPr lang="en-US" sz="900" dirty="0" smtClean="0">
-                      <a:latin typeface="Source Sans Pro Light"/>
-                      <a:ea typeface="Source Sans Pro Light"/>
-                      <a:cs typeface="Source Sans Pro Light"/>
+                      <a:latin typeface="Calibri Light" panose="020F0302020204030204" pitchFamily="34" charset="0"/>
+                      <a:ea typeface="Source Sans Pro Light"/>
+                      <a:cs typeface="Calibri Light" panose="020F0302020204030204" pitchFamily="34" charset="0"/>
                       <a:sym typeface="Source Sans Pro Light"/>
                     </a:rPr>
                     <a:t> is </a:t>
                   </a:r>
                   <a:r>
                     <a:rPr lang="en-US" sz="900" dirty="0" err="1" smtClean="0">
-                      <a:latin typeface="Source Sans Pro Light"/>
-                      <a:ea typeface="Source Sans Pro Light"/>
-                      <a:cs typeface="Source Sans Pro Light"/>
+                      <a:latin typeface="Calibri Light" panose="020F0302020204030204" pitchFamily="34" charset="0"/>
+                      <a:ea typeface="Source Sans Pro Light"/>
+                      <a:cs typeface="Calibri Light" panose="020F0302020204030204" pitchFamily="34" charset="0"/>
                       <a:sym typeface="Source Sans Pro Light"/>
                     </a:rPr>
                     <a:t>UNknown</a:t>
                   </a:r>
                   <a:r>
                     <a:rPr lang="en-US" sz="900" dirty="0" smtClean="0">
-                      <a:latin typeface="Source Sans Pro Light"/>
-                      <a:ea typeface="Source Sans Pro Light"/>
-                      <a:cs typeface="Source Sans Pro Light"/>
+                      <a:latin typeface="Calibri Light" panose="020F0302020204030204" pitchFamily="34" charset="0"/>
+                      <a:ea typeface="Source Sans Pro Light"/>
+                      <a:cs typeface="Calibri Light" panose="020F0302020204030204" pitchFamily="34" charset="0"/>
                       <a:sym typeface="Source Sans Pro Light"/>
                     </a:rPr>
                     <a:t>,</a:t>
@@ -4121,55 +4121,73 @@
                     <a:defRPr sz="1800"/>
                   </a:pPr>
                   <a:r>
-                    <a:rPr lang="en-US" sz="900" dirty="0">
-                      <a:latin typeface="Source Sans Pro Light"/>
-                      <a:ea typeface="Source Sans Pro Light"/>
-                      <a:cs typeface="Source Sans Pro Light"/>
+                    <a:rPr lang="en-US" sz="900">
+                      <a:latin typeface="Calibri Light" panose="020F0302020204030204" pitchFamily="34" charset="0"/>
+                      <a:ea typeface="Source Sans Pro Light"/>
+                      <a:cs typeface="Calibri Light" panose="020F0302020204030204" pitchFamily="34" charset="0"/>
                       <a:sym typeface="Source Sans Pro Light"/>
                     </a:rPr>
                     <a:t> </a:t>
                   </a:r>
                   <a:r>
+                    <a:rPr lang="en-US" sz="900" smtClean="0">
+                      <a:latin typeface="Calibri Light" panose="020F0302020204030204" pitchFamily="34" charset="0"/>
+                      <a:ea typeface="Source Sans Pro Light"/>
+                      <a:cs typeface="Calibri Light" panose="020F0302020204030204" pitchFamily="34" charset="0"/>
+                      <a:sym typeface="Source Sans Pro Light"/>
+                    </a:rPr>
+                    <a:t>                        </a:t>
+                  </a:r>
+                  <a:r>
+                    <a:rPr lang="en-US" sz="900" smtClean="0">
+                      <a:latin typeface="Calibri Light" panose="020F0302020204030204" pitchFamily="34" charset="0"/>
+                      <a:ea typeface="Source Sans Pro Light"/>
+                      <a:cs typeface="Calibri Light" panose="020F0302020204030204" pitchFamily="34" charset="0"/>
+                      <a:sym typeface="Source Sans Pro Light"/>
+                    </a:rPr>
+                    <a:t>2</a:t>
+                  </a:r>
+                  <a:r>
                     <a:rPr lang="en-US" sz="900" dirty="0" smtClean="0">
-                      <a:latin typeface="Source Sans Pro Light"/>
-                      <a:ea typeface="Source Sans Pro Light"/>
-                      <a:cs typeface="Source Sans Pro Light"/>
-                      <a:sym typeface="Source Sans Pro Light"/>
-                    </a:rPr>
-                    <a:t>                              2) n</a:t>
+                      <a:latin typeface="Calibri Light" panose="020F0302020204030204" pitchFamily="34" charset="0"/>
+                      <a:ea typeface="Source Sans Pro Light"/>
+                      <a:cs typeface="Calibri Light" panose="020F0302020204030204" pitchFamily="34" charset="0"/>
+                      <a:sym typeface="Source Sans Pro Light"/>
+                    </a:rPr>
+                    <a:t>) n</a:t>
                   </a:r>
                   <a:r>
                     <a:rPr lang="en-US" sz="900" u="sng" dirty="0" smtClean="0">
-                      <a:latin typeface="Source Sans Pro Light"/>
-                      <a:ea typeface="Source Sans Pro Light"/>
-                      <a:cs typeface="Source Sans Pro Light"/>
+                      <a:latin typeface="Calibri Light" panose="020F0302020204030204" pitchFamily="34" charset="0"/>
+                      <a:ea typeface="Source Sans Pro Light"/>
+                      <a:cs typeface="Calibri Light" panose="020F0302020204030204" pitchFamily="34" charset="0"/>
                       <a:sym typeface="Source Sans Pro Light"/>
                     </a:rPr>
                     <a:t>&gt;</a:t>
                   </a:r>
                   <a:r>
                     <a:rPr lang="en-US" sz="900" dirty="0" smtClean="0">
-                      <a:latin typeface="Source Sans Pro Light"/>
-                      <a:ea typeface="Source Sans Pro Light"/>
-                      <a:cs typeface="Source Sans Pro Light"/>
+                      <a:latin typeface="Calibri Light" panose="020F0302020204030204" pitchFamily="34" charset="0"/>
+                      <a:ea typeface="Source Sans Pro Light"/>
+                      <a:cs typeface="Calibri Light" panose="020F0302020204030204" pitchFamily="34" charset="0"/>
                       <a:sym typeface="Source Sans Pro Light"/>
                     </a:rPr>
                     <a:t>40, n</a:t>
                   </a:r>
                   <a:r>
                     <a:rPr lang="en-US" sz="900" u="sng" dirty="0" smtClean="0">
-                      <a:latin typeface="Source Sans Pro Light"/>
-                      <a:ea typeface="Source Sans Pro Light"/>
-                      <a:cs typeface="Source Sans Pro Light"/>
+                      <a:latin typeface="Calibri Light" panose="020F0302020204030204" pitchFamily="34" charset="0"/>
+                      <a:ea typeface="Source Sans Pro Light"/>
+                      <a:cs typeface="Calibri Light" panose="020F0302020204030204" pitchFamily="34" charset="0"/>
                       <a:sym typeface="Source Sans Pro Light"/>
                     </a:rPr>
                     <a:t>&gt;</a:t>
                   </a:r>
                   <a:r>
                     <a:rPr lang="en-US" sz="900" dirty="0" smtClean="0">
-                      <a:latin typeface="Source Sans Pro Light"/>
-                      <a:ea typeface="Source Sans Pro Light"/>
-                      <a:cs typeface="Source Sans Pro Light"/>
+                      <a:latin typeface="Calibri Light" panose="020F0302020204030204" pitchFamily="34" charset="0"/>
+                      <a:ea typeface="Source Sans Pro Light"/>
+                      <a:cs typeface="Calibri Light" panose="020F0302020204030204" pitchFamily="34" charset="0"/>
                       <a:sym typeface="Source Sans Pro Light"/>
                     </a:rPr>
                     <a:t>15 &amp; histogram not strongly skewed, OR histogram is normal</a:t>
@@ -4187,9 +4205,9 @@
                     <a:defRPr sz="1800"/>
                   </a:pPr>
                   <a:endParaRPr lang="en-US" sz="500" dirty="0" smtClean="0">
-                    <a:latin typeface="Source Sans Pro Light"/>
+                    <a:latin typeface="Calibri Light" panose="020F0302020204030204" pitchFamily="34" charset="0"/>
                     <a:ea typeface="Source Sans Pro Light"/>
-                    <a:cs typeface="Source Sans Pro Light"/>
+                    <a:cs typeface="Calibri Light" panose="020F0302020204030204" pitchFamily="34" charset="0"/>
                     <a:sym typeface="Source Sans Pro Light"/>
                   </a:endParaRPr>
                 </a:p>
@@ -4206,9 +4224,9 @@
                   </a:pPr>
                   <a:r>
                     <a:rPr lang="en-US" sz="900" b="1" dirty="0">
-                      <a:latin typeface="Source Sans Pro Light"/>
-                      <a:ea typeface="Source Sans Pro Light"/>
-                      <a:cs typeface="Source Sans Pro Light"/>
+                      <a:latin typeface="Calibri Light" panose="020F0302020204030204" pitchFamily="34" charset="0"/>
+                      <a:ea typeface="Source Sans Pro Light"/>
+                      <a:cs typeface="Calibri Light" panose="020F0302020204030204" pitchFamily="34" charset="0"/>
                       <a:sym typeface="Source Sans Pro Light"/>
                     </a:rPr>
                     <a:t>R: </a:t>
@@ -4218,9 +4236,9 @@
                       <a:solidFill>
                         <a:srgbClr val="FF0000"/>
                       </a:solidFill>
-                      <a:latin typeface="Source Sans Pro Light"/>
-                      <a:ea typeface="Source Sans Pro Light"/>
-                      <a:cs typeface="Source Sans Pro Light"/>
+                      <a:latin typeface="Calibri Light" panose="020F0302020204030204" pitchFamily="34" charset="0"/>
+                      <a:ea typeface="Source Sans Pro Light"/>
+                      <a:cs typeface="Calibri Light" panose="020F0302020204030204" pitchFamily="34" charset="0"/>
                       <a:sym typeface="Source Sans Pro Light"/>
                     </a:rPr>
                     <a:t>t.test</a:t>
@@ -4230,9 +4248,9 @@
                       <a:solidFill>
                         <a:srgbClr val="FF0000"/>
                       </a:solidFill>
-                      <a:latin typeface="Source Sans Pro Light"/>
-                      <a:ea typeface="Source Sans Pro Light"/>
-                      <a:cs typeface="Source Sans Pro Light"/>
+                      <a:latin typeface="Calibri Light" panose="020F0302020204030204" pitchFamily="34" charset="0"/>
+                      <a:ea typeface="Source Sans Pro Light"/>
+                      <a:cs typeface="Calibri Light" panose="020F0302020204030204" pitchFamily="34" charset="0"/>
                       <a:sym typeface="Source Sans Pro Light"/>
                     </a:rPr>
                     <a:t>()</a:t>
@@ -4241,9 +4259,9 @@
                     <a:solidFill>
                       <a:srgbClr val="FF0000"/>
                     </a:solidFill>
-                    <a:latin typeface="Source Sans Pro Light"/>
+                    <a:latin typeface="Calibri Light" panose="020F0302020204030204" pitchFamily="34" charset="0"/>
                     <a:ea typeface="Source Sans Pro Light"/>
-                    <a:cs typeface="Source Sans Pro Light"/>
+                    <a:cs typeface="Calibri Light" panose="020F0302020204030204" pitchFamily="34" charset="0"/>
                     <a:sym typeface="Source Sans Pro Light"/>
                   </a:endParaRPr>
                 </a:p>
@@ -4318,7 +4336,7 @@
             </a:ln>
             <a:extLst>
               <a:ext uri="{C572A759-6A51-4108-AA02-DFA0A04FC94B}">
-                <ma14:wrappingTextBoxFlag xmlns:ma14="http://schemas.microsoft.com/office/mac/drawingml/2011/main" xmlns="" val="1"/>
+                <ma14:wrappingTextBoxFlag xmlns="" xmlns:ma14="http://schemas.microsoft.com/office/mac/drawingml/2011/main" val="1"/>
               </a:ext>
             </a:extLst>
           </p:spPr>
@@ -4336,9 +4354,9 @@
                       <a:lumMod val="10000"/>
                     </a:schemeClr>
                   </a:solidFill>
-                  <a:latin typeface="Source Sans Pro"/>
+                  <a:latin typeface="Calibri" panose="020F0502020204030204" pitchFamily="34" charset="0"/>
                   <a:ea typeface="Source Sans Pro"/>
-                  <a:cs typeface="Source Sans Pro"/>
+                  <a:cs typeface="Calibri" panose="020F0502020204030204" pitchFamily="34" charset="0"/>
                   <a:sym typeface="Source Sans Pro"/>
                 </a:rPr>
                 <a:t>1-Sample t-Test</a:t>
@@ -4349,9 +4367,9 @@
                     <a:lumMod val="10000"/>
                   </a:schemeClr>
                 </a:solidFill>
-                <a:latin typeface="Source Sans Pro"/>
+                <a:latin typeface="Calibri" panose="020F0502020204030204" pitchFamily="34" charset="0"/>
                 <a:ea typeface="Source Sans Pro"/>
-                <a:cs typeface="Source Sans Pro"/>
+                <a:cs typeface="Calibri" panose="020F0502020204030204" pitchFamily="34" charset="0"/>
                 <a:sym typeface="Source Sans Pro"/>
               </a:endParaRPr>
             </a:p>
@@ -4415,27 +4433,27 @@
                   </a:pPr>
                   <a:r>
                     <a:rPr lang="en-US" sz="900" b="1" dirty="0" smtClean="0">
-                      <a:latin typeface="Source Sans Pro Light"/>
-                      <a:ea typeface="Source Sans Pro Light"/>
-                      <a:cs typeface="Source Sans Pro Light"/>
+                      <a:latin typeface="Calibri Light" panose="020F0302020204030204" pitchFamily="34" charset="0"/>
+                      <a:ea typeface="Source Sans Pro Light"/>
+                      <a:cs typeface="Calibri Light" panose="020F0302020204030204" pitchFamily="34" charset="0"/>
                       <a:sym typeface="Source Sans Pro Light"/>
                     </a:rPr>
                     <a:t>H</a:t>
                   </a:r>
                   <a:r>
                     <a:rPr lang="en-US" sz="900" b="1" baseline="-25000" dirty="0" smtClean="0">
-                      <a:latin typeface="Source Sans Pro Light"/>
-                      <a:ea typeface="Source Sans Pro Light"/>
-                      <a:cs typeface="Source Sans Pro Light"/>
+                      <a:latin typeface="Calibri Light" panose="020F0302020204030204" pitchFamily="34" charset="0"/>
+                      <a:ea typeface="Source Sans Pro Light"/>
+                      <a:cs typeface="Calibri Light" panose="020F0302020204030204" pitchFamily="34" charset="0"/>
                       <a:sym typeface="Source Sans Pro Light"/>
                     </a:rPr>
                     <a:t>0</a:t>
                   </a:r>
                   <a:r>
                     <a:rPr lang="en-US" sz="900" b="1" dirty="0" smtClean="0">
-                      <a:latin typeface="Source Sans Pro Light"/>
-                      <a:ea typeface="Source Sans Pro Light"/>
-                      <a:cs typeface="Source Sans Pro Light"/>
+                      <a:latin typeface="Calibri Light" panose="020F0302020204030204" pitchFamily="34" charset="0"/>
+                      <a:ea typeface="Source Sans Pro Light"/>
+                      <a:cs typeface="Calibri Light" panose="020F0302020204030204" pitchFamily="34" charset="0"/>
                       <a:sym typeface="Source Sans Pro Light"/>
                     </a:rPr>
                     <a:t>: </a:t>
@@ -4444,25 +4462,25 @@
                     <a:rPr lang="en-US" sz="900" dirty="0" smtClean="0">
                       <a:latin typeface="Symbol" panose="05050102010706020507" pitchFamily="18" charset="2"/>
                       <a:ea typeface="Source Sans Pro Light"/>
-                      <a:cs typeface="Source Sans Pro Light"/>
+                      <a:cs typeface="Calibri Light" panose="020F0302020204030204" pitchFamily="34" charset="0"/>
                       <a:sym typeface="Source Sans Pro Light"/>
                     </a:rPr>
                     <a:t>m</a:t>
                   </a:r>
                   <a:r>
                     <a:rPr lang="en-US" sz="900" baseline="-25000" dirty="0" smtClean="0">
-                      <a:latin typeface="Source Sans Pro Light"/>
-                      <a:ea typeface="Source Sans Pro Light"/>
-                      <a:cs typeface="Source Sans Pro Light"/>
+                      <a:latin typeface="Calibri Light" panose="020F0302020204030204" pitchFamily="34" charset="0"/>
+                      <a:ea typeface="Source Sans Pro Light"/>
+                      <a:cs typeface="Calibri Light" panose="020F0302020204030204" pitchFamily="34" charset="0"/>
                       <a:sym typeface="Source Sans Pro Light"/>
                     </a:rPr>
                     <a:t>1</a:t>
                   </a:r>
                   <a:r>
                     <a:rPr lang="en-US" sz="900" dirty="0" smtClean="0">
-                      <a:latin typeface="Source Sans Pro Light"/>
-                      <a:ea typeface="Source Sans Pro Light"/>
-                      <a:cs typeface="Source Sans Pro Light"/>
+                      <a:latin typeface="Calibri Light" panose="020F0302020204030204" pitchFamily="34" charset="0"/>
+                      <a:ea typeface="Source Sans Pro Light"/>
+                      <a:cs typeface="Calibri Light" panose="020F0302020204030204" pitchFamily="34" charset="0"/>
                       <a:sym typeface="Source Sans Pro Light"/>
                     </a:rPr>
                     <a:t> = </a:t>
@@ -4471,43 +4489,43 @@
                     <a:rPr lang="en-US" sz="900" dirty="0" smtClean="0">
                       <a:latin typeface="Symbol" panose="05050102010706020507" pitchFamily="18" charset="2"/>
                       <a:ea typeface="Source Sans Pro Light"/>
-                      <a:cs typeface="Source Sans Pro Light"/>
+                      <a:cs typeface="Calibri Light" panose="020F0302020204030204" pitchFamily="34" charset="0"/>
                       <a:sym typeface="Source Sans Pro Light"/>
                     </a:rPr>
                     <a:t>m</a:t>
                   </a:r>
                   <a:r>
                     <a:rPr lang="en-US" sz="900" baseline="-25000" dirty="0" smtClean="0">
-                      <a:latin typeface="Source Sans Pro Light"/>
-                      <a:ea typeface="Source Sans Pro Light"/>
-                      <a:cs typeface="Source Sans Pro Light"/>
+                      <a:latin typeface="Calibri Light" panose="020F0302020204030204" pitchFamily="34" charset="0"/>
+                      <a:ea typeface="Source Sans Pro Light"/>
+                      <a:cs typeface="Calibri Light" panose="020F0302020204030204" pitchFamily="34" charset="0"/>
                       <a:sym typeface="Source Sans Pro Light"/>
                     </a:rPr>
                     <a:t>2</a:t>
                   </a:r>
                   <a:r>
                     <a:rPr lang="en-US" sz="900" dirty="0" smtClean="0">
-                      <a:latin typeface="Source Sans Pro Light"/>
-                      <a:ea typeface="Source Sans Pro Light"/>
-                      <a:cs typeface="Source Sans Pro Light"/>
+                      <a:latin typeface="Calibri Light" panose="020F0302020204030204" pitchFamily="34" charset="0"/>
+                      <a:ea typeface="Source Sans Pro Light"/>
+                      <a:cs typeface="Calibri Light" panose="020F0302020204030204" pitchFamily="34" charset="0"/>
                       <a:sym typeface="Source Sans Pro Light"/>
                     </a:rPr>
                     <a:t>          </a:t>
                   </a:r>
                   <a:r>
                     <a:rPr lang="en-US" sz="900" b="1" dirty="0" smtClean="0">
-                      <a:latin typeface="Source Sans Pro Light"/>
-                      <a:ea typeface="Source Sans Pro Light"/>
-                      <a:cs typeface="Source Sans Pro Light"/>
+                      <a:latin typeface="Calibri Light" panose="020F0302020204030204" pitchFamily="34" charset="0"/>
+                      <a:ea typeface="Source Sans Pro Light"/>
+                      <a:cs typeface="Calibri Light" panose="020F0302020204030204" pitchFamily="34" charset="0"/>
                       <a:sym typeface="Source Sans Pro Light"/>
                     </a:rPr>
                     <a:t>Statistic</a:t>
                   </a:r>
                   <a:r>
                     <a:rPr lang="en-US" sz="900" b="1" dirty="0">
-                      <a:latin typeface="Source Sans Pro Light"/>
-                      <a:ea typeface="Source Sans Pro Light"/>
-                      <a:cs typeface="Source Sans Pro Light"/>
+                      <a:latin typeface="Calibri Light" panose="020F0302020204030204" pitchFamily="34" charset="0"/>
+                      <a:ea typeface="Source Sans Pro Light"/>
+                      <a:cs typeface="Calibri Light" panose="020F0302020204030204" pitchFamily="34" charset="0"/>
                       <a:sym typeface="Source Sans Pro Light"/>
                     </a:rPr>
                     <a:t>: </a:t>
@@ -4612,9 +4630,9 @@
                     </m:oMath>
                   </a14:m>
                   <a:endParaRPr lang="en-US" sz="900" dirty="0" smtClean="0">
-                    <a:latin typeface="Source Sans Pro Light"/>
+                    <a:latin typeface="Calibri Light" panose="020F0302020204030204" pitchFamily="34" charset="0"/>
                     <a:ea typeface="Source Sans Pro Light"/>
-                    <a:cs typeface="Source Sans Pro Light"/>
+                    <a:cs typeface="Calibri Light" panose="020F0302020204030204" pitchFamily="34" charset="0"/>
                     <a:sym typeface="Source Sans Pro Light"/>
                   </a:endParaRPr>
                 </a:p>
@@ -4630,9 +4648,9 @@
                     <a:defRPr sz="1800"/>
                   </a:pPr>
                   <a:endParaRPr lang="en-US" sz="500" dirty="0" smtClean="0">
-                    <a:latin typeface="Source Sans Pro Light"/>
+                    <a:latin typeface="Calibri Light" panose="020F0302020204030204" pitchFamily="34" charset="0"/>
                     <a:ea typeface="Source Sans Pro Light"/>
-                    <a:cs typeface="Source Sans Pro Light"/>
+                    <a:cs typeface="Calibri Light" panose="020F0302020204030204" pitchFamily="34" charset="0"/>
                     <a:sym typeface="Source Sans Pro Light"/>
                   </a:endParaRPr>
                 </a:p>
@@ -4649,9 +4667,9 @@
                   </a:pPr>
                   <a:r>
                     <a:rPr lang="en-US" sz="900" b="1" dirty="0" smtClean="0">
-                      <a:latin typeface="Source Sans Pro Light"/>
-                      <a:ea typeface="Source Sans Pro Light"/>
-                      <a:cs typeface="Source Sans Pro Light"/>
+                      <a:latin typeface="Calibri Light" panose="020F0302020204030204" pitchFamily="34" charset="0"/>
+                      <a:ea typeface="Source Sans Pro Light"/>
+                      <a:cs typeface="Calibri Light" panose="020F0302020204030204" pitchFamily="34" charset="0"/>
                       <a:sym typeface="Source Sans Pro Light"/>
                     </a:rPr>
                     <a:t>Test Statistic: </a:t>
@@ -5006,9 +5024,9 @@
                   </a14:m>
                   <a:r>
                     <a:rPr lang="en-US" sz="900" dirty="0" smtClean="0">
-                      <a:latin typeface="Source Sans Pro Light"/>
-                      <a:ea typeface="Source Sans Pro Light"/>
-                      <a:cs typeface="Source Sans Pro Light"/>
+                      <a:latin typeface="Calibri Light" panose="020F0302020204030204" pitchFamily="34" charset="0"/>
+                      <a:ea typeface="Source Sans Pro Light"/>
+                      <a:cs typeface="Calibri Light" panose="020F0302020204030204" pitchFamily="34" charset="0"/>
                       <a:sym typeface="Source Sans Pro Light"/>
                     </a:rPr>
                     <a:t>   where </a:t>
@@ -5345,9 +5363,9 @@
                     </m:oMath>
                   </a14:m>
                   <a:endParaRPr lang="en-US" sz="900" dirty="0">
-                    <a:latin typeface="Source Sans Pro Light"/>
+                    <a:latin typeface="Calibri Light" panose="020F0302020204030204" pitchFamily="34" charset="0"/>
                     <a:ea typeface="Source Sans Pro Light"/>
-                    <a:cs typeface="Source Sans Pro Light"/>
+                    <a:cs typeface="Calibri Light" panose="020F0302020204030204" pitchFamily="34" charset="0"/>
                     <a:sym typeface="Source Sans Pro Light"/>
                   </a:endParaRPr>
                 </a:p>
@@ -5363,9 +5381,9 @@
                     <a:defRPr sz="1800"/>
                   </a:pPr>
                   <a:endParaRPr lang="en-US" sz="500" dirty="0">
-                    <a:latin typeface="Source Sans Pro Light"/>
+                    <a:latin typeface="Calibri Light" panose="020F0302020204030204" pitchFamily="34" charset="0"/>
                     <a:ea typeface="Source Sans Pro Light"/>
-                    <a:cs typeface="Source Sans Pro Light"/>
+                    <a:cs typeface="Calibri Light" panose="020F0302020204030204" pitchFamily="34" charset="0"/>
                     <a:sym typeface="Source Sans Pro Light"/>
                   </a:endParaRPr>
                 </a:p>
@@ -5382,9 +5400,9 @@
                   </a:pPr>
                   <a:r>
                     <a:rPr lang="en-US" sz="900" b="1" dirty="0" smtClean="0">
-                      <a:latin typeface="Source Sans Pro Light"/>
-                      <a:ea typeface="Source Sans Pro Light"/>
-                      <a:cs typeface="Source Sans Pro Light"/>
+                      <a:latin typeface="Calibri Light" panose="020F0302020204030204" pitchFamily="34" charset="0"/>
+                      <a:ea typeface="Source Sans Pro Light"/>
+                      <a:cs typeface="Calibri Light" panose="020F0302020204030204" pitchFamily="34" charset="0"/>
                       <a:sym typeface="Source Sans Pro Light"/>
                     </a:rPr>
                     <a:t>Conf. Region:</a:t>
@@ -5730,98 +5748,98 @@
                   </a14:m>
                   <a:r>
                     <a:rPr lang="en-US" sz="1200" dirty="0" smtClean="0">
-                      <a:latin typeface="Source Sans Pro Light"/>
-                      <a:ea typeface="Source Sans Pro Light"/>
-                      <a:cs typeface="Source Sans Pro Light"/>
+                      <a:latin typeface="Calibri Light" panose="020F0302020204030204" pitchFamily="34" charset="0"/>
+                      <a:ea typeface="Source Sans Pro Light"/>
+                      <a:cs typeface="Calibri Light" panose="020F0302020204030204" pitchFamily="34" charset="0"/>
                       <a:sym typeface="Source Sans Pro Light"/>
                     </a:rPr>
                     <a:t>    	</a:t>
                   </a:r>
                   <a:r>
                     <a:rPr lang="en-US" sz="900" b="1" dirty="0" err="1" smtClean="0">
-                      <a:latin typeface="Source Sans Pro Light"/>
-                      <a:ea typeface="Source Sans Pro Light"/>
-                      <a:cs typeface="Source Sans Pro Light"/>
+                      <a:latin typeface="Calibri Light" panose="020F0302020204030204" pitchFamily="34" charset="0"/>
+                      <a:ea typeface="Source Sans Pro Light"/>
+                      <a:cs typeface="Calibri Light" panose="020F0302020204030204" pitchFamily="34" charset="0"/>
                       <a:sym typeface="Source Sans Pro Light"/>
                     </a:rPr>
                     <a:t>df</a:t>
                   </a:r>
                   <a:r>
                     <a:rPr lang="en-US" sz="900" b="1" dirty="0" smtClean="0">
-                      <a:latin typeface="Source Sans Pro Light"/>
-                      <a:ea typeface="Source Sans Pro Light"/>
-                      <a:cs typeface="Source Sans Pro Light"/>
+                      <a:latin typeface="Calibri Light" panose="020F0302020204030204" pitchFamily="34" charset="0"/>
+                      <a:ea typeface="Source Sans Pro Light"/>
+                      <a:cs typeface="Calibri Light" panose="020F0302020204030204" pitchFamily="34" charset="0"/>
                       <a:sym typeface="Source Sans Pro Light"/>
                     </a:rPr>
                     <a:t>:</a:t>
                   </a:r>
                   <a:r>
                     <a:rPr lang="en-US" sz="900" dirty="0" smtClean="0">
-                      <a:latin typeface="Source Sans Pro Light"/>
-                      <a:ea typeface="Source Sans Pro Light"/>
-                      <a:cs typeface="Source Sans Pro Light"/>
+                      <a:latin typeface="Calibri Light" panose="020F0302020204030204" pitchFamily="34" charset="0"/>
+                      <a:ea typeface="Source Sans Pro Light"/>
+                      <a:cs typeface="Calibri Light" panose="020F0302020204030204" pitchFamily="34" charset="0"/>
                       <a:sym typeface="Source Sans Pro Light"/>
                     </a:rPr>
                     <a:t> </a:t>
                   </a:r>
                   <a:r>
                     <a:rPr lang="en-US" sz="900" dirty="0">
-                      <a:latin typeface="Source Sans Pro Light"/>
-                      <a:ea typeface="Source Sans Pro Light"/>
-                      <a:cs typeface="Source Sans Pro Light"/>
+                      <a:latin typeface="Calibri Light" panose="020F0302020204030204" pitchFamily="34" charset="0"/>
+                      <a:ea typeface="Source Sans Pro Light"/>
+                      <a:cs typeface="Calibri Light" panose="020F0302020204030204" pitchFamily="34" charset="0"/>
                       <a:sym typeface="Source Sans Pro Light"/>
                     </a:rPr>
                     <a:t>n</a:t>
                   </a:r>
                   <a:r>
                     <a:rPr lang="en-US" sz="900" baseline="-25000" dirty="0">
-                      <a:latin typeface="Source Sans Pro Light"/>
-                      <a:ea typeface="Source Sans Pro Light"/>
-                      <a:cs typeface="Source Sans Pro Light"/>
+                      <a:latin typeface="Calibri Light" panose="020F0302020204030204" pitchFamily="34" charset="0"/>
+                      <a:ea typeface="Source Sans Pro Light"/>
+                      <a:cs typeface="Calibri Light" panose="020F0302020204030204" pitchFamily="34" charset="0"/>
                       <a:sym typeface="Source Sans Pro Light"/>
                     </a:rPr>
                     <a:t>1 </a:t>
                   </a:r>
                   <a:r>
                     <a:rPr lang="en-US" sz="900" dirty="0">
-                      <a:latin typeface="Source Sans Pro Light"/>
-                      <a:ea typeface="Source Sans Pro Light"/>
-                      <a:cs typeface="Source Sans Pro Light"/>
+                      <a:latin typeface="Calibri Light" panose="020F0302020204030204" pitchFamily="34" charset="0"/>
+                      <a:ea typeface="Source Sans Pro Light"/>
+                      <a:cs typeface="Calibri Light" panose="020F0302020204030204" pitchFamily="34" charset="0"/>
                       <a:sym typeface="Source Sans Pro Light"/>
                     </a:rPr>
                     <a:t>+ n</a:t>
                   </a:r>
                   <a:r>
                     <a:rPr lang="en-US" sz="900" baseline="-25000" dirty="0">
-                      <a:latin typeface="Source Sans Pro Light"/>
-                      <a:ea typeface="Source Sans Pro Light"/>
-                      <a:cs typeface="Source Sans Pro Light"/>
+                      <a:latin typeface="Calibri Light" panose="020F0302020204030204" pitchFamily="34" charset="0"/>
+                      <a:ea typeface="Source Sans Pro Light"/>
+                      <a:cs typeface="Calibri Light" panose="020F0302020204030204" pitchFamily="34" charset="0"/>
                       <a:sym typeface="Source Sans Pro Light"/>
                     </a:rPr>
                     <a:t>2 </a:t>
                   </a:r>
                   <a:r>
                     <a:rPr lang="en-US" sz="900" dirty="0">
-                      <a:latin typeface="Source Sans Pro Light"/>
-                      <a:ea typeface="Source Sans Pro Light"/>
-                      <a:cs typeface="Source Sans Pro Light"/>
+                      <a:latin typeface="Calibri Light" panose="020F0302020204030204" pitchFamily="34" charset="0"/>
+                      <a:ea typeface="Source Sans Pro Light"/>
+                      <a:cs typeface="Calibri Light" panose="020F0302020204030204" pitchFamily="34" charset="0"/>
                       <a:sym typeface="Source Sans Pro Light"/>
                     </a:rPr>
                     <a:t>– </a:t>
                   </a:r>
                   <a:r>
                     <a:rPr lang="en-US" sz="900" dirty="0" smtClean="0">
-                      <a:latin typeface="Source Sans Pro Light"/>
-                      <a:ea typeface="Source Sans Pro Light"/>
-                      <a:cs typeface="Source Sans Pro Light"/>
+                      <a:latin typeface="Calibri Light" panose="020F0302020204030204" pitchFamily="34" charset="0"/>
+                      <a:ea typeface="Source Sans Pro Light"/>
+                      <a:cs typeface="Calibri Light" panose="020F0302020204030204" pitchFamily="34" charset="0"/>
                       <a:sym typeface="Source Sans Pro Light"/>
                     </a:rPr>
                     <a:t>2</a:t>
                   </a:r>
                   <a:endParaRPr lang="en-US" sz="900" dirty="0">
-                    <a:latin typeface="Source Sans Pro Light"/>
+                    <a:latin typeface="Calibri Light" panose="020F0302020204030204" pitchFamily="34" charset="0"/>
                     <a:ea typeface="Source Sans Pro Light"/>
-                    <a:cs typeface="Source Sans Pro Light"/>
+                    <a:cs typeface="Calibri Light" panose="020F0302020204030204" pitchFamily="34" charset="0"/>
                     <a:sym typeface="Source Sans Pro Light"/>
                   </a:endParaRPr>
                 </a:p>
@@ -5838,9 +5856,9 @@
                   </a:pPr>
                   <a:r>
                     <a:rPr lang="en-US" sz="900" b="1" dirty="0" smtClean="0">
-                      <a:latin typeface="Source Sans Pro Light"/>
-                      <a:ea typeface="Source Sans Pro Light"/>
-                      <a:cs typeface="Source Sans Pro Light"/>
+                      <a:latin typeface="Calibri Light" panose="020F0302020204030204" pitchFamily="34" charset="0"/>
+                      <a:ea typeface="Source Sans Pro Light"/>
+                      <a:cs typeface="Calibri Light" panose="020F0302020204030204" pitchFamily="34" charset="0"/>
                       <a:sym typeface="Source Sans Pro Light"/>
                     </a:rPr>
                     <a:t>Assumptions:</a:t>
@@ -5859,27 +5877,27 @@
                   </a:pPr>
                   <a:r>
                     <a:rPr lang="en-US" sz="900" b="1" dirty="0">
-                      <a:latin typeface="Source Sans Pro Light"/>
-                      <a:ea typeface="Source Sans Pro Light"/>
-                      <a:cs typeface="Source Sans Pro Light"/>
+                      <a:latin typeface="Calibri Light" panose="020F0302020204030204" pitchFamily="34" charset="0"/>
+                      <a:ea typeface="Source Sans Pro Light"/>
+                      <a:cs typeface="Calibri Light" panose="020F0302020204030204" pitchFamily="34" charset="0"/>
                       <a:sym typeface="Source Sans Pro Light"/>
                     </a:rPr>
                     <a:t> </a:t>
                   </a:r>
                   <a:r>
                     <a:rPr lang="en-US" sz="900" b="1" dirty="0" smtClean="0">
-                      <a:latin typeface="Source Sans Pro Light"/>
-                      <a:ea typeface="Source Sans Pro Light"/>
-                      <a:cs typeface="Source Sans Pro Light"/>
+                      <a:latin typeface="Calibri Light" panose="020F0302020204030204" pitchFamily="34" charset="0"/>
+                      <a:ea typeface="Source Sans Pro Light"/>
+                      <a:cs typeface="Calibri Light" panose="020F0302020204030204" pitchFamily="34" charset="0"/>
                       <a:sym typeface="Source Sans Pro Light"/>
                     </a:rPr>
                     <a:t> </a:t>
                   </a:r>
                   <a:r>
                     <a:rPr lang="en-US" sz="900" dirty="0" smtClean="0">
-                      <a:latin typeface="Source Sans Pro Light"/>
-                      <a:ea typeface="Source Sans Pro Light"/>
-                      <a:cs typeface="Source Sans Pro Light"/>
+                      <a:latin typeface="Calibri Light" panose="020F0302020204030204" pitchFamily="34" charset="0"/>
+                      <a:ea typeface="Source Sans Pro Light"/>
+                      <a:cs typeface="Calibri Light" panose="020F0302020204030204" pitchFamily="34" charset="0"/>
                       <a:sym typeface="Source Sans Pro Light"/>
                     </a:rPr>
                     <a:t>1) Individuals in groups are independent</a:t>
@@ -5898,108 +5916,108 @@
                   </a:pPr>
                   <a:r>
                     <a:rPr lang="en-US" sz="900" dirty="0" smtClean="0">
-                      <a:latin typeface="Source Sans Pro Light"/>
-                      <a:ea typeface="Source Sans Pro Light"/>
-                      <a:cs typeface="Source Sans Pro Light"/>
+                      <a:latin typeface="Calibri Light" panose="020F0302020204030204" pitchFamily="34" charset="0"/>
+                      <a:ea typeface="Source Sans Pro Light"/>
+                      <a:cs typeface="Calibri Light" panose="020F0302020204030204" pitchFamily="34" charset="0"/>
                       <a:sym typeface="Source Sans Pro Light"/>
                     </a:rPr>
                     <a:t>  2) </a:t>
                   </a:r>
                   <a:r>
                     <a:rPr lang="en-US" sz="900" dirty="0">
-                      <a:latin typeface="Source Sans Pro Light"/>
-                      <a:ea typeface="Source Sans Pro Light"/>
-                      <a:cs typeface="Source Sans Pro Light"/>
+                      <a:latin typeface="Calibri Light" panose="020F0302020204030204" pitchFamily="34" charset="0"/>
+                      <a:ea typeface="Source Sans Pro Light"/>
+                      <a:cs typeface="Calibri Light" panose="020F0302020204030204" pitchFamily="34" charset="0"/>
                       <a:sym typeface="Source Sans Pro Light"/>
                     </a:rPr>
                     <a:t>n</a:t>
                   </a:r>
                   <a:r>
                     <a:rPr lang="en-US" sz="900" baseline="-25000" dirty="0">
-                      <a:latin typeface="Source Sans Pro Light"/>
-                      <a:ea typeface="Source Sans Pro Light"/>
-                      <a:cs typeface="Source Sans Pro Light"/>
+                      <a:latin typeface="Calibri Light" panose="020F0302020204030204" pitchFamily="34" charset="0"/>
+                      <a:ea typeface="Source Sans Pro Light"/>
+                      <a:cs typeface="Calibri Light" panose="020F0302020204030204" pitchFamily="34" charset="0"/>
                       <a:sym typeface="Source Sans Pro Light"/>
                     </a:rPr>
                     <a:t>1</a:t>
                   </a:r>
                   <a:r>
                     <a:rPr lang="en-US" sz="900" dirty="0">
-                      <a:latin typeface="Source Sans Pro Light"/>
-                      <a:ea typeface="Source Sans Pro Light"/>
-                      <a:cs typeface="Source Sans Pro Light"/>
+                      <a:latin typeface="Calibri Light" panose="020F0302020204030204" pitchFamily="34" charset="0"/>
+                      <a:ea typeface="Source Sans Pro Light"/>
+                      <a:cs typeface="Calibri Light" panose="020F0302020204030204" pitchFamily="34" charset="0"/>
                       <a:sym typeface="Source Sans Pro Light"/>
                     </a:rPr>
                     <a:t>+n</a:t>
                   </a:r>
                   <a:r>
                     <a:rPr lang="en-US" sz="900" baseline="-25000" dirty="0">
-                      <a:latin typeface="Source Sans Pro Light"/>
-                      <a:ea typeface="Source Sans Pro Light"/>
-                      <a:cs typeface="Source Sans Pro Light"/>
+                      <a:latin typeface="Calibri Light" panose="020F0302020204030204" pitchFamily="34" charset="0"/>
+                      <a:ea typeface="Source Sans Pro Light"/>
+                      <a:cs typeface="Calibri Light" panose="020F0302020204030204" pitchFamily="34" charset="0"/>
                       <a:sym typeface="Source Sans Pro Light"/>
                     </a:rPr>
                     <a:t>2 </a:t>
                   </a:r>
                   <a:r>
                     <a:rPr lang="en-US" sz="900" u="sng" dirty="0">
-                      <a:latin typeface="Source Sans Pro Light"/>
-                      <a:ea typeface="Source Sans Pro Light"/>
-                      <a:cs typeface="Source Sans Pro Light"/>
+                      <a:latin typeface="Calibri Light" panose="020F0302020204030204" pitchFamily="34" charset="0"/>
+                      <a:ea typeface="Source Sans Pro Light"/>
+                      <a:cs typeface="Calibri Light" panose="020F0302020204030204" pitchFamily="34" charset="0"/>
                       <a:sym typeface="Source Sans Pro Light"/>
                     </a:rPr>
                     <a:t>&gt;</a:t>
                   </a:r>
                   <a:r>
                     <a:rPr lang="en-US" sz="900" dirty="0">
-                      <a:latin typeface="Source Sans Pro Light"/>
-                      <a:ea typeface="Source Sans Pro Light"/>
-                      <a:cs typeface="Source Sans Pro Light"/>
+                      <a:latin typeface="Calibri Light" panose="020F0302020204030204" pitchFamily="34" charset="0"/>
+                      <a:ea typeface="Source Sans Pro Light"/>
+                      <a:cs typeface="Calibri Light" panose="020F0302020204030204" pitchFamily="34" charset="0"/>
                       <a:sym typeface="Source Sans Pro Light"/>
                     </a:rPr>
                     <a:t>40, n</a:t>
                   </a:r>
                   <a:r>
                     <a:rPr lang="en-US" sz="900" baseline="-25000" dirty="0">
-                      <a:latin typeface="Source Sans Pro Light"/>
-                      <a:ea typeface="Source Sans Pro Light"/>
-                      <a:cs typeface="Source Sans Pro Light"/>
+                      <a:latin typeface="Calibri Light" panose="020F0302020204030204" pitchFamily="34" charset="0"/>
+                      <a:ea typeface="Source Sans Pro Light"/>
+                      <a:cs typeface="Calibri Light" panose="020F0302020204030204" pitchFamily="34" charset="0"/>
                       <a:sym typeface="Source Sans Pro Light"/>
                     </a:rPr>
                     <a:t>1</a:t>
                   </a:r>
                   <a:r>
                     <a:rPr lang="en-US" sz="900" dirty="0">
-                      <a:latin typeface="Source Sans Pro Light"/>
-                      <a:ea typeface="Source Sans Pro Light"/>
-                      <a:cs typeface="Source Sans Pro Light"/>
+                      <a:latin typeface="Calibri Light" panose="020F0302020204030204" pitchFamily="34" charset="0"/>
+                      <a:ea typeface="Source Sans Pro Light"/>
+                      <a:cs typeface="Calibri Light" panose="020F0302020204030204" pitchFamily="34" charset="0"/>
                       <a:sym typeface="Source Sans Pro Light"/>
                     </a:rPr>
                     <a:t>+n</a:t>
                   </a:r>
                   <a:r>
                     <a:rPr lang="en-US" sz="900" baseline="-25000" dirty="0">
-                      <a:latin typeface="Source Sans Pro Light"/>
-                      <a:ea typeface="Source Sans Pro Light"/>
-                      <a:cs typeface="Source Sans Pro Light"/>
+                      <a:latin typeface="Calibri Light" panose="020F0302020204030204" pitchFamily="34" charset="0"/>
+                      <a:ea typeface="Source Sans Pro Light"/>
+                      <a:cs typeface="Calibri Light" panose="020F0302020204030204" pitchFamily="34" charset="0"/>
                       <a:sym typeface="Source Sans Pro Light"/>
                     </a:rPr>
                     <a:t>2 </a:t>
                   </a:r>
                   <a:r>
                     <a:rPr lang="en-US" sz="900" u="sng" dirty="0">
-                      <a:latin typeface="Source Sans Pro Light"/>
-                      <a:ea typeface="Source Sans Pro Light"/>
-                      <a:cs typeface="Source Sans Pro Light"/>
+                      <a:latin typeface="Calibri Light" panose="020F0302020204030204" pitchFamily="34" charset="0"/>
+                      <a:ea typeface="Source Sans Pro Light"/>
+                      <a:cs typeface="Calibri Light" panose="020F0302020204030204" pitchFamily="34" charset="0"/>
                       <a:sym typeface="Source Sans Pro Light"/>
                     </a:rPr>
                     <a:t>&gt;</a:t>
                   </a:r>
                   <a:r>
                     <a:rPr lang="en-US" sz="900" dirty="0">
-                      <a:latin typeface="Source Sans Pro Light"/>
-                      <a:ea typeface="Source Sans Pro Light"/>
-                      <a:cs typeface="Source Sans Pro Light"/>
+                      <a:latin typeface="Calibri Light" panose="020F0302020204030204" pitchFamily="34" charset="0"/>
+                      <a:ea typeface="Source Sans Pro Light"/>
+                      <a:cs typeface="Calibri Light" panose="020F0302020204030204" pitchFamily="34" charset="0"/>
                       <a:sym typeface="Source Sans Pro Light"/>
                     </a:rPr>
                     <a:t>15 and both histograms are not strongly skewed, OR</a:t>
@@ -6018,18 +6036,18 @@
                   </a:pPr>
                   <a:r>
                     <a:rPr lang="en-US" sz="900" dirty="0">
-                      <a:latin typeface="Source Sans Pro Light"/>
-                      <a:ea typeface="Source Sans Pro Light"/>
-                      <a:cs typeface="Source Sans Pro Light"/>
+                      <a:latin typeface="Calibri Light" panose="020F0302020204030204" pitchFamily="34" charset="0"/>
+                      <a:ea typeface="Source Sans Pro Light"/>
+                      <a:cs typeface="Calibri Light" panose="020F0302020204030204" pitchFamily="34" charset="0"/>
                       <a:sym typeface="Source Sans Pro Light"/>
                     </a:rPr>
                     <a:t>              both histograms are </a:t>
                   </a:r>
                   <a:r>
                     <a:rPr lang="en-US" sz="900" dirty="0" smtClean="0">
-                      <a:latin typeface="Source Sans Pro Light"/>
-                      <a:ea typeface="Source Sans Pro Light"/>
-                      <a:cs typeface="Source Sans Pro Light"/>
+                      <a:latin typeface="Calibri Light" panose="020F0302020204030204" pitchFamily="34" charset="0"/>
+                      <a:ea typeface="Source Sans Pro Light"/>
+                      <a:cs typeface="Calibri Light" panose="020F0302020204030204" pitchFamily="34" charset="0"/>
                       <a:sym typeface="Source Sans Pro Light"/>
                     </a:rPr>
                     <a:t>normal</a:t>
@@ -6048,45 +6066,45 @@
                   </a:pPr>
                   <a:r>
                     <a:rPr lang="en-US" sz="900" dirty="0" smtClean="0">
-                      <a:latin typeface="Source Sans Pro Light"/>
-                      <a:ea typeface="Source Sans Pro Light"/>
-                      <a:cs typeface="Source Sans Pro Light"/>
+                      <a:latin typeface="Calibri Light" panose="020F0302020204030204" pitchFamily="34" charset="0"/>
+                      <a:ea typeface="Source Sans Pro Light"/>
+                      <a:cs typeface="Calibri Light" panose="020F0302020204030204" pitchFamily="34" charset="0"/>
                       <a:sym typeface="Source Sans Pro Light"/>
                     </a:rPr>
                     <a:t>  </a:t>
                   </a:r>
                   <a:r>
                     <a:rPr lang="en-US" sz="900" dirty="0">
-                      <a:latin typeface="Source Sans Pro Light"/>
-                      <a:ea typeface="Source Sans Pro Light"/>
-                      <a:cs typeface="Source Sans Pro Light"/>
+                      <a:latin typeface="Calibri Light" panose="020F0302020204030204" pitchFamily="34" charset="0"/>
+                      <a:ea typeface="Source Sans Pro Light"/>
+                      <a:cs typeface="Calibri Light" panose="020F0302020204030204" pitchFamily="34" charset="0"/>
                       <a:sym typeface="Source Sans Pro Light"/>
                     </a:rPr>
                     <a:t>3</a:t>
                   </a:r>
                   <a:r>
                     <a:rPr lang="en-US" sz="900" dirty="0" smtClean="0">
-                      <a:latin typeface="Source Sans Pro Light"/>
-                      <a:ea typeface="Source Sans Pro Light"/>
-                      <a:cs typeface="Source Sans Pro Light"/>
+                      <a:latin typeface="Calibri Light" panose="020F0302020204030204" pitchFamily="34" charset="0"/>
+                      <a:ea typeface="Source Sans Pro Light"/>
+                      <a:cs typeface="Calibri Light" panose="020F0302020204030204" pitchFamily="34" charset="0"/>
                       <a:sym typeface="Source Sans Pro Light"/>
                     </a:rPr>
                     <a:t>) Group population variances are equal (use </a:t>
                   </a:r>
                   <a:r>
                     <a:rPr lang="en-US" sz="900" dirty="0" err="1" smtClean="0">
-                      <a:latin typeface="Source Sans Pro Light"/>
-                      <a:ea typeface="Source Sans Pro Light"/>
-                      <a:cs typeface="Source Sans Pro Light"/>
+                      <a:latin typeface="Calibri Light" panose="020F0302020204030204" pitchFamily="34" charset="0"/>
+                      <a:ea typeface="Source Sans Pro Light"/>
+                      <a:cs typeface="Calibri Light" panose="020F0302020204030204" pitchFamily="34" charset="0"/>
                       <a:sym typeface="Source Sans Pro Light"/>
                     </a:rPr>
                     <a:t>Levene’s</a:t>
                   </a:r>
                   <a:r>
                     <a:rPr lang="en-US" sz="900" dirty="0" smtClean="0">
-                      <a:latin typeface="Source Sans Pro Light"/>
-                      <a:ea typeface="Source Sans Pro Light"/>
-                      <a:cs typeface="Source Sans Pro Light"/>
+                      <a:latin typeface="Calibri Light" panose="020F0302020204030204" pitchFamily="34" charset="0"/>
+                      <a:ea typeface="Source Sans Pro Light"/>
+                      <a:cs typeface="Calibri Light" panose="020F0302020204030204" pitchFamily="34" charset="0"/>
                       <a:sym typeface="Source Sans Pro Light"/>
                     </a:rPr>
                     <a:t> Test)</a:t>
@@ -6104,9 +6122,9 @@
                     <a:defRPr sz="1800"/>
                   </a:pPr>
                   <a:endParaRPr lang="en-US" sz="500" dirty="0">
-                    <a:latin typeface="Source Sans Pro Light"/>
+                    <a:latin typeface="Calibri Light" panose="020F0302020204030204" pitchFamily="34" charset="0"/>
                     <a:ea typeface="Source Sans Pro Light"/>
-                    <a:cs typeface="Source Sans Pro Light"/>
+                    <a:cs typeface="Calibri Light" panose="020F0302020204030204" pitchFamily="34" charset="0"/>
                     <a:sym typeface="Source Sans Pro Light"/>
                   </a:endParaRPr>
                 </a:p>
@@ -6123,9 +6141,9 @@
                   </a:pPr>
                   <a:r>
                     <a:rPr lang="en-US" sz="900" b="1" dirty="0">
-                      <a:latin typeface="Source Sans Pro Light"/>
-                      <a:ea typeface="Source Sans Pro Light"/>
-                      <a:cs typeface="Source Sans Pro Light"/>
+                      <a:latin typeface="Calibri Light" panose="020F0302020204030204" pitchFamily="34" charset="0"/>
+                      <a:ea typeface="Source Sans Pro Light"/>
+                      <a:cs typeface="Calibri Light" panose="020F0302020204030204" pitchFamily="34" charset="0"/>
                       <a:sym typeface="Source Sans Pro Light"/>
                     </a:rPr>
                     <a:t>R: </a:t>
@@ -6135,9 +6153,9 @@
                       <a:solidFill>
                         <a:srgbClr val="FF0000"/>
                       </a:solidFill>
-                      <a:latin typeface="Source Sans Pro Light"/>
-                      <a:ea typeface="Source Sans Pro Light"/>
-                      <a:cs typeface="Source Sans Pro Light"/>
+                      <a:latin typeface="Calibri Light" panose="020F0302020204030204" pitchFamily="34" charset="0"/>
+                      <a:ea typeface="Source Sans Pro Light"/>
+                      <a:cs typeface="Calibri Light" panose="020F0302020204030204" pitchFamily="34" charset="0"/>
                       <a:sym typeface="Source Sans Pro Light"/>
                     </a:rPr>
                     <a:t>t.test</a:t>
@@ -6147,18 +6165,18 @@
                       <a:solidFill>
                         <a:srgbClr val="FF0000"/>
                       </a:solidFill>
-                      <a:latin typeface="Source Sans Pro Light"/>
-                      <a:ea typeface="Source Sans Pro Light"/>
-                      <a:cs typeface="Source Sans Pro Light"/>
+                      <a:latin typeface="Calibri Light" panose="020F0302020204030204" pitchFamily="34" charset="0"/>
+                      <a:ea typeface="Source Sans Pro Light"/>
+                      <a:cs typeface="Calibri Light" panose="020F0302020204030204" pitchFamily="34" charset="0"/>
                       <a:sym typeface="Source Sans Pro Light"/>
                     </a:rPr>
                     <a:t>()</a:t>
                   </a:r>
                   <a:r>
                     <a:rPr lang="en-US" sz="900" dirty="0">
-                      <a:latin typeface="Source Sans Pro Light"/>
-                      <a:ea typeface="Source Sans Pro Light"/>
-                      <a:cs typeface="Source Sans Pro Light"/>
+                      <a:latin typeface="Calibri Light" panose="020F0302020204030204" pitchFamily="34" charset="0"/>
+                      <a:ea typeface="Source Sans Pro Light"/>
+                      <a:cs typeface="Calibri Light" panose="020F0302020204030204" pitchFamily="34" charset="0"/>
                       <a:sym typeface="Source Sans Pro Light"/>
                     </a:rPr>
                     <a:t>, </a:t>
@@ -6168,9 +6186,9 @@
                       <a:solidFill>
                         <a:srgbClr val="FF0000"/>
                       </a:solidFill>
-                      <a:latin typeface="Source Sans Pro Light"/>
-                      <a:ea typeface="Source Sans Pro Light"/>
-                      <a:cs typeface="Source Sans Pro Light"/>
+                      <a:latin typeface="Calibri Light" panose="020F0302020204030204" pitchFamily="34" charset="0"/>
+                      <a:ea typeface="Source Sans Pro Light"/>
+                      <a:cs typeface="Calibri Light" panose="020F0302020204030204" pitchFamily="34" charset="0"/>
                       <a:sym typeface="Source Sans Pro Light"/>
                     </a:rPr>
                     <a:t>levenesTest</a:t>
@@ -6180,9 +6198,9 @@
                       <a:solidFill>
                         <a:srgbClr val="FF0000"/>
                       </a:solidFill>
-                      <a:latin typeface="Source Sans Pro Light"/>
-                      <a:ea typeface="Source Sans Pro Light"/>
-                      <a:cs typeface="Source Sans Pro Light"/>
+                      <a:latin typeface="Calibri Light" panose="020F0302020204030204" pitchFamily="34" charset="0"/>
+                      <a:ea typeface="Source Sans Pro Light"/>
+                      <a:cs typeface="Calibri Light" panose="020F0302020204030204" pitchFamily="34" charset="0"/>
                       <a:sym typeface="Source Sans Pro Light"/>
                     </a:rPr>
                     <a:t>()</a:t>
@@ -6191,9 +6209,9 @@
                     <a:solidFill>
                       <a:srgbClr val="FF0000"/>
                     </a:solidFill>
-                    <a:latin typeface="Source Sans Pro Light"/>
+                    <a:latin typeface="Calibri Light" panose="020F0302020204030204" pitchFamily="34" charset="0"/>
                     <a:ea typeface="Source Sans Pro Light"/>
-                    <a:cs typeface="Source Sans Pro Light"/>
+                    <a:cs typeface="Calibri Light" panose="020F0302020204030204" pitchFamily="34" charset="0"/>
                     <a:sym typeface="Source Sans Pro Light"/>
                   </a:endParaRPr>
                 </a:p>
@@ -6209,9 +6227,9 @@
                     <a:defRPr sz="1800"/>
                   </a:pPr>
                   <a:endParaRPr lang="en-US" sz="900" dirty="0">
-                    <a:latin typeface="Source Sans Pro Light"/>
+                    <a:latin typeface="Calibri Light" panose="020F0302020204030204" pitchFamily="34" charset="0"/>
                     <a:ea typeface="Source Sans Pro Light"/>
-                    <a:cs typeface="Source Sans Pro Light"/>
+                    <a:cs typeface="Calibri Light" panose="020F0302020204030204" pitchFamily="34" charset="0"/>
                     <a:sym typeface="Source Sans Pro Light"/>
                   </a:endParaRPr>
                 </a:p>
@@ -6286,7 +6304,7 @@
             </a:ln>
             <a:extLst>
               <a:ext uri="{C572A759-6A51-4108-AA02-DFA0A04FC94B}">
-                <ma14:wrappingTextBoxFlag xmlns:ma14="http://schemas.microsoft.com/office/mac/drawingml/2011/main" xmlns="" val="1"/>
+                <ma14:wrappingTextBoxFlag xmlns="" xmlns:ma14="http://schemas.microsoft.com/office/mac/drawingml/2011/main" val="1"/>
               </a:ext>
             </a:extLst>
           </p:spPr>
@@ -6304,9 +6322,9 @@
                       <a:lumMod val="10000"/>
                     </a:schemeClr>
                   </a:solidFill>
-                  <a:latin typeface="Source Sans Pro"/>
+                  <a:latin typeface="Calibri" panose="020F0502020204030204" pitchFamily="34" charset="0"/>
                   <a:ea typeface="Source Sans Pro"/>
-                  <a:cs typeface="Source Sans Pro"/>
+                  <a:cs typeface="Calibri" panose="020F0502020204030204" pitchFamily="34" charset="0"/>
                   <a:sym typeface="Source Sans Pro"/>
                 </a:rPr>
                 <a:t>2-Sample t-Test</a:t>
@@ -6317,9 +6335,9 @@
                     <a:lumMod val="10000"/>
                   </a:schemeClr>
                 </a:solidFill>
-                <a:latin typeface="Source Sans Pro"/>
+                <a:latin typeface="Calibri" panose="020F0502020204030204" pitchFamily="34" charset="0"/>
                 <a:ea typeface="Source Sans Pro"/>
-                <a:cs typeface="Source Sans Pro"/>
+                <a:cs typeface="Calibri" panose="020F0502020204030204" pitchFamily="34" charset="0"/>
                 <a:sym typeface="Source Sans Pro"/>
               </a:endParaRPr>
             </a:p>
@@ -6340,8 +6358,8 @@
             <a:chExt cx="4393984" cy="1463239"/>
           </a:xfrm>
         </p:grpSpPr>
-        <mc:AlternateContent xmlns:mc="http://schemas.openxmlformats.org/markup-compatibility/2006" xmlns:a14="http://schemas.microsoft.com/office/drawing/2010/main">
-          <mc:Choice Requires="a14">
+        <mc:AlternateContent xmlns:mc="http://schemas.openxmlformats.org/markup-compatibility/2006">
+          <mc:Choice xmlns:a14="http://schemas.microsoft.com/office/drawing/2010/main" Requires="a14">
             <p:sp>
               <p:nvSpPr>
                 <p:cNvPr id="59" name="Shape 34"/>
@@ -6383,27 +6401,27 @@
                   </a:pPr>
                   <a:r>
                     <a:rPr lang="en-US" sz="900" b="1" dirty="0" smtClean="0">
-                      <a:latin typeface="Source Sans Pro Light"/>
-                      <a:ea typeface="Source Sans Pro Light"/>
-                      <a:cs typeface="Source Sans Pro Light"/>
+                      <a:latin typeface="Calibri Light" panose="020F0302020204030204" pitchFamily="34" charset="0"/>
+                      <a:ea typeface="Source Sans Pro Light"/>
+                      <a:cs typeface="Calibri Light" panose="020F0302020204030204" pitchFamily="34" charset="0"/>
                       <a:sym typeface="Source Sans Pro Light"/>
                     </a:rPr>
                     <a:t>H</a:t>
                   </a:r>
                   <a:r>
                     <a:rPr lang="en-US" sz="900" b="1" baseline="-25000" dirty="0" smtClean="0">
-                      <a:latin typeface="Source Sans Pro Light"/>
-                      <a:ea typeface="Source Sans Pro Light"/>
-                      <a:cs typeface="Source Sans Pro Light"/>
+                      <a:latin typeface="Calibri Light" panose="020F0302020204030204" pitchFamily="34" charset="0"/>
+                      <a:ea typeface="Source Sans Pro Light"/>
+                      <a:cs typeface="Calibri Light" panose="020F0302020204030204" pitchFamily="34" charset="0"/>
                       <a:sym typeface="Source Sans Pro Light"/>
                     </a:rPr>
                     <a:t>0</a:t>
                   </a:r>
                   <a:r>
                     <a:rPr lang="en-US" sz="900" b="1" dirty="0" smtClean="0">
-                      <a:latin typeface="Source Sans Pro Light"/>
-                      <a:ea typeface="Source Sans Pro Light"/>
-                      <a:cs typeface="Source Sans Pro Light"/>
+                      <a:latin typeface="Calibri Light" panose="020F0302020204030204" pitchFamily="34" charset="0"/>
+                      <a:ea typeface="Source Sans Pro Light"/>
+                      <a:cs typeface="Calibri Light" panose="020F0302020204030204" pitchFamily="34" charset="0"/>
                       <a:sym typeface="Source Sans Pro Light"/>
                     </a:rPr>
                     <a:t>: </a:t>
@@ -6412,16 +6430,16 @@
                     <a:rPr lang="en-US" sz="900" dirty="0" smtClean="0">
                       <a:latin typeface="Symbol" panose="05050102010706020507" pitchFamily="18" charset="2"/>
                       <a:ea typeface="Source Sans Pro Light"/>
-                      <a:cs typeface="Source Sans Pro Light"/>
+                      <a:cs typeface="Calibri Light" panose="020F0302020204030204" pitchFamily="34" charset="0"/>
                       <a:sym typeface="Source Sans Pro Light"/>
                     </a:rPr>
                     <a:t>m</a:t>
                   </a:r>
                   <a:r>
                     <a:rPr lang="en-US" sz="900" dirty="0" smtClean="0">
-                      <a:latin typeface="Source Sans Pro Light"/>
-                      <a:ea typeface="Source Sans Pro Light"/>
-                      <a:cs typeface="Source Sans Pro Light"/>
+                      <a:latin typeface="Calibri Light" panose="020F0302020204030204" pitchFamily="34" charset="0"/>
+                      <a:ea typeface="Source Sans Pro Light"/>
+                      <a:cs typeface="Calibri Light" panose="020F0302020204030204" pitchFamily="34" charset="0"/>
                       <a:sym typeface="Source Sans Pro Light"/>
                     </a:rPr>
                     <a:t> = </a:t>
@@ -6430,25 +6448,25 @@
                     <a:rPr lang="en-US" sz="900" dirty="0" smtClean="0">
                       <a:latin typeface="Symbol" panose="05050102010706020507" pitchFamily="18" charset="2"/>
                       <a:ea typeface="Source Sans Pro Light"/>
-                      <a:cs typeface="Source Sans Pro Light"/>
+                      <a:cs typeface="Calibri Light" panose="020F0302020204030204" pitchFamily="34" charset="0"/>
                       <a:sym typeface="Source Sans Pro Light"/>
                     </a:rPr>
                     <a:t>m</a:t>
                   </a:r>
                   <a:r>
                     <a:rPr lang="en-US" sz="900" baseline="-25000" dirty="0" smtClean="0">
-                      <a:latin typeface="Source Sans Pro Light"/>
-                      <a:ea typeface="Source Sans Pro Light"/>
-                      <a:cs typeface="Source Sans Pro Light"/>
+                      <a:latin typeface="Calibri Light" panose="020F0302020204030204" pitchFamily="34" charset="0"/>
+                      <a:ea typeface="Source Sans Pro Light"/>
+                      <a:cs typeface="Calibri Light" panose="020F0302020204030204" pitchFamily="34" charset="0"/>
                       <a:sym typeface="Source Sans Pro Light"/>
                     </a:rPr>
                     <a:t>0</a:t>
                   </a:r>
                   <a:r>
                     <a:rPr lang="en-US" sz="900" dirty="0" smtClean="0">
-                      <a:latin typeface="Source Sans Pro Light"/>
-                      <a:ea typeface="Source Sans Pro Light"/>
-                      <a:cs typeface="Source Sans Pro Light"/>
+                      <a:latin typeface="Calibri Light" panose="020F0302020204030204" pitchFamily="34" charset="0"/>
+                      <a:ea typeface="Source Sans Pro Light"/>
+                      <a:cs typeface="Calibri Light" panose="020F0302020204030204" pitchFamily="34" charset="0"/>
                       <a:sym typeface="Source Sans Pro Light"/>
                     </a:rPr>
                     <a:t>  (where </a:t>
@@ -6457,25 +6475,25 @@
                     <a:rPr lang="en-US" sz="900" dirty="0" smtClean="0">
                       <a:latin typeface="Symbol" panose="05050102010706020507" pitchFamily="18" charset="2"/>
                       <a:ea typeface="Source Sans Pro Light"/>
-                      <a:cs typeface="Source Sans Pro Light"/>
+                      <a:cs typeface="Calibri Light" panose="020F0302020204030204" pitchFamily="34" charset="0"/>
                       <a:sym typeface="Source Sans Pro Light"/>
                     </a:rPr>
                     <a:t>m</a:t>
                   </a:r>
                   <a:r>
                     <a:rPr lang="en-US" sz="900" baseline="-25000" dirty="0" smtClean="0">
-                      <a:latin typeface="Source Sans Pro Light"/>
-                      <a:ea typeface="Source Sans Pro Light"/>
-                      <a:cs typeface="Source Sans Pro Light"/>
+                      <a:latin typeface="Calibri Light" panose="020F0302020204030204" pitchFamily="34" charset="0"/>
+                      <a:ea typeface="Source Sans Pro Light"/>
+                      <a:cs typeface="Calibri Light" panose="020F0302020204030204" pitchFamily="34" charset="0"/>
                       <a:sym typeface="Source Sans Pro Light"/>
                     </a:rPr>
                     <a:t>0 </a:t>
                   </a:r>
                   <a:r>
                     <a:rPr lang="en-US" sz="900" dirty="0" smtClean="0">
-                      <a:latin typeface="Source Sans Pro Light"/>
-                      <a:ea typeface="Source Sans Pro Light"/>
-                      <a:cs typeface="Source Sans Pro Light"/>
+                      <a:latin typeface="Calibri Light" panose="020F0302020204030204" pitchFamily="34" charset="0"/>
+                      <a:ea typeface="Source Sans Pro Light"/>
+                      <a:cs typeface="Calibri Light" panose="020F0302020204030204" pitchFamily="34" charset="0"/>
                       <a:sym typeface="Source Sans Pro Light"/>
                     </a:rPr>
                     <a:t>= specific value)</a:t>
@@ -6493,9 +6511,9 @@
                     <a:defRPr sz="1800"/>
                   </a:pPr>
                   <a:endParaRPr lang="en-US" sz="500" dirty="0" smtClean="0">
-                    <a:latin typeface="Source Sans Pro Light"/>
+                    <a:latin typeface="Calibri Light" panose="020F0302020204030204" pitchFamily="34" charset="0"/>
                     <a:ea typeface="Source Sans Pro Light"/>
-                    <a:cs typeface="Source Sans Pro Light"/>
+                    <a:cs typeface="Calibri Light" panose="020F0302020204030204" pitchFamily="34" charset="0"/>
                     <a:sym typeface="Source Sans Pro Light"/>
                   </a:endParaRPr>
                 </a:p>
@@ -6512,9 +6530,9 @@
                   </a:pPr>
                   <a:r>
                     <a:rPr lang="en-US" sz="900" b="1" dirty="0" smtClean="0">
-                      <a:latin typeface="Source Sans Pro Light"/>
-                      <a:ea typeface="Source Sans Pro Light"/>
-                      <a:cs typeface="Source Sans Pro Light"/>
+                      <a:latin typeface="Calibri Light" panose="020F0302020204030204" pitchFamily="34" charset="0"/>
+                      <a:ea typeface="Source Sans Pro Light"/>
+                      <a:cs typeface="Calibri Light" panose="020F0302020204030204" pitchFamily="34" charset="0"/>
                       <a:sym typeface="Source Sans Pro Light"/>
                     </a:rPr>
                     <a:t>Statistic: </a:t>
@@ -6548,18 +6566,18 @@
                   </a14:m>
                   <a:r>
                     <a:rPr lang="en-US" sz="900" dirty="0" smtClean="0">
-                      <a:latin typeface="Source Sans Pro Light"/>
-                      <a:ea typeface="Source Sans Pro Light"/>
-                      <a:cs typeface="Source Sans Pro Light"/>
+                      <a:latin typeface="Calibri Light" panose="020F0302020204030204" pitchFamily="34" charset="0"/>
+                      <a:ea typeface="Source Sans Pro Light"/>
+                      <a:cs typeface="Calibri Light" panose="020F0302020204030204" pitchFamily="34" charset="0"/>
                       <a:sym typeface="Source Sans Pro Light"/>
                     </a:rPr>
                     <a:t>      </a:t>
                   </a:r>
                   <a:r>
                     <a:rPr lang="en-US" sz="900" b="1" dirty="0" smtClean="0">
-                      <a:latin typeface="Source Sans Pro Light"/>
-                      <a:ea typeface="Source Sans Pro Light"/>
-                      <a:cs typeface="Source Sans Pro Light"/>
+                      <a:latin typeface="Calibri Light" panose="020F0302020204030204" pitchFamily="34" charset="0"/>
+                      <a:ea typeface="Source Sans Pro Light"/>
+                      <a:cs typeface="Calibri Light" panose="020F0302020204030204" pitchFamily="34" charset="0"/>
                       <a:sym typeface="Source Sans Pro Light"/>
                     </a:rPr>
                     <a:t>Test Statistic: </a:t>
@@ -6732,18 +6750,18 @@
                   </a14:m>
                   <a:r>
                     <a:rPr lang="en-US" sz="900" b="1" dirty="0" smtClean="0">
-                      <a:latin typeface="Source Sans Pro Light"/>
-                      <a:ea typeface="Source Sans Pro Light"/>
-                      <a:cs typeface="Source Sans Pro Light"/>
+                      <a:latin typeface="Calibri Light" panose="020F0302020204030204" pitchFamily="34" charset="0"/>
+                      <a:ea typeface="Source Sans Pro Light"/>
+                      <a:cs typeface="Calibri Light" panose="020F0302020204030204" pitchFamily="34" charset="0"/>
                       <a:sym typeface="Source Sans Pro Light"/>
                     </a:rPr>
                     <a:t>    Conf. Region: </a:t>
                   </a:r>
                   <a:r>
                     <a:rPr lang="en-US" sz="500" b="1" dirty="0" smtClean="0">
-                      <a:latin typeface="Source Sans Pro Light"/>
-                      <a:ea typeface="Source Sans Pro Light"/>
-                      <a:cs typeface="Source Sans Pro Light"/>
+                      <a:latin typeface="Calibri Light" panose="020F0302020204030204" pitchFamily="34" charset="0"/>
+                      <a:ea typeface="Source Sans Pro Light"/>
+                      <a:cs typeface="Calibri Light" panose="020F0302020204030204" pitchFamily="34" charset="0"/>
                       <a:sym typeface="Source Sans Pro Light"/>
                     </a:rPr>
                     <a:t> </a:t>
@@ -6869,9 +6887,9 @@
                     </m:oMath>
                   </a14:m>
                   <a:endParaRPr lang="en-US" sz="900" dirty="0" smtClean="0">
-                    <a:latin typeface="Source Sans Pro Light"/>
+                    <a:latin typeface="Calibri Light" panose="020F0302020204030204" pitchFamily="34" charset="0"/>
                     <a:ea typeface="Source Sans Pro Light"/>
-                    <a:cs typeface="Source Sans Pro Light"/>
+                    <a:cs typeface="Calibri Light" panose="020F0302020204030204" pitchFamily="34" charset="0"/>
                     <a:sym typeface="Source Sans Pro Light"/>
                   </a:endParaRPr>
                 </a:p>
@@ -6887,9 +6905,9 @@
                     <a:defRPr sz="1800"/>
                   </a:pPr>
                   <a:endParaRPr lang="en-US" sz="500" dirty="0">
-                    <a:latin typeface="Source Sans Pro Light"/>
+                    <a:latin typeface="Calibri Light" panose="020F0302020204030204" pitchFamily="34" charset="0"/>
                     <a:ea typeface="Source Sans Pro Light"/>
-                    <a:cs typeface="Source Sans Pro Light"/>
+                    <a:cs typeface="Calibri Light" panose="020F0302020204030204" pitchFamily="34" charset="0"/>
                     <a:sym typeface="Source Sans Pro Light"/>
                   </a:endParaRPr>
                 </a:p>
@@ -6906,18 +6924,18 @@
                   </a:pPr>
                   <a:r>
                     <a:rPr lang="en-US" sz="900" b="1" dirty="0" smtClean="0">
-                      <a:latin typeface="Source Sans Pro Light"/>
-                      <a:ea typeface="Source Sans Pro Light"/>
-                      <a:cs typeface="Source Sans Pro Light"/>
+                      <a:latin typeface="Calibri Light" panose="020F0302020204030204" pitchFamily="34" charset="0"/>
+                      <a:ea typeface="Source Sans Pro Light"/>
+                      <a:cs typeface="Calibri Light" panose="020F0302020204030204" pitchFamily="34" charset="0"/>
                       <a:sym typeface="Source Sans Pro Light"/>
                     </a:rPr>
                     <a:t>Assumptions: </a:t>
                   </a:r>
                   <a:r>
                     <a:rPr lang="en-US" sz="900" dirty="0" smtClean="0">
-                      <a:latin typeface="Source Sans Pro Light"/>
-                      <a:ea typeface="Source Sans Pro Light"/>
-                      <a:cs typeface="Source Sans Pro Light"/>
+                      <a:latin typeface="Calibri Light" panose="020F0302020204030204" pitchFamily="34" charset="0"/>
+                      <a:ea typeface="Source Sans Pro Light"/>
+                      <a:cs typeface="Calibri Light" panose="020F0302020204030204" pitchFamily="34" charset="0"/>
                       <a:sym typeface="Source Sans Pro Light"/>
                     </a:rPr>
                     <a:t>1) </a:t>
@@ -6926,16 +6944,16 @@
                     <a:rPr lang="en-US" sz="900" dirty="0" smtClean="0">
                       <a:latin typeface="Symbol" panose="05050102010706020507" pitchFamily="18" charset="2"/>
                       <a:ea typeface="Source Sans Pro Light"/>
-                      <a:cs typeface="Source Sans Pro Light"/>
+                      <a:cs typeface="Calibri Light" panose="020F0302020204030204" pitchFamily="34" charset="0"/>
                       <a:sym typeface="Source Sans Pro Light"/>
                     </a:rPr>
                     <a:t>s</a:t>
                   </a:r>
                   <a:r>
                     <a:rPr lang="en-US" sz="900" dirty="0" smtClean="0">
-                      <a:latin typeface="Source Sans Pro Light"/>
-                      <a:ea typeface="Source Sans Pro Light"/>
-                      <a:cs typeface="Source Sans Pro Light"/>
+                      <a:latin typeface="Calibri Light" panose="020F0302020204030204" pitchFamily="34" charset="0"/>
+                      <a:ea typeface="Source Sans Pro Light"/>
+                      <a:cs typeface="Calibri Light" panose="020F0302020204030204" pitchFamily="34" charset="0"/>
                       <a:sym typeface="Source Sans Pro Light"/>
                     </a:rPr>
                     <a:t> is known</a:t>
@@ -6954,54 +6972,72 @@
                   </a:pPr>
                   <a:r>
                     <a:rPr lang="en-US" sz="900" dirty="0">
-                      <a:latin typeface="Source Sans Pro Light"/>
-                      <a:ea typeface="Source Sans Pro Light"/>
-                      <a:cs typeface="Source Sans Pro Light"/>
+                      <a:latin typeface="Calibri Light" panose="020F0302020204030204" pitchFamily="34" charset="0"/>
+                      <a:ea typeface="Source Sans Pro Light"/>
+                      <a:cs typeface="Calibri Light" panose="020F0302020204030204" pitchFamily="34" charset="0"/>
                       <a:sym typeface="Source Sans Pro Light"/>
                     </a:rPr>
                     <a:t> </a:t>
                   </a:r>
                   <a:r>
                     <a:rPr lang="en-US" sz="900" dirty="0" smtClean="0">
-                      <a:latin typeface="Source Sans Pro Light"/>
-                      <a:ea typeface="Source Sans Pro Light"/>
-                      <a:cs typeface="Source Sans Pro Light"/>
-                      <a:sym typeface="Source Sans Pro Light"/>
-                    </a:rPr>
-                    <a:t>                              2) n</a:t>
+                      <a:latin typeface="Calibri Light" panose="020F0302020204030204" pitchFamily="34" charset="0"/>
+                      <a:ea typeface="Source Sans Pro Light"/>
+                      <a:cs typeface="Calibri Light" panose="020F0302020204030204" pitchFamily="34" charset="0"/>
+                      <a:sym typeface="Source Sans Pro Light"/>
+                    </a:rPr>
+                    <a:t>                        </a:t>
+                  </a:r>
+                  <a:r>
+                    <a:rPr lang="en-US" sz="900" dirty="0" smtClean="0">
+                      <a:latin typeface="Calibri Light" panose="020F0302020204030204" pitchFamily="34" charset="0"/>
+                      <a:ea typeface="Source Sans Pro Light"/>
+                      <a:cs typeface="Calibri Light" panose="020F0302020204030204" pitchFamily="34" charset="0"/>
+                      <a:sym typeface="Source Sans Pro Light"/>
+                    </a:rPr>
+                    <a:t>2</a:t>
+                  </a:r>
+                  <a:r>
+                    <a:rPr lang="en-US" sz="900" dirty="0" smtClean="0">
+                      <a:latin typeface="Calibri Light" panose="020F0302020204030204" pitchFamily="34" charset="0"/>
+                      <a:ea typeface="Source Sans Pro Light"/>
+                      <a:cs typeface="Calibri Light" panose="020F0302020204030204" pitchFamily="34" charset="0"/>
+                      <a:sym typeface="Source Sans Pro Light"/>
+                    </a:rPr>
+                    <a:t>) n</a:t>
                   </a:r>
                   <a:r>
                     <a:rPr lang="en-US" sz="900" u="sng" dirty="0" smtClean="0">
-                      <a:latin typeface="Source Sans Pro Light"/>
-                      <a:ea typeface="Source Sans Pro Light"/>
-                      <a:cs typeface="Source Sans Pro Light"/>
+                      <a:latin typeface="Calibri Light" panose="020F0302020204030204" pitchFamily="34" charset="0"/>
+                      <a:ea typeface="Source Sans Pro Light"/>
+                      <a:cs typeface="Calibri Light" panose="020F0302020204030204" pitchFamily="34" charset="0"/>
                       <a:sym typeface="Source Sans Pro Light"/>
                     </a:rPr>
                     <a:t>&gt;</a:t>
                   </a:r>
                   <a:r>
                     <a:rPr lang="en-US" sz="900" dirty="0" smtClean="0">
-                      <a:latin typeface="Source Sans Pro Light"/>
-                      <a:ea typeface="Source Sans Pro Light"/>
-                      <a:cs typeface="Source Sans Pro Light"/>
+                      <a:latin typeface="Calibri Light" panose="020F0302020204030204" pitchFamily="34" charset="0"/>
+                      <a:ea typeface="Source Sans Pro Light"/>
+                      <a:cs typeface="Calibri Light" panose="020F0302020204030204" pitchFamily="34" charset="0"/>
                       <a:sym typeface="Source Sans Pro Light"/>
                     </a:rPr>
                     <a:t>30, n</a:t>
                   </a:r>
                   <a:r>
                     <a:rPr lang="en-US" sz="900" u="sng" dirty="0" smtClean="0">
-                      <a:latin typeface="Source Sans Pro Light"/>
-                      <a:ea typeface="Source Sans Pro Light"/>
-                      <a:cs typeface="Source Sans Pro Light"/>
+                      <a:latin typeface="Calibri Light" panose="020F0302020204030204" pitchFamily="34" charset="0"/>
+                      <a:ea typeface="Source Sans Pro Light"/>
+                      <a:cs typeface="Calibri Light" panose="020F0302020204030204" pitchFamily="34" charset="0"/>
                       <a:sym typeface="Source Sans Pro Light"/>
                     </a:rPr>
                     <a:t>&gt;</a:t>
                   </a:r>
                   <a:r>
                     <a:rPr lang="en-US" sz="900" dirty="0" smtClean="0">
-                      <a:latin typeface="Source Sans Pro Light"/>
-                      <a:ea typeface="Source Sans Pro Light"/>
-                      <a:cs typeface="Source Sans Pro Light"/>
+                      <a:latin typeface="Calibri Light" panose="020F0302020204030204" pitchFamily="34" charset="0"/>
+                      <a:ea typeface="Source Sans Pro Light"/>
+                      <a:cs typeface="Calibri Light" panose="020F0302020204030204" pitchFamily="34" charset="0"/>
                       <a:sym typeface="Source Sans Pro Light"/>
                     </a:rPr>
                     <a:t>15 and population not strongly skewed, OR population is normal</a:t>
@@ -7019,9 +7055,9 @@
                     <a:defRPr sz="1800"/>
                   </a:pPr>
                   <a:endParaRPr lang="en-US" sz="500" dirty="0">
-                    <a:latin typeface="Source Sans Pro Light"/>
+                    <a:latin typeface="Calibri Light" panose="020F0302020204030204" pitchFamily="34" charset="0"/>
                     <a:ea typeface="Source Sans Pro Light"/>
-                    <a:cs typeface="Source Sans Pro Light"/>
+                    <a:cs typeface="Calibri Light" panose="020F0302020204030204" pitchFamily="34" charset="0"/>
                     <a:sym typeface="Source Sans Pro Light"/>
                   </a:endParaRPr>
                 </a:p>
@@ -7038,9 +7074,9 @@
                   </a:pPr>
                   <a:r>
                     <a:rPr lang="en-US" sz="900" b="1" dirty="0" smtClean="0">
-                      <a:latin typeface="Source Sans Pro Light"/>
-                      <a:ea typeface="Source Sans Pro Light"/>
-                      <a:cs typeface="Source Sans Pro Light"/>
+                      <a:latin typeface="Calibri Light" panose="020F0302020204030204" pitchFamily="34" charset="0"/>
+                      <a:ea typeface="Source Sans Pro Light"/>
+                      <a:cs typeface="Calibri Light" panose="020F0302020204030204" pitchFamily="34" charset="0"/>
                       <a:sym typeface="Source Sans Pro Light"/>
                     </a:rPr>
                     <a:t>R: </a:t>
@@ -7050,9 +7086,9 @@
                       <a:solidFill>
                         <a:srgbClr val="FF0000"/>
                       </a:solidFill>
-                      <a:latin typeface="Source Sans Pro Light"/>
-                      <a:ea typeface="Source Sans Pro Light"/>
-                      <a:cs typeface="Source Sans Pro Light"/>
+                      <a:latin typeface="Calibri Light" panose="020F0302020204030204" pitchFamily="34" charset="0"/>
+                      <a:ea typeface="Source Sans Pro Light"/>
+                      <a:cs typeface="Calibri Light" panose="020F0302020204030204" pitchFamily="34" charset="0"/>
                       <a:sym typeface="Source Sans Pro Light"/>
                     </a:rPr>
                     <a:t>z.test</a:t>
@@ -7062,9 +7098,9 @@
                       <a:solidFill>
                         <a:srgbClr val="FF0000"/>
                       </a:solidFill>
-                      <a:latin typeface="Source Sans Pro Light"/>
-                      <a:ea typeface="Source Sans Pro Light"/>
-                      <a:cs typeface="Source Sans Pro Light"/>
+                      <a:latin typeface="Calibri Light" panose="020F0302020204030204" pitchFamily="34" charset="0"/>
+                      <a:ea typeface="Source Sans Pro Light"/>
+                      <a:cs typeface="Calibri Light" panose="020F0302020204030204" pitchFamily="34" charset="0"/>
                       <a:sym typeface="Source Sans Pro Light"/>
                     </a:rPr>
                     <a:t>()</a:t>
@@ -7073,16 +7109,16 @@
                     <a:solidFill>
                       <a:srgbClr val="FF0000"/>
                     </a:solidFill>
-                    <a:latin typeface="Source Sans Pro Light"/>
+                    <a:latin typeface="Calibri Light" panose="020F0302020204030204" pitchFamily="34" charset="0"/>
                     <a:ea typeface="Source Sans Pro Light"/>
-                    <a:cs typeface="Source Sans Pro Light"/>
+                    <a:cs typeface="Calibri Light" panose="020F0302020204030204" pitchFamily="34" charset="0"/>
                     <a:sym typeface="Source Sans Pro Light"/>
                   </a:endParaRPr>
                 </a:p>
               </p:txBody>
             </p:sp>
           </mc:Choice>
-          <mc:Fallback xmlns="">
+          <mc:Fallback>
             <p:sp>
               <p:nvSpPr>
                 <p:cNvPr id="59" name="Shape 34"/>
@@ -7150,7 +7186,7 @@
             </a:ln>
             <a:extLst>
               <a:ext uri="{C572A759-6A51-4108-AA02-DFA0A04FC94B}">
-                <ma14:wrappingTextBoxFlag xmlns:ma14="http://schemas.microsoft.com/office/mac/drawingml/2011/main" xmlns="" val="1"/>
+                <ma14:wrappingTextBoxFlag xmlns="" xmlns:ma14="http://schemas.microsoft.com/office/mac/drawingml/2011/main" val="1"/>
               </a:ext>
             </a:extLst>
           </p:spPr>
@@ -7168,9 +7204,9 @@
                       <a:lumMod val="10000"/>
                     </a:schemeClr>
                   </a:solidFill>
-                  <a:latin typeface="Source Sans Pro"/>
+                  <a:latin typeface="Calibri" panose="020F0502020204030204" pitchFamily="34" charset="0"/>
                   <a:ea typeface="Source Sans Pro"/>
-                  <a:cs typeface="Source Sans Pro"/>
+                  <a:cs typeface="Calibri" panose="020F0502020204030204" pitchFamily="34" charset="0"/>
                   <a:sym typeface="Source Sans Pro"/>
                 </a:rPr>
                 <a:t>1-Sample Z-Test</a:t>
@@ -7181,9 +7217,9 @@
                     <a:lumMod val="10000"/>
                   </a:schemeClr>
                 </a:solidFill>
-                <a:latin typeface="Source Sans Pro"/>
+                <a:latin typeface="Calibri" panose="020F0502020204030204" pitchFamily="34" charset="0"/>
                 <a:ea typeface="Source Sans Pro"/>
-                <a:cs typeface="Source Sans Pro"/>
+                <a:cs typeface="Calibri" panose="020F0502020204030204" pitchFamily="34" charset="0"/>
                 <a:sym typeface="Source Sans Pro"/>
               </a:endParaRPr>
             </a:p>
@@ -7204,8 +7240,8 @@
             <a:chExt cx="4393984" cy="1864063"/>
           </a:xfrm>
         </p:grpSpPr>
-        <mc:AlternateContent xmlns:mc="http://schemas.openxmlformats.org/markup-compatibility/2006" xmlns:a14="http://schemas.microsoft.com/office/drawing/2010/main">
-          <mc:Choice Requires="a14">
+        <mc:AlternateContent xmlns:mc="http://schemas.openxmlformats.org/markup-compatibility/2006">
+          <mc:Choice xmlns:a14="http://schemas.microsoft.com/office/drawing/2010/main" Requires="a14">
             <p:sp>
               <p:nvSpPr>
                 <p:cNvPr id="63" name="Shape 34"/>
@@ -7247,36 +7283,36 @@
                   </a:pPr>
                   <a:r>
                     <a:rPr lang="en-US" sz="900" b="1" dirty="0" smtClean="0">
-                      <a:latin typeface="Source Sans Pro Light"/>
-                      <a:ea typeface="Source Sans Pro Light"/>
-                      <a:cs typeface="Source Sans Pro Light"/>
+                      <a:latin typeface="Calibri Light" panose="020F0302020204030204" pitchFamily="34" charset="0"/>
+                      <a:ea typeface="Source Sans Pro Light"/>
+                      <a:cs typeface="Calibri Light" panose="020F0302020204030204" pitchFamily="34" charset="0"/>
                       <a:sym typeface="Source Sans Pro Light"/>
                     </a:rPr>
                     <a:t>H</a:t>
                   </a:r>
                   <a:r>
                     <a:rPr lang="en-US" sz="900" b="1" baseline="-25000" dirty="0" smtClean="0">
-                      <a:latin typeface="Source Sans Pro Light"/>
-                      <a:ea typeface="Source Sans Pro Light"/>
-                      <a:cs typeface="Source Sans Pro Light"/>
+                      <a:latin typeface="Calibri Light" panose="020F0302020204030204" pitchFamily="34" charset="0"/>
+                      <a:ea typeface="Source Sans Pro Light"/>
+                      <a:cs typeface="Calibri Light" panose="020F0302020204030204" pitchFamily="34" charset="0"/>
                       <a:sym typeface="Source Sans Pro Light"/>
                     </a:rPr>
                     <a:t>0</a:t>
                   </a:r>
                   <a:r>
                     <a:rPr lang="en-US" sz="900" b="1" dirty="0" smtClean="0">
-                      <a:latin typeface="Source Sans Pro Light"/>
-                      <a:ea typeface="Source Sans Pro Light"/>
-                      <a:cs typeface="Source Sans Pro Light"/>
+                      <a:latin typeface="Calibri Light" panose="020F0302020204030204" pitchFamily="34" charset="0"/>
+                      <a:ea typeface="Source Sans Pro Light"/>
+                      <a:cs typeface="Calibri Light" panose="020F0302020204030204" pitchFamily="34" charset="0"/>
                       <a:sym typeface="Source Sans Pro Light"/>
                     </a:rPr>
                     <a:t>:</a:t>
                   </a:r>
                   <a:r>
                     <a:rPr lang="en-US" sz="900" dirty="0" smtClean="0">
-                      <a:latin typeface="Source Sans Pro Light"/>
-                      <a:ea typeface="Source Sans Pro Light"/>
-                      <a:cs typeface="Source Sans Pro Light"/>
+                      <a:latin typeface="Calibri Light" panose="020F0302020204030204" pitchFamily="34" charset="0"/>
+                      <a:ea typeface="Source Sans Pro Light"/>
+                      <a:cs typeface="Calibri Light" panose="020F0302020204030204" pitchFamily="34" charset="0"/>
                       <a:sym typeface="Source Sans Pro Light"/>
                     </a:rPr>
                     <a:t> “Distribution of individuals into response levels follows the theoretical distribution”</a:t>
@@ -7295,90 +7331,90 @@
                   </a:pPr>
                   <a:r>
                     <a:rPr lang="en-US" sz="900" b="1" dirty="0" smtClean="0">
-                      <a:latin typeface="Source Sans Pro Light"/>
-                      <a:ea typeface="Source Sans Pro Light"/>
-                      <a:cs typeface="Source Sans Pro Light"/>
+                      <a:latin typeface="Calibri Light" panose="020F0302020204030204" pitchFamily="34" charset="0"/>
+                      <a:ea typeface="Source Sans Pro Light"/>
+                      <a:cs typeface="Calibri Light" panose="020F0302020204030204" pitchFamily="34" charset="0"/>
                       <a:sym typeface="Source Sans Pro Light"/>
                     </a:rPr>
                     <a:t>H</a:t>
                   </a:r>
                   <a:r>
                     <a:rPr lang="en-US" sz="900" b="1" baseline="-25000" dirty="0" smtClean="0">
-                      <a:latin typeface="Source Sans Pro Light"/>
-                      <a:ea typeface="Source Sans Pro Light"/>
-                      <a:cs typeface="Source Sans Pro Light"/>
+                      <a:latin typeface="Calibri Light" panose="020F0302020204030204" pitchFamily="34" charset="0"/>
+                      <a:ea typeface="Source Sans Pro Light"/>
+                      <a:cs typeface="Calibri Light" panose="020F0302020204030204" pitchFamily="34" charset="0"/>
                       <a:sym typeface="Source Sans Pro Light"/>
                     </a:rPr>
                     <a:t>A</a:t>
                   </a:r>
                   <a:r>
                     <a:rPr lang="en-US" sz="900" b="1" dirty="0" smtClean="0">
-                      <a:latin typeface="Source Sans Pro Light"/>
-                      <a:ea typeface="Source Sans Pro Light"/>
-                      <a:cs typeface="Source Sans Pro Light"/>
+                      <a:latin typeface="Calibri Light" panose="020F0302020204030204" pitchFamily="34" charset="0"/>
+                      <a:ea typeface="Source Sans Pro Light"/>
+                      <a:cs typeface="Calibri Light" panose="020F0302020204030204" pitchFamily="34" charset="0"/>
                       <a:sym typeface="Source Sans Pro Light"/>
                     </a:rPr>
                     <a:t>:</a:t>
                   </a:r>
                   <a:r>
                     <a:rPr lang="en-US" sz="900" dirty="0" smtClean="0">
-                      <a:latin typeface="Source Sans Pro Light"/>
-                      <a:ea typeface="Source Sans Pro Light"/>
-                      <a:cs typeface="Source Sans Pro Light"/>
+                      <a:latin typeface="Calibri Light" panose="020F0302020204030204" pitchFamily="34" charset="0"/>
+                      <a:ea typeface="Source Sans Pro Light"/>
+                      <a:cs typeface="Calibri Light" panose="020F0302020204030204" pitchFamily="34" charset="0"/>
                       <a:sym typeface="Source Sans Pro Light"/>
                     </a:rPr>
                     <a:t> </a:t>
                   </a:r>
                   <a:r>
                     <a:rPr lang="en-US" sz="900" dirty="0">
-                      <a:latin typeface="Source Sans Pro Light"/>
-                      <a:ea typeface="Source Sans Pro Light"/>
-                      <a:cs typeface="Source Sans Pro Light"/>
+                      <a:latin typeface="Calibri Light" panose="020F0302020204030204" pitchFamily="34" charset="0"/>
+                      <a:ea typeface="Source Sans Pro Light"/>
+                      <a:cs typeface="Calibri Light" panose="020F0302020204030204" pitchFamily="34" charset="0"/>
                       <a:sym typeface="Source Sans Pro Light"/>
                     </a:rPr>
                     <a:t>“Distribution of </a:t>
                   </a:r>
                   <a:r>
                     <a:rPr lang="en-US" sz="900" dirty="0" smtClean="0">
-                      <a:latin typeface="Source Sans Pro Light"/>
-                      <a:ea typeface="Source Sans Pro Light"/>
-                      <a:cs typeface="Source Sans Pro Light"/>
+                      <a:latin typeface="Calibri Light" panose="020F0302020204030204" pitchFamily="34" charset="0"/>
+                      <a:ea typeface="Source Sans Pro Light"/>
+                      <a:cs typeface="Calibri Light" panose="020F0302020204030204" pitchFamily="34" charset="0"/>
                       <a:sym typeface="Source Sans Pro Light"/>
                     </a:rPr>
                     <a:t>individuals into </a:t>
                   </a:r>
                   <a:r>
                     <a:rPr lang="en-US" sz="900" dirty="0">
-                      <a:latin typeface="Source Sans Pro Light"/>
-                      <a:ea typeface="Source Sans Pro Light"/>
-                      <a:cs typeface="Source Sans Pro Light"/>
+                      <a:latin typeface="Calibri Light" panose="020F0302020204030204" pitchFamily="34" charset="0"/>
+                      <a:ea typeface="Source Sans Pro Light"/>
+                      <a:cs typeface="Calibri Light" panose="020F0302020204030204" pitchFamily="34" charset="0"/>
                       <a:sym typeface="Source Sans Pro Light"/>
                     </a:rPr>
                     <a:t>response levels </a:t>
                   </a:r>
                   <a:r>
                     <a:rPr lang="en-US" sz="900" dirty="0" smtClean="0">
-                      <a:latin typeface="Source Sans Pro Light"/>
-                      <a:ea typeface="Source Sans Pro Light"/>
-                      <a:cs typeface="Source Sans Pro Light"/>
+                      <a:latin typeface="Calibri Light" panose="020F0302020204030204" pitchFamily="34" charset="0"/>
+                      <a:ea typeface="Source Sans Pro Light"/>
+                      <a:cs typeface="Calibri Light" panose="020F0302020204030204" pitchFamily="34" charset="0"/>
                       <a:sym typeface="Source Sans Pro Light"/>
                     </a:rPr>
                     <a:t>does NOT follow </a:t>
                   </a:r>
                   <a:r>
                     <a:rPr lang="en-US" sz="900" dirty="0">
-                      <a:latin typeface="Source Sans Pro Light"/>
-                      <a:ea typeface="Source Sans Pro Light"/>
-                      <a:cs typeface="Source Sans Pro Light"/>
+                      <a:latin typeface="Calibri Light" panose="020F0302020204030204" pitchFamily="34" charset="0"/>
+                      <a:ea typeface="Source Sans Pro Light"/>
+                      <a:cs typeface="Calibri Light" panose="020F0302020204030204" pitchFamily="34" charset="0"/>
                       <a:sym typeface="Source Sans Pro Light"/>
                     </a:rPr>
                     <a:t>the </a:t>
                   </a:r>
                   <a:r>
                     <a:rPr lang="en-US" sz="900" dirty="0" smtClean="0">
-                      <a:latin typeface="Source Sans Pro Light"/>
-                      <a:ea typeface="Source Sans Pro Light"/>
-                      <a:cs typeface="Source Sans Pro Light"/>
+                      <a:latin typeface="Calibri Light" panose="020F0302020204030204" pitchFamily="34" charset="0"/>
+                      <a:ea typeface="Source Sans Pro Light"/>
+                      <a:cs typeface="Calibri Light" panose="020F0302020204030204" pitchFamily="34" charset="0"/>
                       <a:sym typeface="Source Sans Pro Light"/>
                     </a:rPr>
                     <a:t>theoretical</a:t>
@@ -7397,26 +7433,26 @@
                   </a:pPr>
                   <a:r>
                     <a:rPr lang="en-US" sz="900" dirty="0">
-                      <a:latin typeface="Source Sans Pro Light"/>
-                      <a:ea typeface="Source Sans Pro Light"/>
-                      <a:cs typeface="Source Sans Pro Light"/>
+                      <a:latin typeface="Calibri Light" panose="020F0302020204030204" pitchFamily="34" charset="0"/>
+                      <a:ea typeface="Source Sans Pro Light"/>
+                      <a:cs typeface="Calibri Light" panose="020F0302020204030204" pitchFamily="34" charset="0"/>
                       <a:sym typeface="Source Sans Pro Light"/>
                     </a:rPr>
                     <a:t> </a:t>
                   </a:r>
                   <a:r>
                     <a:rPr lang="en-US" sz="900" dirty="0" smtClean="0">
-                      <a:latin typeface="Source Sans Pro Light"/>
-                      <a:ea typeface="Source Sans Pro Light"/>
-                      <a:cs typeface="Source Sans Pro Light"/>
+                      <a:latin typeface="Calibri Light" panose="020F0302020204030204" pitchFamily="34" charset="0"/>
+                      <a:ea typeface="Source Sans Pro Light"/>
+                      <a:cs typeface="Calibri Light" panose="020F0302020204030204" pitchFamily="34" charset="0"/>
                       <a:sym typeface="Source Sans Pro Light"/>
                     </a:rPr>
                     <a:t>         distribution”</a:t>
                   </a:r>
                   <a:endParaRPr lang="en-US" sz="900" dirty="0">
-                    <a:latin typeface="Source Sans Pro Light"/>
+                    <a:latin typeface="Calibri Light" panose="020F0302020204030204" pitchFamily="34" charset="0"/>
                     <a:ea typeface="Source Sans Pro Light"/>
-                    <a:cs typeface="Source Sans Pro Light"/>
+                    <a:cs typeface="Calibri Light" panose="020F0302020204030204" pitchFamily="34" charset="0"/>
                     <a:sym typeface="Source Sans Pro Light"/>
                   </a:endParaRPr>
                 </a:p>
@@ -7432,9 +7468,9 @@
                     <a:defRPr sz="1800"/>
                   </a:pPr>
                   <a:endParaRPr lang="en-US" sz="500" dirty="0" smtClean="0">
-                    <a:latin typeface="Source Sans Pro Light"/>
+                    <a:latin typeface="Calibri Light" panose="020F0302020204030204" pitchFamily="34" charset="0"/>
                     <a:ea typeface="Source Sans Pro Light"/>
-                    <a:cs typeface="Source Sans Pro Light"/>
+                    <a:cs typeface="Calibri Light" panose="020F0302020204030204" pitchFamily="34" charset="0"/>
                     <a:sym typeface="Source Sans Pro Light"/>
                   </a:endParaRPr>
                 </a:p>
@@ -7451,18 +7487,18 @@
                   </a:pPr>
                   <a:r>
                     <a:rPr lang="en-US" sz="900" b="1" dirty="0" smtClean="0">
-                      <a:latin typeface="Source Sans Pro Light"/>
-                      <a:ea typeface="Source Sans Pro Light"/>
-                      <a:cs typeface="Source Sans Pro Light"/>
+                      <a:latin typeface="Calibri Light" panose="020F0302020204030204" pitchFamily="34" charset="0"/>
+                      <a:ea typeface="Source Sans Pro Light"/>
+                      <a:cs typeface="Calibri Light" panose="020F0302020204030204" pitchFamily="34" charset="0"/>
                       <a:sym typeface="Source Sans Pro Light"/>
                     </a:rPr>
                     <a:t>Statistic:</a:t>
                   </a:r>
                   <a:r>
                     <a:rPr lang="en-US" sz="900" dirty="0" smtClean="0">
-                      <a:latin typeface="Source Sans Pro Light"/>
-                      <a:ea typeface="Source Sans Pro Light"/>
-                      <a:cs typeface="Source Sans Pro Light"/>
+                      <a:latin typeface="Calibri Light" panose="020F0302020204030204" pitchFamily="34" charset="0"/>
+                      <a:ea typeface="Source Sans Pro Light"/>
+                      <a:cs typeface="Calibri Light" panose="020F0302020204030204" pitchFamily="34" charset="0"/>
                       <a:sym typeface="Source Sans Pro Light"/>
                     </a:rPr>
                     <a:t> Observed frequency table</a:t>
@@ -7480,9 +7516,9 @@
                     <a:defRPr sz="1800"/>
                   </a:pPr>
                   <a:endParaRPr lang="en-US" sz="500" dirty="0" smtClean="0">
-                    <a:latin typeface="Source Sans Pro Light"/>
+                    <a:latin typeface="Calibri Light" panose="020F0302020204030204" pitchFamily="34" charset="0"/>
                     <a:ea typeface="Source Sans Pro Light"/>
-                    <a:cs typeface="Source Sans Pro Light"/>
+                    <a:cs typeface="Calibri Light" panose="020F0302020204030204" pitchFamily="34" charset="0"/>
                     <a:sym typeface="Source Sans Pro Light"/>
                   </a:endParaRPr>
                 </a:p>
@@ -7499,9 +7535,9 @@
                   </a:pPr>
                   <a:r>
                     <a:rPr lang="en-US" sz="900" b="1" dirty="0" smtClean="0">
-                      <a:latin typeface="Source Sans Pro Light"/>
-                      <a:ea typeface="Source Sans Pro Light"/>
-                      <a:cs typeface="Source Sans Pro Light"/>
+                      <a:latin typeface="Calibri Light" panose="020F0302020204030204" pitchFamily="34" charset="0"/>
+                      <a:ea typeface="Source Sans Pro Light"/>
+                      <a:cs typeface="Calibri Light" panose="020F0302020204030204" pitchFamily="34" charset="0"/>
                       <a:sym typeface="Source Sans Pro Light"/>
                     </a:rPr>
                     <a:t>Test Statistic: </a:t>
@@ -7640,36 +7676,36 @@
                   </a14:m>
                   <a:r>
                     <a:rPr lang="en-US" sz="900" dirty="0" smtClean="0">
-                      <a:latin typeface="Source Sans Pro Light"/>
-                      <a:ea typeface="Source Sans Pro Light"/>
-                      <a:cs typeface="Source Sans Pro Light"/>
+                      <a:latin typeface="Calibri Light" panose="020F0302020204030204" pitchFamily="34" charset="0"/>
+                      <a:ea typeface="Source Sans Pro Light"/>
+                      <a:cs typeface="Calibri Light" panose="020F0302020204030204" pitchFamily="34" charset="0"/>
                       <a:sym typeface="Source Sans Pro Light"/>
                     </a:rPr>
                     <a:t>       </a:t>
                   </a:r>
                   <a:r>
                     <a:rPr lang="en-US" sz="900" b="1" dirty="0" err="1" smtClean="0">
-                      <a:latin typeface="Source Sans Pro Light"/>
-                      <a:ea typeface="Source Sans Pro Light"/>
-                      <a:cs typeface="Source Sans Pro Light"/>
+                      <a:latin typeface="Calibri Light" panose="020F0302020204030204" pitchFamily="34" charset="0"/>
+                      <a:ea typeface="Source Sans Pro Light"/>
+                      <a:cs typeface="Calibri Light" panose="020F0302020204030204" pitchFamily="34" charset="0"/>
                       <a:sym typeface="Source Sans Pro Light"/>
                     </a:rPr>
                     <a:t>df</a:t>
                   </a:r>
                   <a:r>
                     <a:rPr lang="en-US" sz="900" b="1" dirty="0" smtClean="0">
-                      <a:latin typeface="Source Sans Pro Light"/>
-                      <a:ea typeface="Source Sans Pro Light"/>
-                      <a:cs typeface="Source Sans Pro Light"/>
+                      <a:latin typeface="Calibri Light" panose="020F0302020204030204" pitchFamily="34" charset="0"/>
+                      <a:ea typeface="Source Sans Pro Light"/>
+                      <a:cs typeface="Calibri Light" panose="020F0302020204030204" pitchFamily="34" charset="0"/>
                       <a:sym typeface="Source Sans Pro Light"/>
                     </a:rPr>
                     <a:t>: </a:t>
                   </a:r>
                   <a:r>
                     <a:rPr lang="en-US" sz="900" dirty="0" smtClean="0">
-                      <a:latin typeface="Source Sans Pro Light"/>
-                      <a:ea typeface="Source Sans Pro Light"/>
-                      <a:cs typeface="Source Sans Pro Light"/>
+                      <a:latin typeface="Calibri Light" panose="020F0302020204030204" pitchFamily="34" charset="0"/>
+                      <a:ea typeface="Source Sans Pro Light"/>
+                      <a:cs typeface="Calibri Light" panose="020F0302020204030204" pitchFamily="34" charset="0"/>
                       <a:sym typeface="Source Sans Pro Light"/>
                     </a:rPr>
                     <a:t>cells-1</a:t>
@@ -7687,9 +7723,9 @@
                     <a:defRPr sz="1800"/>
                   </a:pPr>
                   <a:endParaRPr lang="en-US" sz="500" dirty="0">
-                    <a:latin typeface="Source Sans Pro Light"/>
+                    <a:latin typeface="Calibri Light" panose="020F0302020204030204" pitchFamily="34" charset="0"/>
                     <a:ea typeface="Source Sans Pro Light"/>
-                    <a:cs typeface="Source Sans Pro Light"/>
+                    <a:cs typeface="Calibri Light" panose="020F0302020204030204" pitchFamily="34" charset="0"/>
                     <a:sym typeface="Source Sans Pro Light"/>
                   </a:endParaRPr>
                 </a:p>
@@ -7706,36 +7742,36 @@
                   </a:pPr>
                   <a:r>
                     <a:rPr lang="en-US" sz="900" b="1" dirty="0" smtClean="0">
-                      <a:latin typeface="Source Sans Pro Light"/>
-                      <a:ea typeface="Source Sans Pro Light"/>
-                      <a:cs typeface="Source Sans Pro Light"/>
+                      <a:latin typeface="Calibri Light" panose="020F0302020204030204" pitchFamily="34" charset="0"/>
+                      <a:ea typeface="Source Sans Pro Light"/>
+                      <a:cs typeface="Calibri Light" panose="020F0302020204030204" pitchFamily="34" charset="0"/>
                       <a:sym typeface="Source Sans Pro Light"/>
                     </a:rPr>
                     <a:t>Assumptions: </a:t>
                   </a:r>
                   <a:r>
                     <a:rPr lang="en-US" sz="900" u="sng" dirty="0" smtClean="0">
-                      <a:latin typeface="Source Sans Pro Light"/>
-                      <a:ea typeface="Source Sans Pro Light"/>
-                      <a:cs typeface="Source Sans Pro Light"/>
+                      <a:latin typeface="Calibri Light" panose="020F0302020204030204" pitchFamily="34" charset="0"/>
+                      <a:ea typeface="Source Sans Pro Light"/>
+                      <a:cs typeface="Calibri Light" panose="020F0302020204030204" pitchFamily="34" charset="0"/>
                       <a:sym typeface="Source Sans Pro Light"/>
                     </a:rPr>
                     <a:t>&gt;</a:t>
                   </a:r>
                   <a:r>
                     <a:rPr lang="en-US" sz="900" dirty="0" smtClean="0">
-                      <a:latin typeface="Source Sans Pro Light"/>
-                      <a:ea typeface="Source Sans Pro Light"/>
-                      <a:cs typeface="Source Sans Pro Light"/>
+                      <a:latin typeface="Calibri Light" panose="020F0302020204030204" pitchFamily="34" charset="0"/>
+                      <a:ea typeface="Source Sans Pro Light"/>
+                      <a:cs typeface="Calibri Light" panose="020F0302020204030204" pitchFamily="34" charset="0"/>
                       <a:sym typeface="Source Sans Pro Light"/>
                     </a:rPr>
                     <a:t>5 in each cell of the EXPECTED </a:t>
                   </a:r>
                   <a:r>
                     <a:rPr lang="en-US" sz="900" dirty="0">
-                      <a:latin typeface="Source Sans Pro Light"/>
-                      <a:ea typeface="Source Sans Pro Light"/>
-                      <a:cs typeface="Source Sans Pro Light"/>
+                      <a:latin typeface="Calibri Light" panose="020F0302020204030204" pitchFamily="34" charset="0"/>
+                      <a:ea typeface="Source Sans Pro Light"/>
+                      <a:cs typeface="Calibri Light" panose="020F0302020204030204" pitchFamily="34" charset="0"/>
                       <a:sym typeface="Source Sans Pro Light"/>
                     </a:rPr>
                     <a:t>table</a:t>
@@ -7753,9 +7789,9 @@
                     <a:defRPr sz="1800"/>
                   </a:pPr>
                   <a:endParaRPr lang="en-US" sz="500" dirty="0">
-                    <a:latin typeface="Source Sans Pro Light"/>
+                    <a:latin typeface="Calibri Light" panose="020F0302020204030204" pitchFamily="34" charset="0"/>
                     <a:ea typeface="Source Sans Pro Light"/>
-                    <a:cs typeface="Source Sans Pro Light"/>
+                    <a:cs typeface="Calibri Light" panose="020F0302020204030204" pitchFamily="34" charset="0"/>
                     <a:sym typeface="Source Sans Pro Light"/>
                   </a:endParaRPr>
                 </a:p>
@@ -7772,9 +7808,9 @@
                   </a:pPr>
                   <a:r>
                     <a:rPr lang="en-US" sz="900" b="1" dirty="0">
-                      <a:latin typeface="Source Sans Pro Light"/>
-                      <a:ea typeface="Source Sans Pro Light"/>
-                      <a:cs typeface="Source Sans Pro Light"/>
+                      <a:latin typeface="Calibri Light" panose="020F0302020204030204" pitchFamily="34" charset="0"/>
+                      <a:ea typeface="Source Sans Pro Light"/>
+                      <a:cs typeface="Calibri Light" panose="020F0302020204030204" pitchFamily="34" charset="0"/>
                       <a:sym typeface="Source Sans Pro Light"/>
                     </a:rPr>
                     <a:t>R: </a:t>
@@ -7784,9 +7820,9 @@
                       <a:solidFill>
                         <a:srgbClr val="FF0000"/>
                       </a:solidFill>
-                      <a:latin typeface="Source Sans Pro Light"/>
-                      <a:ea typeface="Source Sans Pro Light"/>
-                      <a:cs typeface="Source Sans Pro Light"/>
+                      <a:latin typeface="Calibri Light" panose="020F0302020204030204" pitchFamily="34" charset="0"/>
+                      <a:ea typeface="Source Sans Pro Light"/>
+                      <a:cs typeface="Calibri Light" panose="020F0302020204030204" pitchFamily="34" charset="0"/>
                       <a:sym typeface="Source Sans Pro Light"/>
                     </a:rPr>
                     <a:t>xtabs</a:t>
@@ -7796,18 +7832,18 @@
                       <a:solidFill>
                         <a:srgbClr val="FF0000"/>
                       </a:solidFill>
-                      <a:latin typeface="Source Sans Pro Light"/>
-                      <a:ea typeface="Source Sans Pro Light"/>
-                      <a:cs typeface="Source Sans Pro Light"/>
+                      <a:latin typeface="Calibri Light" panose="020F0302020204030204" pitchFamily="34" charset="0"/>
+                      <a:ea typeface="Source Sans Pro Light"/>
+                      <a:cs typeface="Calibri Light" panose="020F0302020204030204" pitchFamily="34" charset="0"/>
                       <a:sym typeface="Source Sans Pro Light"/>
                     </a:rPr>
                     <a:t>()</a:t>
                   </a:r>
                   <a:r>
                     <a:rPr lang="en-US" sz="900" dirty="0" smtClean="0">
-                      <a:latin typeface="Source Sans Pro Light"/>
-                      <a:ea typeface="Source Sans Pro Light"/>
-                      <a:cs typeface="Source Sans Pro Light"/>
+                      <a:latin typeface="Calibri Light" panose="020F0302020204030204" pitchFamily="34" charset="0"/>
+                      <a:ea typeface="Source Sans Pro Light"/>
+                      <a:cs typeface="Calibri Light" panose="020F0302020204030204" pitchFamily="34" charset="0"/>
                       <a:sym typeface="Source Sans Pro Light"/>
                     </a:rPr>
                     <a:t>, </a:t>
@@ -7817,18 +7853,18 @@
                       <a:solidFill>
                         <a:srgbClr val="FF0000"/>
                       </a:solidFill>
-                      <a:latin typeface="Source Sans Pro Light"/>
-                      <a:ea typeface="Source Sans Pro Light"/>
-                      <a:cs typeface="Source Sans Pro Light"/>
+                      <a:latin typeface="Calibri Light" panose="020F0302020204030204" pitchFamily="34" charset="0"/>
+                      <a:ea typeface="Source Sans Pro Light"/>
+                      <a:cs typeface="Calibri Light" panose="020F0302020204030204" pitchFamily="34" charset="0"/>
                       <a:sym typeface="Source Sans Pro Light"/>
                     </a:rPr>
                     <a:t>c()</a:t>
                   </a:r>
                   <a:r>
                     <a:rPr lang="en-US" sz="900" dirty="0" smtClean="0">
-                      <a:latin typeface="Source Sans Pro Light"/>
-                      <a:ea typeface="Source Sans Pro Light"/>
-                      <a:cs typeface="Source Sans Pro Light"/>
+                      <a:latin typeface="Calibri Light" panose="020F0302020204030204" pitchFamily="34" charset="0"/>
+                      <a:ea typeface="Source Sans Pro Light"/>
+                      <a:cs typeface="Calibri Light" panose="020F0302020204030204" pitchFamily="34" charset="0"/>
                       <a:sym typeface="Source Sans Pro Light"/>
                     </a:rPr>
                     <a:t>, </a:t>
@@ -7838,9 +7874,9 @@
                       <a:solidFill>
                         <a:srgbClr val="FF0000"/>
                       </a:solidFill>
-                      <a:latin typeface="Source Sans Pro Light"/>
-                      <a:ea typeface="Source Sans Pro Light"/>
-                      <a:cs typeface="Source Sans Pro Light"/>
+                      <a:latin typeface="Calibri Light" panose="020F0302020204030204" pitchFamily="34" charset="0"/>
+                      <a:ea typeface="Source Sans Pro Light"/>
+                      <a:cs typeface="Calibri Light" panose="020F0302020204030204" pitchFamily="34" charset="0"/>
                       <a:sym typeface="Source Sans Pro Light"/>
                     </a:rPr>
                     <a:t>chisq.test</a:t>
@@ -7850,18 +7886,18 @@
                       <a:solidFill>
                         <a:srgbClr val="FF0000"/>
                       </a:solidFill>
-                      <a:latin typeface="Source Sans Pro Light"/>
-                      <a:ea typeface="Source Sans Pro Light"/>
-                      <a:cs typeface="Source Sans Pro Light"/>
+                      <a:latin typeface="Calibri Light" panose="020F0302020204030204" pitchFamily="34" charset="0"/>
+                      <a:ea typeface="Source Sans Pro Light"/>
+                      <a:cs typeface="Calibri Light" panose="020F0302020204030204" pitchFamily="34" charset="0"/>
                       <a:sym typeface="Source Sans Pro Light"/>
                     </a:rPr>
                     <a:t>()</a:t>
                   </a:r>
                   <a:r>
                     <a:rPr lang="en-US" sz="900" dirty="0">
-                      <a:latin typeface="Source Sans Pro Light"/>
-                      <a:ea typeface="Source Sans Pro Light"/>
-                      <a:cs typeface="Source Sans Pro Light"/>
+                      <a:latin typeface="Calibri Light" panose="020F0302020204030204" pitchFamily="34" charset="0"/>
+                      <a:ea typeface="Source Sans Pro Light"/>
+                      <a:cs typeface="Calibri Light" panose="020F0302020204030204" pitchFamily="34" charset="0"/>
                       <a:sym typeface="Source Sans Pro Light"/>
                     </a:rPr>
                     <a:t>, </a:t>
@@ -7871,9 +7907,9 @@
                       <a:solidFill>
                         <a:srgbClr val="FF0000"/>
                       </a:solidFill>
-                      <a:latin typeface="Source Sans Pro Light"/>
-                      <a:ea typeface="Source Sans Pro Light"/>
-                      <a:cs typeface="Source Sans Pro Light"/>
+                      <a:latin typeface="Calibri Light" panose="020F0302020204030204" pitchFamily="34" charset="0"/>
+                      <a:ea typeface="Source Sans Pro Light"/>
+                      <a:cs typeface="Calibri Light" panose="020F0302020204030204" pitchFamily="34" charset="0"/>
                       <a:sym typeface="Source Sans Pro Light"/>
                     </a:rPr>
                     <a:t>percTable</a:t>
@@ -7883,18 +7919,18 @@
                       <a:solidFill>
                         <a:srgbClr val="FF0000"/>
                       </a:solidFill>
-                      <a:latin typeface="Source Sans Pro Light"/>
-                      <a:ea typeface="Source Sans Pro Light"/>
-                      <a:cs typeface="Source Sans Pro Light"/>
+                      <a:latin typeface="Calibri Light" panose="020F0302020204030204" pitchFamily="34" charset="0"/>
+                      <a:ea typeface="Source Sans Pro Light"/>
+                      <a:cs typeface="Calibri Light" panose="020F0302020204030204" pitchFamily="34" charset="0"/>
                       <a:sym typeface="Source Sans Pro Light"/>
                     </a:rPr>
                     <a:t>()</a:t>
                   </a:r>
                   <a:r>
                     <a:rPr lang="en-US" sz="900" dirty="0" smtClean="0">
-                      <a:latin typeface="Source Sans Pro Light"/>
-                      <a:ea typeface="Source Sans Pro Light"/>
-                      <a:cs typeface="Source Sans Pro Light"/>
+                      <a:latin typeface="Calibri Light" panose="020F0302020204030204" pitchFamily="34" charset="0"/>
+                      <a:ea typeface="Source Sans Pro Light"/>
+                      <a:cs typeface="Calibri Light" panose="020F0302020204030204" pitchFamily="34" charset="0"/>
                       <a:sym typeface="Source Sans Pro Light"/>
                     </a:rPr>
                     <a:t>, </a:t>
@@ -7904,9 +7940,9 @@
                       <a:solidFill>
                         <a:srgbClr val="FF0000"/>
                       </a:solidFill>
-                      <a:latin typeface="Source Sans Pro Light"/>
-                      <a:ea typeface="Source Sans Pro Light"/>
-                      <a:cs typeface="Source Sans Pro Light"/>
+                      <a:latin typeface="Calibri Light" panose="020F0302020204030204" pitchFamily="34" charset="0"/>
+                      <a:ea typeface="Source Sans Pro Light"/>
+                      <a:cs typeface="Calibri Light" panose="020F0302020204030204" pitchFamily="34" charset="0"/>
                       <a:sym typeface="Source Sans Pro Light"/>
                     </a:rPr>
                     <a:t>chiGOF</a:t>
@@ -7916,9 +7952,9 @@
                       <a:solidFill>
                         <a:srgbClr val="FF0000"/>
                       </a:solidFill>
-                      <a:latin typeface="Source Sans Pro Light"/>
-                      <a:ea typeface="Source Sans Pro Light"/>
-                      <a:cs typeface="Source Sans Pro Light"/>
+                      <a:latin typeface="Calibri Light" panose="020F0302020204030204" pitchFamily="34" charset="0"/>
+                      <a:ea typeface="Source Sans Pro Light"/>
+                      <a:cs typeface="Calibri Light" panose="020F0302020204030204" pitchFamily="34" charset="0"/>
                       <a:sym typeface="Source Sans Pro Light"/>
                     </a:rPr>
                     <a:t>()</a:t>
@@ -7927,16 +7963,16 @@
                     <a:solidFill>
                       <a:srgbClr val="FF0000"/>
                     </a:solidFill>
-                    <a:latin typeface="Source Sans Pro Light"/>
+                    <a:latin typeface="Calibri Light" panose="020F0302020204030204" pitchFamily="34" charset="0"/>
                     <a:ea typeface="Source Sans Pro Light"/>
-                    <a:cs typeface="Source Sans Pro Light"/>
+                    <a:cs typeface="Calibri Light" panose="020F0302020204030204" pitchFamily="34" charset="0"/>
                     <a:sym typeface="Source Sans Pro Light"/>
                   </a:endParaRPr>
                 </a:p>
               </p:txBody>
             </p:sp>
           </mc:Choice>
-          <mc:Fallback xmlns="">
+          <mc:Fallback>
             <p:sp>
               <p:nvSpPr>
                 <p:cNvPr id="63" name="Shape 34"/>
@@ -8004,7 +8040,7 @@
             </a:ln>
             <a:extLst>
               <a:ext uri="{C572A759-6A51-4108-AA02-DFA0A04FC94B}">
-                <ma14:wrappingTextBoxFlag xmlns:ma14="http://schemas.microsoft.com/office/mac/drawingml/2011/main" xmlns="" val="1"/>
+                <ma14:wrappingTextBoxFlag xmlns="" xmlns:ma14="http://schemas.microsoft.com/office/mac/drawingml/2011/main" val="1"/>
               </a:ext>
             </a:extLst>
           </p:spPr>
@@ -8022,9 +8058,9 @@
                       <a:lumMod val="10000"/>
                     </a:schemeClr>
                   </a:solidFill>
-                  <a:latin typeface="Source Sans Pro"/>
+                  <a:latin typeface="Calibri" panose="020F0502020204030204" pitchFamily="34" charset="0"/>
                   <a:ea typeface="Source Sans Pro"/>
-                  <a:cs typeface="Source Sans Pro"/>
+                  <a:cs typeface="Calibri" panose="020F0502020204030204" pitchFamily="34" charset="0"/>
                   <a:sym typeface="Source Sans Pro"/>
                 </a:rPr>
                 <a:t>Goodness-of-Fit Test</a:t>
@@ -8035,9 +8071,9 @@
                     <a:lumMod val="10000"/>
                   </a:schemeClr>
                 </a:solidFill>
-                <a:latin typeface="Source Sans Pro"/>
+                <a:latin typeface="Calibri" panose="020F0502020204030204" pitchFamily="34" charset="0"/>
                 <a:ea typeface="Source Sans Pro"/>
-                <a:cs typeface="Source Sans Pro"/>
+                <a:cs typeface="Calibri" panose="020F0502020204030204" pitchFamily="34" charset="0"/>
                 <a:sym typeface="Source Sans Pro"/>
               </a:endParaRPr>
             </a:p>
@@ -8052,8 +8088,8 @@
         </p:nvSpPr>
         <p:spPr>
           <a:xfrm>
-            <a:off x="833500" y="625376"/>
-            <a:ext cx="958086" cy="245070"/>
+            <a:off x="923268" y="625376"/>
+            <a:ext cx="778549" cy="245070"/>
           </a:xfrm>
           <a:prstGeom prst="rect">
             <a:avLst/>
@@ -8089,7 +8125,7 @@
                 <a:solidFill>
                   <a:srgbClr val="000000"/>
                 </a:solidFill>
-                <a:latin typeface="Source Sans Pro Light"/>
+                <a:latin typeface="Calibri Light" panose="020F0302020204030204" pitchFamily="34" charset="0"/>
                 <a:hlinkClick r:id="rId8"/>
               </a:rPr>
               <a:t>Class R FAQ</a:t>
@@ -8098,7 +8134,7 @@
               <a:solidFill>
                 <a:srgbClr val="000000"/>
               </a:solidFill>
-              <a:latin typeface="Source Sans Pro Light"/>
+              <a:latin typeface="Calibri Light" panose="020F0302020204030204" pitchFamily="34" charset="0"/>
             </a:endParaRPr>
           </a:p>
         </p:txBody>
@@ -8111,8 +8147,8 @@
         </p:nvSpPr>
         <p:spPr>
           <a:xfrm>
-            <a:off x="2421175" y="654641"/>
-            <a:ext cx="1128004" cy="152737"/>
+            <a:off x="2449227" y="654641"/>
+            <a:ext cx="1071900" cy="152737"/>
           </a:xfrm>
           <a:prstGeom prst="rect">
             <a:avLst/>
@@ -8150,7 +8186,7 @@
                     <a:lumMod val="75000"/>
                   </a:schemeClr>
                 </a:solidFill>
-                <a:latin typeface="Source Sans Pro Light"/>
+                <a:latin typeface="Calibri Light" panose="020F0302020204030204" pitchFamily="34" charset="0"/>
               </a:rPr>
               <a:t>by Derek H. Ogle, revised </a:t>
             </a:r>
@@ -8161,7 +8197,7 @@
                     <a:lumMod val="75000"/>
                   </a:schemeClr>
                 </a:solidFill>
-                <a:latin typeface="Source Sans Pro Light"/>
+                <a:latin typeface="Calibri Light" panose="020F0302020204030204" pitchFamily="34" charset="0"/>
               </a:rPr>
               <a:t>Nov-19</a:t>
             </a:r>
@@ -8171,7 +8207,7 @@
                   <a:lumMod val="75000"/>
                 </a:schemeClr>
               </a:solidFill>
-              <a:latin typeface="Source Sans Pro Light"/>
+              <a:latin typeface="Calibri Light" panose="020F0302020204030204" pitchFamily="34" charset="0"/>
             </a:endParaRPr>
           </a:p>
         </p:txBody>
@@ -8230,9 +8266,9 @@
                 <a:defRPr sz="1800"/>
               </a:pPr>
               <a:endParaRPr lang="en-US" sz="600" dirty="0" smtClean="0">
-                <a:latin typeface="Source Sans Pro Light"/>
+                <a:latin typeface="Calibri Light" panose="020F0302020204030204" pitchFamily="34" charset="0"/>
                 <a:ea typeface="Source Sans Pro Light"/>
-                <a:cs typeface="Source Sans Pro Light"/>
+                <a:cs typeface="Calibri Light" panose="020F0302020204030204" pitchFamily="34" charset="0"/>
                 <a:sym typeface="Source Sans Pro Light"/>
               </a:endParaRPr>
             </a:p>
@@ -8249,9 +8285,9 @@
               </a:pPr>
               <a:r>
                 <a:rPr lang="en-US" sz="1200" dirty="0" smtClean="0">
-                  <a:latin typeface="Source Sans Pro Light"/>
+                  <a:latin typeface="Calibri Light" panose="020F0302020204030204" pitchFamily="34" charset="0"/>
                   <a:ea typeface="Source Sans Pro Light"/>
-                  <a:cs typeface="Source Sans Pro Light"/>
+                  <a:cs typeface="Calibri Light" panose="020F0302020204030204" pitchFamily="34" charset="0"/>
                   <a:sym typeface="Source Sans Pro Light"/>
                 </a:rPr>
                 <a:t>If p-value &lt; </a:t>
@@ -8260,16 +8296,16 @@
                 <a:rPr lang="en-US" sz="1200" dirty="0" smtClean="0">
                   <a:latin typeface="Symbol" panose="05050102010706020507" pitchFamily="18" charset="2"/>
                   <a:ea typeface="Source Sans Pro Light"/>
-                  <a:cs typeface="Source Sans Pro Light"/>
+                  <a:cs typeface="Calibri Light" panose="020F0302020204030204" pitchFamily="34" charset="0"/>
                   <a:sym typeface="Source Sans Pro Light"/>
                 </a:rPr>
                 <a:t>a</a:t>
               </a:r>
               <a:r>
                 <a:rPr lang="en-US" sz="1200" dirty="0" smtClean="0">
-                  <a:latin typeface="Source Sans Pro Light"/>
+                  <a:latin typeface="Calibri Light" panose="020F0302020204030204" pitchFamily="34" charset="0"/>
                   <a:ea typeface="Source Sans Pro Light"/>
-                  <a:cs typeface="Source Sans Pro Light"/>
+                  <a:cs typeface="Calibri Light" panose="020F0302020204030204" pitchFamily="34" charset="0"/>
                   <a:sym typeface="Source Sans Pro Light"/>
                 </a:rPr>
                 <a:t>, then </a:t>
@@ -8279,9 +8315,9 @@
                   <a:solidFill>
                     <a:srgbClr val="FF0000"/>
                   </a:solidFill>
-                  <a:latin typeface="Source Sans Pro Light"/>
+                  <a:latin typeface="Calibri Light" panose="020F0302020204030204" pitchFamily="34" charset="0"/>
                   <a:ea typeface="Source Sans Pro Light"/>
-                  <a:cs typeface="Source Sans Pro Light"/>
+                  <a:cs typeface="Calibri Light" panose="020F0302020204030204" pitchFamily="34" charset="0"/>
                   <a:sym typeface="Source Sans Pro Light"/>
                 </a:rPr>
                 <a:t>REJECT H</a:t>
@@ -8291,18 +8327,18 @@
                   <a:solidFill>
                     <a:srgbClr val="FF0000"/>
                   </a:solidFill>
-                  <a:latin typeface="Source Sans Pro Light"/>
+                  <a:latin typeface="Calibri Light" panose="020F0302020204030204" pitchFamily="34" charset="0"/>
                   <a:ea typeface="Source Sans Pro Light"/>
-                  <a:cs typeface="Source Sans Pro Light"/>
+                  <a:cs typeface="Calibri Light" panose="020F0302020204030204" pitchFamily="34" charset="0"/>
                   <a:sym typeface="Source Sans Pro Light"/>
                 </a:rPr>
                 <a:t>0</a:t>
               </a:r>
               <a:r>
                 <a:rPr lang="en-US" sz="1200" dirty="0" smtClean="0">
-                  <a:latin typeface="Source Sans Pro Light"/>
+                  <a:latin typeface="Calibri Light" panose="020F0302020204030204" pitchFamily="34" charset="0"/>
                   <a:ea typeface="Source Sans Pro Light"/>
-                  <a:cs typeface="Source Sans Pro Light"/>
+                  <a:cs typeface="Calibri Light" panose="020F0302020204030204" pitchFamily="34" charset="0"/>
                   <a:sym typeface="Source Sans Pro Light"/>
                 </a:rPr>
                 <a:t>., otherwise </a:t>
@@ -8312,9 +8348,9 @@
                   <a:solidFill>
                     <a:schemeClr val="accent1"/>
                   </a:solidFill>
-                  <a:latin typeface="Source Sans Pro Light"/>
+                  <a:latin typeface="Calibri Light" panose="020F0302020204030204" pitchFamily="34" charset="0"/>
                   <a:ea typeface="Source Sans Pro Light"/>
-                  <a:cs typeface="Source Sans Pro Light"/>
+                  <a:cs typeface="Calibri Light" panose="020F0302020204030204" pitchFamily="34" charset="0"/>
                   <a:sym typeface="Source Sans Pro Light"/>
                 </a:rPr>
                 <a:t>DNR H</a:t>
@@ -8324,26 +8360,26 @@
                   <a:solidFill>
                     <a:schemeClr val="accent1"/>
                   </a:solidFill>
-                  <a:latin typeface="Source Sans Pro Light"/>
+                  <a:latin typeface="Calibri Light" panose="020F0302020204030204" pitchFamily="34" charset="0"/>
                   <a:ea typeface="Source Sans Pro Light"/>
-                  <a:cs typeface="Source Sans Pro Light"/>
+                  <a:cs typeface="Calibri Light" panose="020F0302020204030204" pitchFamily="34" charset="0"/>
                   <a:sym typeface="Source Sans Pro Light"/>
                 </a:rPr>
                 <a:t>0</a:t>
               </a:r>
               <a:r>
                 <a:rPr lang="en-US" sz="1200" dirty="0" smtClean="0">
-                  <a:latin typeface="Source Sans Pro Light"/>
+                  <a:latin typeface="Calibri Light" panose="020F0302020204030204" pitchFamily="34" charset="0"/>
                   <a:ea typeface="Source Sans Pro Light"/>
-                  <a:cs typeface="Source Sans Pro Light"/>
+                  <a:cs typeface="Calibri Light" panose="020F0302020204030204" pitchFamily="34" charset="0"/>
                   <a:sym typeface="Source Sans Pro Light"/>
                 </a:rPr>
                 <a:t>.</a:t>
               </a:r>
               <a:endParaRPr lang="en-US" sz="1200" dirty="0">
-                <a:latin typeface="Source Sans Pro Light"/>
+                <a:latin typeface="Calibri Light" panose="020F0302020204030204" pitchFamily="34" charset="0"/>
                 <a:ea typeface="Source Sans Pro Light"/>
-                <a:cs typeface="Source Sans Pro Light"/>
+                <a:cs typeface="Calibri Light" panose="020F0302020204030204" pitchFamily="34" charset="0"/>
                 <a:sym typeface="Source Sans Pro Light"/>
               </a:endParaRPr>
             </a:p>
@@ -8376,7 +8412,7 @@
             </a:ln>
             <a:extLst>
               <a:ext uri="{C572A759-6A51-4108-AA02-DFA0A04FC94B}">
-                <ma14:wrappingTextBoxFlag xmlns:ma14="http://schemas.microsoft.com/office/mac/drawingml/2011/main" xmlns="" val="1"/>
+                <ma14:wrappingTextBoxFlag xmlns="" xmlns:ma14="http://schemas.microsoft.com/office/mac/drawingml/2011/main" val="1"/>
               </a:ext>
             </a:extLst>
           </p:spPr>
@@ -8394,9 +8430,9 @@
                       <a:lumMod val="95000"/>
                     </a:schemeClr>
                   </a:solidFill>
-                  <a:latin typeface="Source Sans Pro"/>
+                  <a:latin typeface="Calibri" panose="020F0502020204030204" pitchFamily="34" charset="0"/>
                   <a:ea typeface="Source Sans Pro"/>
-                  <a:cs typeface="Source Sans Pro"/>
+                  <a:cs typeface="Calibri" panose="020F0502020204030204" pitchFamily="34" charset="0"/>
                   <a:sym typeface="Source Sans Pro"/>
                 </a:rPr>
                 <a:t>Making a Decision about H</a:t>
@@ -8408,9 +8444,9 @@
                       <a:lumMod val="95000"/>
                     </a:schemeClr>
                   </a:solidFill>
-                  <a:latin typeface="Source Sans Pro"/>
+                  <a:latin typeface="Calibri" panose="020F0502020204030204" pitchFamily="34" charset="0"/>
                   <a:ea typeface="Source Sans Pro"/>
-                  <a:cs typeface="Source Sans Pro"/>
+                  <a:cs typeface="Calibri" panose="020F0502020204030204" pitchFamily="34" charset="0"/>
                   <a:sym typeface="Source Sans Pro"/>
                 </a:rPr>
                 <a:t>0</a:t>
@@ -8421,9 +8457,9 @@
                     <a:lumMod val="95000"/>
                   </a:schemeClr>
                 </a:solidFill>
-                <a:latin typeface="Source Sans Pro"/>
+                <a:latin typeface="Calibri" panose="020F0502020204030204" pitchFamily="34" charset="0"/>
                 <a:ea typeface="Source Sans Pro"/>
-                <a:cs typeface="Source Sans Pro"/>
+                <a:cs typeface="Calibri" panose="020F0502020204030204" pitchFamily="34" charset="0"/>
                 <a:sym typeface="Source Sans Pro"/>
               </a:endParaRPr>
             </a:p>
@@ -8983,22 +9019,22 @@
             <a:r>
               <a:rPr lang="en-US" sz="3200" b="1" cap="small" dirty="0" smtClean="0">
                 <a:solidFill>
-                  <a:srgbClr val="53585F"/>
+                  <a:schemeClr val="tx1"/>
                 </a:solidFill>
-                <a:latin typeface="Source Sans Pro Semibold"/>
+                <a:latin typeface="Calibri" panose="020F0502020204030204" pitchFamily="34" charset="0"/>
                 <a:ea typeface="Source Sans Pro"/>
-                <a:cs typeface="Source Sans Pro"/>
+                <a:cs typeface="Calibri" panose="020F0502020204030204" pitchFamily="34" charset="0"/>
                 <a:sym typeface="Source Sans Pro"/>
               </a:rPr>
               <a:t>11 Steps for Any Hypothesis Test</a:t>
             </a:r>
             <a:endParaRPr lang="en-US" sz="3200" b="1" cap="small" dirty="0">
               <a:solidFill>
-                <a:srgbClr val="53585F"/>
+                <a:schemeClr val="tx1"/>
               </a:solidFill>
-              <a:latin typeface="Source Sans Pro Semibold"/>
+              <a:latin typeface="Calibri" panose="020F0502020204030204" pitchFamily="34" charset="0"/>
               <a:ea typeface="Source Sans Pro Light"/>
-              <a:cs typeface="Source Sans Pro Light"/>
+              <a:cs typeface="Calibri Light" panose="020F0302020204030204" pitchFamily="34" charset="0"/>
               <a:sym typeface="Source Sans Pro Light"/>
             </a:endParaRPr>
           </a:p>

</xml_diff>